<commit_message>
Even more slides (DM)
</commit_message>
<xml_diff>
--- a/presentation/presentation.pptx
+++ b/presentation/presentation.pptx
@@ -5,16 +5,18 @@
     <p:sldMasterId id="2147483648" r:id="rId1"/>
   </p:sldMasterIdLst>
   <p:notesMasterIdLst>
-    <p:notesMasterId r:id="rId9"/>
+    <p:notesMasterId r:id="rId11"/>
   </p:notesMasterIdLst>
   <p:sldIdLst>
     <p:sldId id="257" r:id="rId2"/>
     <p:sldId id="258" r:id="rId3"/>
     <p:sldId id="260" r:id="rId4"/>
-    <p:sldId id="264" r:id="rId5"/>
-    <p:sldId id="261" r:id="rId6"/>
-    <p:sldId id="262" r:id="rId7"/>
-    <p:sldId id="263" r:id="rId8"/>
+    <p:sldId id="265" r:id="rId5"/>
+    <p:sldId id="264" r:id="rId6"/>
+    <p:sldId id="266" r:id="rId7"/>
+    <p:sldId id="261" r:id="rId8"/>
+    <p:sldId id="262" r:id="rId9"/>
+    <p:sldId id="263" r:id="rId10"/>
   </p:sldIdLst>
   <p:sldSz cx="12192000" cy="6858000"/>
   <p:notesSz cx="6858000" cy="9144000"/>
@@ -942,7 +944,7 @@
     </p:spTree>
     <p:extLst>
       <p:ext uri="{BB962C8B-B14F-4D97-AF65-F5344CB8AC3E}">
-        <p14:creationId xmlns:p14="http://schemas.microsoft.com/office/powerpoint/2010/main" val="365707513"/>
+        <p14:creationId xmlns:p14="http://schemas.microsoft.com/office/powerpoint/2010/main" val="265139802"/>
       </p:ext>
     </p:extLst>
   </p:cSld>
@@ -1104,7 +1106,7 @@
     </p:spTree>
     <p:extLst>
       <p:ext uri="{BB962C8B-B14F-4D97-AF65-F5344CB8AC3E}">
-        <p14:creationId xmlns:p14="http://schemas.microsoft.com/office/powerpoint/2010/main" val="1792458713"/>
+        <p14:creationId xmlns:p14="http://schemas.microsoft.com/office/powerpoint/2010/main" val="365707513"/>
       </p:ext>
     </p:extLst>
   </p:cSld>
@@ -1266,7 +1268,7 @@
     </p:spTree>
     <p:extLst>
       <p:ext uri="{BB962C8B-B14F-4D97-AF65-F5344CB8AC3E}">
-        <p14:creationId xmlns:p14="http://schemas.microsoft.com/office/powerpoint/2010/main" val="528872771"/>
+        <p14:creationId xmlns:p14="http://schemas.microsoft.com/office/powerpoint/2010/main" val="1374658171"/>
       </p:ext>
     </p:extLst>
   </p:cSld>
@@ -1420,6 +1422,330 @@
             <a:fld id="{3AC54132-D928-D54C-ABBE-ACE1209FEA7D}" type="slidenum">
               <a:rPr lang="pt-PT" smtClean="0"/>
               <a:t>7</a:t>
+            </a:fld>
+            <a:endParaRPr lang="pt-PT"/>
+          </a:p>
+        </p:txBody>
+      </p:sp>
+    </p:spTree>
+    <p:extLst>
+      <p:ext uri="{BB962C8B-B14F-4D97-AF65-F5344CB8AC3E}">
+        <p14:creationId xmlns:p14="http://schemas.microsoft.com/office/powerpoint/2010/main" val="1792458713"/>
+      </p:ext>
+    </p:extLst>
+  </p:cSld>
+  <p:clrMapOvr>
+    <a:masterClrMapping/>
+  </p:clrMapOvr>
+</p:notes>
+</file>
+
+<file path=ppt/notesSlides/notesSlide7.xml><?xml version="1.0" encoding="utf-8"?>
+<p:notes xmlns:a="http://schemas.openxmlformats.org/drawingml/2006/main" xmlns:r="http://schemas.openxmlformats.org/officeDocument/2006/relationships" xmlns:p="http://schemas.openxmlformats.org/presentationml/2006/main">
+  <p:cSld>
+    <p:spTree>
+      <p:nvGrpSpPr>
+        <p:cNvPr id="1" name=""/>
+        <p:cNvGrpSpPr/>
+        <p:nvPr/>
+      </p:nvGrpSpPr>
+      <p:grpSpPr>
+        <a:xfrm>
+          <a:off x="0" y="0"/>
+          <a:ext cx="0" cy="0"/>
+          <a:chOff x="0" y="0"/>
+          <a:chExt cx="0" cy="0"/>
+        </a:xfrm>
+      </p:grpSpPr>
+      <p:sp>
+        <p:nvSpPr>
+          <p:cNvPr id="2" name="Marcador de Posição da Imagem do Diapositivo 1"/>
+          <p:cNvSpPr>
+            <a:spLocks noGrp="1" noRot="1" noChangeAspect="1"/>
+          </p:cNvSpPr>
+          <p:nvPr>
+            <p:ph type="sldImg"/>
+          </p:nvPr>
+        </p:nvSpPr>
+        <p:spPr/>
+      </p:sp>
+      <p:sp>
+        <p:nvSpPr>
+          <p:cNvPr id="3" name="Marcador de Posição de Notas 2"/>
+          <p:cNvSpPr>
+            <a:spLocks noGrp="1"/>
+          </p:cNvSpPr>
+          <p:nvPr>
+            <p:ph type="body" idx="1"/>
+          </p:nvPr>
+        </p:nvSpPr>
+        <p:spPr/>
+        <p:txBody>
+          <a:bodyPr/>
+          <a:lstStyle/>
+          <a:p>
+            <a:r>
+              <a:rPr lang="pt-PT" dirty="0" err="1" smtClean="0"/>
+              <a:t>Health</a:t>
+            </a:r>
+            <a:r>
+              <a:rPr lang="pt-PT" dirty="0" smtClean="0"/>
+              <a:t> </a:t>
+            </a:r>
+            <a:r>
+              <a:rPr lang="pt-PT" dirty="0" err="1" smtClean="0"/>
+              <a:t>Problems</a:t>
+            </a:r>
+            <a:r>
+              <a:rPr lang="pt-PT" dirty="0" smtClean="0"/>
+              <a:t> (stress, </a:t>
+            </a:r>
+            <a:r>
+              <a:rPr lang="pt-PT" dirty="0" err="1" smtClean="0"/>
+              <a:t>pollution</a:t>
+            </a:r>
+            <a:r>
+              <a:rPr lang="pt-PT" dirty="0" smtClean="0"/>
+              <a:t>,</a:t>
+            </a:r>
+            <a:r>
+              <a:rPr lang="pt-PT" baseline="0" dirty="0" smtClean="0"/>
+              <a:t> etc.) -&gt; </a:t>
+            </a:r>
+            <a:r>
+              <a:rPr lang="pt-PT" baseline="0" dirty="0" err="1" smtClean="0"/>
+              <a:t>related</a:t>
+            </a:r>
+            <a:r>
+              <a:rPr lang="pt-PT" baseline="0" dirty="0" smtClean="0"/>
+              <a:t> </a:t>
+            </a:r>
+            <a:r>
+              <a:rPr lang="pt-PT" baseline="0" dirty="0" err="1" smtClean="0"/>
+              <a:t>with</a:t>
+            </a:r>
+            <a:r>
+              <a:rPr lang="pt-PT" baseline="0" dirty="0" smtClean="0"/>
+              <a:t> </a:t>
+            </a:r>
+            <a:r>
+              <a:rPr lang="pt-PT" baseline="0" dirty="0" err="1" smtClean="0"/>
+              <a:t>environment</a:t>
+            </a:r>
+            <a:endParaRPr lang="pt-PT" dirty="0" smtClean="0"/>
+          </a:p>
+          <a:p>
+            <a:r>
+              <a:rPr lang="pt-PT" dirty="0" err="1" smtClean="0"/>
+              <a:t>Economic</a:t>
+            </a:r>
+            <a:r>
+              <a:rPr lang="pt-PT" baseline="0" dirty="0" smtClean="0"/>
+              <a:t> </a:t>
+            </a:r>
+            <a:r>
+              <a:rPr lang="pt-PT" baseline="0" dirty="0" err="1" smtClean="0"/>
+              <a:t>impact</a:t>
+            </a:r>
+            <a:endParaRPr lang="pt-PT" baseline="0" dirty="0" smtClean="0"/>
+          </a:p>
+          <a:p>
+            <a:r>
+              <a:rPr lang="pt-PT" baseline="0" dirty="0" err="1" smtClean="0"/>
+              <a:t>Environmental</a:t>
+            </a:r>
+            <a:r>
+              <a:rPr lang="pt-PT" baseline="0" dirty="0" smtClean="0"/>
+              <a:t> </a:t>
+            </a:r>
+            <a:r>
+              <a:rPr lang="pt-PT" baseline="0" dirty="0" err="1" smtClean="0"/>
+              <a:t>impact</a:t>
+            </a:r>
+            <a:endParaRPr lang="pt-PT" dirty="0"/>
+          </a:p>
+        </p:txBody>
+      </p:sp>
+      <p:sp>
+        <p:nvSpPr>
+          <p:cNvPr id="4" name="Marcador de Posição do Número do Diapositivo 3"/>
+          <p:cNvSpPr>
+            <a:spLocks noGrp="1"/>
+          </p:cNvSpPr>
+          <p:nvPr>
+            <p:ph type="sldNum" sz="quarter" idx="10"/>
+          </p:nvPr>
+        </p:nvSpPr>
+        <p:spPr/>
+        <p:txBody>
+          <a:bodyPr/>
+          <a:lstStyle/>
+          <a:p>
+            <a:fld id="{3AC54132-D928-D54C-ABBE-ACE1209FEA7D}" type="slidenum">
+              <a:rPr lang="pt-PT" smtClean="0"/>
+              <a:t>8</a:t>
+            </a:fld>
+            <a:endParaRPr lang="pt-PT"/>
+          </a:p>
+        </p:txBody>
+      </p:sp>
+    </p:spTree>
+    <p:extLst>
+      <p:ext uri="{BB962C8B-B14F-4D97-AF65-F5344CB8AC3E}">
+        <p14:creationId xmlns:p14="http://schemas.microsoft.com/office/powerpoint/2010/main" val="528872771"/>
+      </p:ext>
+    </p:extLst>
+  </p:cSld>
+  <p:clrMapOvr>
+    <a:masterClrMapping/>
+  </p:clrMapOvr>
+</p:notes>
+</file>
+
+<file path=ppt/notesSlides/notesSlide8.xml><?xml version="1.0" encoding="utf-8"?>
+<p:notes xmlns:a="http://schemas.openxmlformats.org/drawingml/2006/main" xmlns:r="http://schemas.openxmlformats.org/officeDocument/2006/relationships" xmlns:p="http://schemas.openxmlformats.org/presentationml/2006/main">
+  <p:cSld>
+    <p:spTree>
+      <p:nvGrpSpPr>
+        <p:cNvPr id="1" name=""/>
+        <p:cNvGrpSpPr/>
+        <p:nvPr/>
+      </p:nvGrpSpPr>
+      <p:grpSpPr>
+        <a:xfrm>
+          <a:off x="0" y="0"/>
+          <a:ext cx="0" cy="0"/>
+          <a:chOff x="0" y="0"/>
+          <a:chExt cx="0" cy="0"/>
+        </a:xfrm>
+      </p:grpSpPr>
+      <p:sp>
+        <p:nvSpPr>
+          <p:cNvPr id="2" name="Marcador de Posição da Imagem do Diapositivo 1"/>
+          <p:cNvSpPr>
+            <a:spLocks noGrp="1" noRot="1" noChangeAspect="1"/>
+          </p:cNvSpPr>
+          <p:nvPr>
+            <p:ph type="sldImg"/>
+          </p:nvPr>
+        </p:nvSpPr>
+        <p:spPr/>
+      </p:sp>
+      <p:sp>
+        <p:nvSpPr>
+          <p:cNvPr id="3" name="Marcador de Posição de Notas 2"/>
+          <p:cNvSpPr>
+            <a:spLocks noGrp="1"/>
+          </p:cNvSpPr>
+          <p:nvPr>
+            <p:ph type="body" idx="1"/>
+          </p:nvPr>
+        </p:nvSpPr>
+        <p:spPr/>
+        <p:txBody>
+          <a:bodyPr/>
+          <a:lstStyle/>
+          <a:p>
+            <a:r>
+              <a:rPr lang="pt-PT" dirty="0" err="1" smtClean="0"/>
+              <a:t>Health</a:t>
+            </a:r>
+            <a:r>
+              <a:rPr lang="pt-PT" dirty="0" smtClean="0"/>
+              <a:t> </a:t>
+            </a:r>
+            <a:r>
+              <a:rPr lang="pt-PT" dirty="0" err="1" smtClean="0"/>
+              <a:t>Problems</a:t>
+            </a:r>
+            <a:r>
+              <a:rPr lang="pt-PT" dirty="0" smtClean="0"/>
+              <a:t> (stress, </a:t>
+            </a:r>
+            <a:r>
+              <a:rPr lang="pt-PT" dirty="0" err="1" smtClean="0"/>
+              <a:t>pollution</a:t>
+            </a:r>
+            <a:r>
+              <a:rPr lang="pt-PT" dirty="0" smtClean="0"/>
+              <a:t>,</a:t>
+            </a:r>
+            <a:r>
+              <a:rPr lang="pt-PT" baseline="0" dirty="0" smtClean="0"/>
+              <a:t> etc.) -&gt; </a:t>
+            </a:r>
+            <a:r>
+              <a:rPr lang="pt-PT" baseline="0" dirty="0" err="1" smtClean="0"/>
+              <a:t>related</a:t>
+            </a:r>
+            <a:r>
+              <a:rPr lang="pt-PT" baseline="0" dirty="0" smtClean="0"/>
+              <a:t> </a:t>
+            </a:r>
+            <a:r>
+              <a:rPr lang="pt-PT" baseline="0" dirty="0" err="1" smtClean="0"/>
+              <a:t>with</a:t>
+            </a:r>
+            <a:r>
+              <a:rPr lang="pt-PT" baseline="0" dirty="0" smtClean="0"/>
+              <a:t> </a:t>
+            </a:r>
+            <a:r>
+              <a:rPr lang="pt-PT" baseline="0" dirty="0" err="1" smtClean="0"/>
+              <a:t>environment</a:t>
+            </a:r>
+            <a:endParaRPr lang="pt-PT" dirty="0" smtClean="0"/>
+          </a:p>
+          <a:p>
+            <a:r>
+              <a:rPr lang="pt-PT" dirty="0" err="1" smtClean="0"/>
+              <a:t>Economic</a:t>
+            </a:r>
+            <a:r>
+              <a:rPr lang="pt-PT" baseline="0" dirty="0" smtClean="0"/>
+              <a:t> </a:t>
+            </a:r>
+            <a:r>
+              <a:rPr lang="pt-PT" baseline="0" dirty="0" err="1" smtClean="0"/>
+              <a:t>impact</a:t>
+            </a:r>
+            <a:endParaRPr lang="pt-PT" baseline="0" dirty="0" smtClean="0"/>
+          </a:p>
+          <a:p>
+            <a:r>
+              <a:rPr lang="pt-PT" baseline="0" dirty="0" err="1" smtClean="0"/>
+              <a:t>Environmental</a:t>
+            </a:r>
+            <a:r>
+              <a:rPr lang="pt-PT" baseline="0" dirty="0" smtClean="0"/>
+              <a:t> </a:t>
+            </a:r>
+            <a:r>
+              <a:rPr lang="pt-PT" baseline="0" dirty="0" err="1" smtClean="0"/>
+              <a:t>impact</a:t>
+            </a:r>
+            <a:endParaRPr lang="pt-PT" dirty="0"/>
+          </a:p>
+        </p:txBody>
+      </p:sp>
+      <p:sp>
+        <p:nvSpPr>
+          <p:cNvPr id="4" name="Marcador de Posição do Número do Diapositivo 3"/>
+          <p:cNvSpPr>
+            <a:spLocks noGrp="1"/>
+          </p:cNvSpPr>
+          <p:nvPr>
+            <p:ph type="sldNum" sz="quarter" idx="10"/>
+          </p:nvPr>
+        </p:nvSpPr>
+        <p:spPr/>
+        <p:txBody>
+          <a:bodyPr/>
+          <a:lstStyle/>
+          <a:p>
+            <a:fld id="{3AC54132-D928-D54C-ABBE-ACE1209FEA7D}" type="slidenum">
+              <a:rPr lang="pt-PT" smtClean="0"/>
+              <a:t>9</a:t>
             </a:fld>
             <a:endParaRPr lang="pt-PT"/>
           </a:p>
@@ -4802,7 +5128,7 @@
         <p:spPr>
           <a:xfrm>
             <a:off x="2137893" y="456504"/>
-            <a:ext cx="6212278" cy="769441"/>
+            <a:ext cx="4684488" cy="769441"/>
           </a:xfrm>
           <a:prstGeom prst="rect">
             <a:avLst/>
@@ -4821,7 +5147,7 @@
                   <a:srgbClr val="00568A"/>
                 </a:solidFill>
               </a:rPr>
-              <a:t>Average</a:t>
+              <a:t>Gender</a:t>
             </a:r>
             <a:r>
               <a:rPr lang="pt-PT" sz="4400" dirty="0" smtClean="0">
@@ -4837,23 +5163,7 @@
                   <a:srgbClr val="00568A"/>
                 </a:solidFill>
               </a:rPr>
-              <a:t>Salary</a:t>
-            </a:r>
-            <a:r>
-              <a:rPr lang="pt-PT" sz="4400" dirty="0" smtClean="0">
-                <a:solidFill>
-                  <a:srgbClr val="00568A"/>
-                </a:solidFill>
-              </a:rPr>
-              <a:t> per </a:t>
-            </a:r>
-            <a:r>
-              <a:rPr lang="pt-PT" sz="4400" dirty="0" err="1" smtClean="0">
-                <a:solidFill>
-                  <a:srgbClr val="00568A"/>
-                </a:solidFill>
-              </a:rPr>
-              <a:t>District</a:t>
+              <a:t>distribution</a:t>
             </a:r>
             <a:endParaRPr lang="pt-PT" sz="4400" dirty="0">
               <a:solidFill>
@@ -4888,7 +5198,7 @@
       </p:sp>
       <p:pic>
         <p:nvPicPr>
-          <p:cNvPr id="7" name="Imagem 6"/>
+          <p:cNvPr id="8" name="Imagem 7"/>
           <p:cNvPicPr>
             <a:picLocks noChangeAspect="1"/>
           </p:cNvPicPr>
@@ -4908,8 +5218,8 @@
         </p:blipFill>
         <p:spPr>
           <a:xfrm>
-            <a:off x="2755184" y="1579418"/>
-            <a:ext cx="6681631" cy="5163078"/>
+            <a:off x="2679700" y="1578264"/>
+            <a:ext cx="6832599" cy="5279736"/>
           </a:xfrm>
           <a:prstGeom prst="rect">
             <a:avLst/>
@@ -5030,6 +5340,234 @@
         <p:spPr>
           <a:xfrm>
             <a:off x="2137893" y="456504"/>
+            <a:ext cx="6212278" cy="769441"/>
+          </a:xfrm>
+          <a:prstGeom prst="rect">
+            <a:avLst/>
+          </a:prstGeom>
+          <a:noFill/>
+        </p:spPr>
+        <p:txBody>
+          <a:bodyPr wrap="none" rtlCol="0">
+            <a:spAutoFit/>
+          </a:bodyPr>
+          <a:lstStyle/>
+          <a:p>
+            <a:r>
+              <a:rPr lang="pt-PT" sz="4400" dirty="0" err="1" smtClean="0">
+                <a:solidFill>
+                  <a:srgbClr val="00568A"/>
+                </a:solidFill>
+              </a:rPr>
+              <a:t>Average</a:t>
+            </a:r>
+            <a:r>
+              <a:rPr lang="pt-PT" sz="4400" dirty="0" smtClean="0">
+                <a:solidFill>
+                  <a:srgbClr val="00568A"/>
+                </a:solidFill>
+              </a:rPr>
+              <a:t> </a:t>
+            </a:r>
+            <a:r>
+              <a:rPr lang="pt-PT" sz="4400" dirty="0" err="1" smtClean="0">
+                <a:solidFill>
+                  <a:srgbClr val="00568A"/>
+                </a:solidFill>
+              </a:rPr>
+              <a:t>Salary</a:t>
+            </a:r>
+            <a:r>
+              <a:rPr lang="pt-PT" sz="4400" dirty="0" smtClean="0">
+                <a:solidFill>
+                  <a:srgbClr val="00568A"/>
+                </a:solidFill>
+              </a:rPr>
+              <a:t> per </a:t>
+            </a:r>
+            <a:r>
+              <a:rPr lang="pt-PT" sz="4400" dirty="0" err="1" smtClean="0">
+                <a:solidFill>
+                  <a:srgbClr val="00568A"/>
+                </a:solidFill>
+              </a:rPr>
+              <a:t>District</a:t>
+            </a:r>
+            <a:endParaRPr lang="pt-PT" sz="4400" dirty="0">
+              <a:solidFill>
+                <a:srgbClr val="00568A"/>
+              </a:solidFill>
+            </a:endParaRPr>
+          </a:p>
+        </p:txBody>
+      </p:sp>
+      <p:sp>
+        <p:nvSpPr>
+          <p:cNvPr id="4" name="Marcador de Posição do Número do Diapositivo 3"/>
+          <p:cNvSpPr>
+            <a:spLocks noGrp="1"/>
+          </p:cNvSpPr>
+          <p:nvPr>
+            <p:ph type="sldNum" sz="quarter" idx="12"/>
+          </p:nvPr>
+        </p:nvSpPr>
+        <p:spPr/>
+        <p:txBody>
+          <a:bodyPr/>
+          <a:lstStyle/>
+          <a:p>
+            <a:fld id="{5683189C-B5E2-F345-AC06-1CEB972D3557}" type="slidenum">
+              <a:rPr lang="pt-PT" smtClean="0"/>
+              <a:t>4</a:t>
+            </a:fld>
+            <a:endParaRPr lang="pt-PT"/>
+          </a:p>
+        </p:txBody>
+      </p:sp>
+      <p:pic>
+        <p:nvPicPr>
+          <p:cNvPr id="7" name="Imagem 6"/>
+          <p:cNvPicPr>
+            <a:picLocks noChangeAspect="1"/>
+          </p:cNvPicPr>
+          <p:nvPr/>
+        </p:nvPicPr>
+        <p:blipFill>
+          <a:blip r:embed="rId3">
+            <a:extLst>
+              <a:ext uri="{28A0092B-C50C-407E-A947-70E740481C1C}">
+                <a14:useLocalDpi xmlns:a14="http://schemas.microsoft.com/office/drawing/2010/main" val="0"/>
+              </a:ext>
+            </a:extLst>
+          </a:blip>
+          <a:stretch>
+            <a:fillRect/>
+          </a:stretch>
+        </p:blipFill>
+        <p:spPr>
+          <a:xfrm>
+            <a:off x="2755184" y="1579418"/>
+            <a:ext cx="6681631" cy="5163078"/>
+          </a:xfrm>
+          <a:prstGeom prst="rect">
+            <a:avLst/>
+          </a:prstGeom>
+        </p:spPr>
+      </p:pic>
+    </p:spTree>
+    <p:extLst>
+      <p:ext uri="{BB962C8B-B14F-4D97-AF65-F5344CB8AC3E}">
+        <p14:creationId xmlns:p14="http://schemas.microsoft.com/office/powerpoint/2010/main" val="1352750313"/>
+      </p:ext>
+    </p:extLst>
+  </p:cSld>
+  <p:clrMapOvr>
+    <a:masterClrMapping/>
+  </p:clrMapOvr>
+  <p:timing>
+    <p:tnLst>
+      <p:par>
+        <p:cTn id="1" dur="indefinite" restart="never" nodeType="tmRoot"/>
+      </p:par>
+    </p:tnLst>
+  </p:timing>
+</p:sld>
+</file>
+
+<file path=ppt/slides/slide5.xml><?xml version="1.0" encoding="utf-8"?>
+<p:sld xmlns:a="http://schemas.openxmlformats.org/drawingml/2006/main" xmlns:r="http://schemas.openxmlformats.org/officeDocument/2006/relationships" xmlns:p="http://schemas.openxmlformats.org/presentationml/2006/main">
+  <p:cSld>
+    <p:spTree>
+      <p:nvGrpSpPr>
+        <p:cNvPr id="1" name=""/>
+        <p:cNvGrpSpPr/>
+        <p:nvPr/>
+      </p:nvGrpSpPr>
+      <p:grpSpPr>
+        <a:xfrm>
+          <a:off x="0" y="0"/>
+          <a:ext cx="0" cy="0"/>
+          <a:chOff x="0" y="0"/>
+          <a:chExt cx="0" cy="0"/>
+        </a:xfrm>
+      </p:grpSpPr>
+      <p:sp>
+        <p:nvSpPr>
+          <p:cNvPr id="2" name="CaixaDeTexto 1"/>
+          <p:cNvSpPr txBox="1"/>
+          <p:nvPr/>
+        </p:nvSpPr>
+        <p:spPr>
+          <a:xfrm>
+            <a:off x="0" y="0"/>
+            <a:ext cx="12192000" cy="1579418"/>
+          </a:xfrm>
+          <a:prstGeom prst="rect">
+            <a:avLst/>
+          </a:prstGeom>
+          <a:solidFill>
+            <a:schemeClr val="bg1">
+              <a:lumMod val="95000"/>
+            </a:schemeClr>
+          </a:solidFill>
+        </p:spPr>
+        <p:txBody>
+          <a:bodyPr wrap="square" rtlCol="0">
+            <a:spAutoFit/>
+          </a:bodyPr>
+          <a:lstStyle/>
+          <a:p>
+            <a:endParaRPr lang="pt-PT" dirty="0"/>
+          </a:p>
+        </p:txBody>
+      </p:sp>
+      <p:sp>
+        <p:nvSpPr>
+          <p:cNvPr id="3" name="CaixaDeTexto 2"/>
+          <p:cNvSpPr txBox="1"/>
+          <p:nvPr/>
+        </p:nvSpPr>
+        <p:spPr>
+          <a:xfrm>
+            <a:off x="623455" y="346365"/>
+            <a:ext cx="1668984" cy="923330"/>
+          </a:xfrm>
+          <a:prstGeom prst="rect">
+            <a:avLst/>
+          </a:prstGeom>
+          <a:noFill/>
+        </p:spPr>
+        <p:txBody>
+          <a:bodyPr wrap="square" rtlCol="0">
+            <a:spAutoFit/>
+          </a:bodyPr>
+          <a:lstStyle/>
+          <a:p>
+            <a:r>
+              <a:rPr lang="pt-PT" sz="5400" dirty="0" smtClean="0">
+                <a:solidFill>
+                  <a:srgbClr val="B9122B"/>
+                </a:solidFill>
+              </a:rPr>
+              <a:t>#DM</a:t>
+            </a:r>
+            <a:endParaRPr lang="pt-PT" sz="5400" dirty="0">
+              <a:solidFill>
+                <a:srgbClr val="B9122B"/>
+              </a:solidFill>
+            </a:endParaRPr>
+          </a:p>
+        </p:txBody>
+      </p:sp>
+      <p:sp>
+        <p:nvSpPr>
+          <p:cNvPr id="5" name="CaixaDeTexto 4"/>
+          <p:cNvSpPr txBox="1"/>
+          <p:nvPr/>
+        </p:nvSpPr>
+        <p:spPr>
+          <a:xfrm>
+            <a:off x="2137893" y="456504"/>
             <a:ext cx="8434553" cy="769441"/>
           </a:xfrm>
           <a:prstGeom prst="rect">
@@ -5124,7 +5662,7 @@
           <a:p>
             <a:fld id="{5683189C-B5E2-F345-AC06-1CEB972D3557}" type="slidenum">
               <a:rPr lang="pt-PT" smtClean="0"/>
-              <a:t>4</a:t>
+              <a:t>5</a:t>
             </a:fld>
             <a:endParaRPr lang="pt-PT"/>
           </a:p>
@@ -5168,7 +5706,7 @@
           </p:cNvPicPr>
           <p:nvPr/>
         </p:nvPicPr>
-        <p:blipFill>
+        <p:blipFill rotWithShape="1">
           <a:blip r:embed="rId4">
             <a:extLst>
               <a:ext uri="{28A0092B-C50C-407E-A947-70E740481C1C}">
@@ -5176,14 +5714,13 @@
               </a:ext>
             </a:extLst>
           </a:blip>
-          <a:stretch>
-            <a:fillRect/>
-          </a:stretch>
+          <a:srcRect r="1121"/>
+          <a:stretch/>
         </p:blipFill>
         <p:spPr>
           <a:xfrm>
             <a:off x="6096000" y="1797580"/>
-            <a:ext cx="6165134" cy="4763967"/>
+            <a:ext cx="6096000" cy="4763967"/>
           </a:xfrm>
           <a:prstGeom prst="rect">
             <a:avLst/>
@@ -5210,7 +5747,7 @@
 </p:sld>
 </file>
 
-<file path=ppt/slides/slide5.xml><?xml version="1.0" encoding="utf-8"?>
+<file path=ppt/slides/slide6.xml><?xml version="1.0" encoding="utf-8"?>
 <p:sld xmlns:a="http://schemas.openxmlformats.org/drawingml/2006/main" xmlns:r="http://schemas.openxmlformats.org/officeDocument/2006/relationships" xmlns:p="http://schemas.openxmlformats.org/presentationml/2006/main">
   <p:cSld>
     <p:spTree>
@@ -5304,6 +5841,233 @@
         <p:spPr>
           <a:xfrm>
             <a:off x="2137893" y="456504"/>
+            <a:ext cx="5705729" cy="769441"/>
+          </a:xfrm>
+          <a:prstGeom prst="rect">
+            <a:avLst/>
+          </a:prstGeom>
+          <a:noFill/>
+        </p:spPr>
+        <p:txBody>
+          <a:bodyPr wrap="none" rtlCol="0">
+            <a:spAutoFit/>
+          </a:bodyPr>
+          <a:lstStyle/>
+          <a:p>
+            <a:r>
+              <a:rPr lang="pt-PT" sz="4400" dirty="0" err="1" smtClean="0">
+                <a:solidFill>
+                  <a:srgbClr val="00568A"/>
+                </a:solidFill>
+              </a:rPr>
+              <a:t>Credit</a:t>
+            </a:r>
+            <a:r>
+              <a:rPr lang="pt-PT" sz="4400" dirty="0" smtClean="0">
+                <a:solidFill>
+                  <a:srgbClr val="00568A"/>
+                </a:solidFill>
+              </a:rPr>
+              <a:t> </a:t>
+            </a:r>
+            <a:r>
+              <a:rPr lang="pt-PT" sz="4400" dirty="0" err="1" smtClean="0">
+                <a:solidFill>
+                  <a:srgbClr val="00568A"/>
+                </a:solidFill>
+              </a:rPr>
+              <a:t>cards</a:t>
+            </a:r>
+            <a:r>
+              <a:rPr lang="pt-PT" sz="4400" dirty="0" smtClean="0">
+                <a:solidFill>
+                  <a:srgbClr val="00568A"/>
+                </a:solidFill>
+              </a:rPr>
+              <a:t> </a:t>
+            </a:r>
+            <a:r>
+              <a:rPr lang="pt-PT" sz="4400" dirty="0" err="1" smtClean="0">
+                <a:solidFill>
+                  <a:srgbClr val="00568A"/>
+                </a:solidFill>
+              </a:rPr>
+              <a:t>distribution</a:t>
+            </a:r>
+            <a:endParaRPr lang="pt-PT" sz="4400" dirty="0">
+              <a:solidFill>
+                <a:srgbClr val="00568A"/>
+              </a:solidFill>
+            </a:endParaRPr>
+          </a:p>
+        </p:txBody>
+      </p:sp>
+      <p:sp>
+        <p:nvSpPr>
+          <p:cNvPr id="4" name="Marcador de Posição do Número do Diapositivo 3"/>
+          <p:cNvSpPr>
+            <a:spLocks noGrp="1"/>
+          </p:cNvSpPr>
+          <p:nvPr>
+            <p:ph type="sldNum" sz="quarter" idx="12"/>
+          </p:nvPr>
+        </p:nvSpPr>
+        <p:spPr/>
+        <p:txBody>
+          <a:bodyPr/>
+          <a:lstStyle/>
+          <a:p>
+            <a:fld id="{5683189C-B5E2-F345-AC06-1CEB972D3557}" type="slidenum">
+              <a:rPr lang="pt-PT" smtClean="0"/>
+              <a:t>6</a:t>
+            </a:fld>
+            <a:endParaRPr lang="pt-PT"/>
+          </a:p>
+        </p:txBody>
+      </p:sp>
+      <p:pic>
+        <p:nvPicPr>
+          <p:cNvPr id="6" name="Imagem 5"/>
+          <p:cNvPicPr>
+            <a:picLocks noChangeAspect="1"/>
+          </p:cNvPicPr>
+          <p:nvPr/>
+        </p:nvPicPr>
+        <p:blipFill rotWithShape="1">
+          <a:blip r:embed="rId3">
+            <a:extLst>
+              <a:ext uri="{28A0092B-C50C-407E-A947-70E740481C1C}">
+                <a14:useLocalDpi xmlns:a14="http://schemas.microsoft.com/office/drawing/2010/main" val="0"/>
+              </a:ext>
+            </a:extLst>
+          </a:blip>
+          <a:srcRect b="24696"/>
+          <a:stretch/>
+        </p:blipFill>
+        <p:spPr>
+          <a:xfrm>
+            <a:off x="1990388" y="1578264"/>
+            <a:ext cx="8211224" cy="4778086"/>
+          </a:xfrm>
+          <a:prstGeom prst="rect">
+            <a:avLst/>
+          </a:prstGeom>
+        </p:spPr>
+      </p:pic>
+    </p:spTree>
+    <p:extLst>
+      <p:ext uri="{BB962C8B-B14F-4D97-AF65-F5344CB8AC3E}">
+        <p14:creationId xmlns:p14="http://schemas.microsoft.com/office/powerpoint/2010/main" val="1470750963"/>
+      </p:ext>
+    </p:extLst>
+  </p:cSld>
+  <p:clrMapOvr>
+    <a:masterClrMapping/>
+  </p:clrMapOvr>
+  <p:timing>
+    <p:tnLst>
+      <p:par>
+        <p:cTn id="1" dur="indefinite" restart="never" nodeType="tmRoot"/>
+      </p:par>
+    </p:tnLst>
+  </p:timing>
+</p:sld>
+</file>
+
+<file path=ppt/slides/slide7.xml><?xml version="1.0" encoding="utf-8"?>
+<p:sld xmlns:a="http://schemas.openxmlformats.org/drawingml/2006/main" xmlns:r="http://schemas.openxmlformats.org/officeDocument/2006/relationships" xmlns:p="http://schemas.openxmlformats.org/presentationml/2006/main">
+  <p:cSld>
+    <p:spTree>
+      <p:nvGrpSpPr>
+        <p:cNvPr id="1" name=""/>
+        <p:cNvGrpSpPr/>
+        <p:nvPr/>
+      </p:nvGrpSpPr>
+      <p:grpSpPr>
+        <a:xfrm>
+          <a:off x="0" y="0"/>
+          <a:ext cx="0" cy="0"/>
+          <a:chOff x="0" y="0"/>
+          <a:chExt cx="0" cy="0"/>
+        </a:xfrm>
+      </p:grpSpPr>
+      <p:sp>
+        <p:nvSpPr>
+          <p:cNvPr id="2" name="CaixaDeTexto 1"/>
+          <p:cNvSpPr txBox="1"/>
+          <p:nvPr/>
+        </p:nvSpPr>
+        <p:spPr>
+          <a:xfrm>
+            <a:off x="0" y="0"/>
+            <a:ext cx="12192000" cy="1579418"/>
+          </a:xfrm>
+          <a:prstGeom prst="rect">
+            <a:avLst/>
+          </a:prstGeom>
+          <a:solidFill>
+            <a:schemeClr val="bg1">
+              <a:lumMod val="95000"/>
+            </a:schemeClr>
+          </a:solidFill>
+        </p:spPr>
+        <p:txBody>
+          <a:bodyPr wrap="square" rtlCol="0">
+            <a:spAutoFit/>
+          </a:bodyPr>
+          <a:lstStyle/>
+          <a:p>
+            <a:endParaRPr lang="pt-PT" dirty="0"/>
+          </a:p>
+        </p:txBody>
+      </p:sp>
+      <p:sp>
+        <p:nvSpPr>
+          <p:cNvPr id="3" name="CaixaDeTexto 2"/>
+          <p:cNvSpPr txBox="1"/>
+          <p:nvPr/>
+        </p:nvSpPr>
+        <p:spPr>
+          <a:xfrm>
+            <a:off x="623455" y="346365"/>
+            <a:ext cx="1668984" cy="923330"/>
+          </a:xfrm>
+          <a:prstGeom prst="rect">
+            <a:avLst/>
+          </a:prstGeom>
+          <a:noFill/>
+        </p:spPr>
+        <p:txBody>
+          <a:bodyPr wrap="square" rtlCol="0">
+            <a:spAutoFit/>
+          </a:bodyPr>
+          <a:lstStyle/>
+          <a:p>
+            <a:r>
+              <a:rPr lang="pt-PT" sz="5400" dirty="0" smtClean="0">
+                <a:solidFill>
+                  <a:srgbClr val="B9122B"/>
+                </a:solidFill>
+              </a:rPr>
+              <a:t>#DM</a:t>
+            </a:r>
+            <a:endParaRPr lang="pt-PT" sz="5400" dirty="0">
+              <a:solidFill>
+                <a:srgbClr val="B9122B"/>
+              </a:solidFill>
+            </a:endParaRPr>
+          </a:p>
+        </p:txBody>
+      </p:sp>
+      <p:sp>
+        <p:nvSpPr>
+          <p:cNvPr id="5" name="CaixaDeTexto 4"/>
+          <p:cNvSpPr txBox="1"/>
+          <p:nvPr/>
+        </p:nvSpPr>
+        <p:spPr>
+          <a:xfrm>
+            <a:off x="2137893" y="456504"/>
             <a:ext cx="4326569" cy="769441"/>
           </a:xfrm>
           <a:prstGeom prst="rect">
@@ -5366,7 +6130,7 @@
           <a:p>
             <a:fld id="{5683189C-B5E2-F345-AC06-1CEB972D3557}" type="slidenum">
               <a:rPr lang="pt-PT" smtClean="0"/>
-              <a:t>5</a:t>
+              <a:t>7</a:t>
             </a:fld>
             <a:endParaRPr lang="pt-PT"/>
           </a:p>
@@ -5422,7 +6186,7 @@
 </p:sld>
 </file>
 
-<file path=ppt/slides/slide6.xml><?xml version="1.0" encoding="utf-8"?>
+<file path=ppt/slides/slide8.xml><?xml version="1.0" encoding="utf-8"?>
 <p:sld xmlns:a="http://schemas.openxmlformats.org/drawingml/2006/main" xmlns:r="http://schemas.openxmlformats.org/officeDocument/2006/relationships" xmlns:p="http://schemas.openxmlformats.org/presentationml/2006/main">
   <p:cSld>
     <p:spTree>
@@ -5594,7 +6358,7 @@
           <a:p>
             <a:fld id="{5683189C-B5E2-F345-AC06-1CEB972D3557}" type="slidenum">
               <a:rPr lang="pt-PT" smtClean="0"/>
-              <a:t>6</a:t>
+              <a:t>8</a:t>
             </a:fld>
             <a:endParaRPr lang="pt-PT"/>
           </a:p>
@@ -5649,7 +6413,7 @@
 </p:sld>
 </file>
 
-<file path=ppt/slides/slide7.xml><?xml version="1.0" encoding="utf-8"?>
+<file path=ppt/slides/slide9.xml><?xml version="1.0" encoding="utf-8"?>
 <p:sld xmlns:a="http://schemas.openxmlformats.org/drawingml/2006/main" xmlns:r="http://schemas.openxmlformats.org/officeDocument/2006/relationships" xmlns:p="http://schemas.openxmlformats.org/presentationml/2006/main">
   <p:cSld>
     <p:spTree>
@@ -5821,7 +6585,7 @@
           <a:p>
             <a:fld id="{5683189C-B5E2-F345-AC06-1CEB972D3557}" type="slidenum">
               <a:rPr lang="pt-PT" smtClean="0"/>
-              <a:t>7</a:t>
+              <a:t>9</a:t>
             </a:fld>
             <a:endParaRPr lang="pt-PT"/>
           </a:p>

</xml_diff>

<commit_message>
Added more slides (only the title)
- Added Predictive data analysis
- Added Limitations and Future Work slide
- Added Conclusions slide
- Added Annexes slide
</commit_message>
<xml_diff>
--- a/presentation/presentation.pptx
+++ b/presentation/presentation.pptx
@@ -5,7 +5,7 @@
     <p:sldMasterId id="2147483648" r:id="rId1"/>
   </p:sldMasterIdLst>
   <p:notesMasterIdLst>
-    <p:notesMasterId r:id="rId17"/>
+    <p:notesMasterId r:id="rId21"/>
   </p:notesMasterIdLst>
   <p:sldIdLst>
     <p:sldId id="257" r:id="rId2"/>
@@ -23,6 +23,10 @@
     <p:sldId id="261" r:id="rId14"/>
     <p:sldId id="262" r:id="rId15"/>
     <p:sldId id="263" r:id="rId16"/>
+    <p:sldId id="274" r:id="rId17"/>
+    <p:sldId id="276" r:id="rId18"/>
+    <p:sldId id="277" r:id="rId19"/>
+    <p:sldId id="275" r:id="rId20"/>
   </p:sldIdLst>
   <p:sldSz cx="12192000" cy="6858000"/>
   <p:notesSz cx="6858000" cy="9144000"/>
@@ -1442,6 +1446,654 @@
     <p:extLst>
       <p:ext uri="{BB962C8B-B14F-4D97-AF65-F5344CB8AC3E}">
         <p14:creationId xmlns:p14="http://schemas.microsoft.com/office/powerpoint/2010/main" val="1247212023"/>
+      </p:ext>
+    </p:extLst>
+  </p:cSld>
+  <p:clrMapOvr>
+    <a:masterClrMapping/>
+  </p:clrMapOvr>
+</p:notes>
+</file>
+
+<file path=ppt/notesSlides/notesSlide15.xml><?xml version="1.0" encoding="utf-8"?>
+<p:notes xmlns:a="http://schemas.openxmlformats.org/drawingml/2006/main" xmlns:r="http://schemas.openxmlformats.org/officeDocument/2006/relationships" xmlns:p="http://schemas.openxmlformats.org/presentationml/2006/main">
+  <p:cSld>
+    <p:spTree>
+      <p:nvGrpSpPr>
+        <p:cNvPr id="1" name=""/>
+        <p:cNvGrpSpPr/>
+        <p:nvPr/>
+      </p:nvGrpSpPr>
+      <p:grpSpPr>
+        <a:xfrm>
+          <a:off x="0" y="0"/>
+          <a:ext cx="0" cy="0"/>
+          <a:chOff x="0" y="0"/>
+          <a:chExt cx="0" cy="0"/>
+        </a:xfrm>
+      </p:grpSpPr>
+      <p:sp>
+        <p:nvSpPr>
+          <p:cNvPr id="2" name="Marcador de Posição da Imagem do Diapositivo 1"/>
+          <p:cNvSpPr>
+            <a:spLocks noGrp="1" noRot="1" noChangeAspect="1"/>
+          </p:cNvSpPr>
+          <p:nvPr>
+            <p:ph type="sldImg"/>
+          </p:nvPr>
+        </p:nvSpPr>
+        <p:spPr/>
+      </p:sp>
+      <p:sp>
+        <p:nvSpPr>
+          <p:cNvPr id="3" name="Marcador de Posição de Notas 2"/>
+          <p:cNvSpPr>
+            <a:spLocks noGrp="1"/>
+          </p:cNvSpPr>
+          <p:nvPr>
+            <p:ph type="body" idx="1"/>
+          </p:nvPr>
+        </p:nvSpPr>
+        <p:spPr/>
+        <p:txBody>
+          <a:bodyPr/>
+          <a:lstStyle/>
+          <a:p>
+            <a:r>
+              <a:rPr lang="pt-PT" dirty="0" err="1" smtClean="0"/>
+              <a:t>Health</a:t>
+            </a:r>
+            <a:r>
+              <a:rPr lang="pt-PT" dirty="0" smtClean="0"/>
+              <a:t> </a:t>
+            </a:r>
+            <a:r>
+              <a:rPr lang="pt-PT" dirty="0" err="1" smtClean="0"/>
+              <a:t>Problems</a:t>
+            </a:r>
+            <a:r>
+              <a:rPr lang="pt-PT" dirty="0" smtClean="0"/>
+              <a:t> (stress, </a:t>
+            </a:r>
+            <a:r>
+              <a:rPr lang="pt-PT" dirty="0" err="1" smtClean="0"/>
+              <a:t>pollution</a:t>
+            </a:r>
+            <a:r>
+              <a:rPr lang="pt-PT" dirty="0" smtClean="0"/>
+              <a:t>,</a:t>
+            </a:r>
+            <a:r>
+              <a:rPr lang="pt-PT" baseline="0" dirty="0" smtClean="0"/>
+              <a:t> etc.) -&gt; </a:t>
+            </a:r>
+            <a:r>
+              <a:rPr lang="pt-PT" baseline="0" dirty="0" err="1" smtClean="0"/>
+              <a:t>related</a:t>
+            </a:r>
+            <a:r>
+              <a:rPr lang="pt-PT" baseline="0" dirty="0" smtClean="0"/>
+              <a:t> </a:t>
+            </a:r>
+            <a:r>
+              <a:rPr lang="pt-PT" baseline="0" dirty="0" err="1" smtClean="0"/>
+              <a:t>with</a:t>
+            </a:r>
+            <a:r>
+              <a:rPr lang="pt-PT" baseline="0" dirty="0" smtClean="0"/>
+              <a:t> </a:t>
+            </a:r>
+            <a:r>
+              <a:rPr lang="pt-PT" baseline="0" dirty="0" err="1" smtClean="0"/>
+              <a:t>environment</a:t>
+            </a:r>
+            <a:endParaRPr lang="pt-PT" dirty="0" smtClean="0"/>
+          </a:p>
+          <a:p>
+            <a:r>
+              <a:rPr lang="pt-PT" dirty="0" err="1" smtClean="0"/>
+              <a:t>Economic</a:t>
+            </a:r>
+            <a:r>
+              <a:rPr lang="pt-PT" baseline="0" dirty="0" smtClean="0"/>
+              <a:t> </a:t>
+            </a:r>
+            <a:r>
+              <a:rPr lang="pt-PT" baseline="0" dirty="0" err="1" smtClean="0"/>
+              <a:t>impact</a:t>
+            </a:r>
+            <a:endParaRPr lang="pt-PT" baseline="0" dirty="0" smtClean="0"/>
+          </a:p>
+          <a:p>
+            <a:r>
+              <a:rPr lang="pt-PT" baseline="0" dirty="0" err="1" smtClean="0"/>
+              <a:t>Environmental</a:t>
+            </a:r>
+            <a:r>
+              <a:rPr lang="pt-PT" baseline="0" dirty="0" smtClean="0"/>
+              <a:t> </a:t>
+            </a:r>
+            <a:r>
+              <a:rPr lang="pt-PT" baseline="0" dirty="0" err="1" smtClean="0"/>
+              <a:t>impact</a:t>
+            </a:r>
+            <a:endParaRPr lang="pt-PT" dirty="0"/>
+          </a:p>
+        </p:txBody>
+      </p:sp>
+      <p:sp>
+        <p:nvSpPr>
+          <p:cNvPr id="4" name="Marcador de Posição do Número do Diapositivo 3"/>
+          <p:cNvSpPr>
+            <a:spLocks noGrp="1"/>
+          </p:cNvSpPr>
+          <p:nvPr>
+            <p:ph type="sldNum" sz="quarter" idx="10"/>
+          </p:nvPr>
+        </p:nvSpPr>
+        <p:spPr/>
+        <p:txBody>
+          <a:bodyPr/>
+          <a:lstStyle/>
+          <a:p>
+            <a:fld id="{3AC54132-D928-D54C-ABBE-ACE1209FEA7D}" type="slidenum">
+              <a:rPr lang="pt-PT" smtClean="0"/>
+              <a:t>16</a:t>
+            </a:fld>
+            <a:endParaRPr lang="pt-PT"/>
+          </a:p>
+        </p:txBody>
+      </p:sp>
+    </p:spTree>
+    <p:extLst>
+      <p:ext uri="{BB962C8B-B14F-4D97-AF65-F5344CB8AC3E}">
+        <p14:creationId xmlns:p14="http://schemas.microsoft.com/office/powerpoint/2010/main" val="1982784614"/>
+      </p:ext>
+    </p:extLst>
+  </p:cSld>
+  <p:clrMapOvr>
+    <a:masterClrMapping/>
+  </p:clrMapOvr>
+</p:notes>
+</file>
+
+<file path=ppt/notesSlides/notesSlide16.xml><?xml version="1.0" encoding="utf-8"?>
+<p:notes xmlns:a="http://schemas.openxmlformats.org/drawingml/2006/main" xmlns:r="http://schemas.openxmlformats.org/officeDocument/2006/relationships" xmlns:p="http://schemas.openxmlformats.org/presentationml/2006/main">
+  <p:cSld>
+    <p:spTree>
+      <p:nvGrpSpPr>
+        <p:cNvPr id="1" name=""/>
+        <p:cNvGrpSpPr/>
+        <p:nvPr/>
+      </p:nvGrpSpPr>
+      <p:grpSpPr>
+        <a:xfrm>
+          <a:off x="0" y="0"/>
+          <a:ext cx="0" cy="0"/>
+          <a:chOff x="0" y="0"/>
+          <a:chExt cx="0" cy="0"/>
+        </a:xfrm>
+      </p:grpSpPr>
+      <p:sp>
+        <p:nvSpPr>
+          <p:cNvPr id="2" name="Marcador de Posição da Imagem do Diapositivo 1"/>
+          <p:cNvSpPr>
+            <a:spLocks noGrp="1" noRot="1" noChangeAspect="1"/>
+          </p:cNvSpPr>
+          <p:nvPr>
+            <p:ph type="sldImg"/>
+          </p:nvPr>
+        </p:nvSpPr>
+        <p:spPr/>
+      </p:sp>
+      <p:sp>
+        <p:nvSpPr>
+          <p:cNvPr id="3" name="Marcador de Posição de Notas 2"/>
+          <p:cNvSpPr>
+            <a:spLocks noGrp="1"/>
+          </p:cNvSpPr>
+          <p:nvPr>
+            <p:ph type="body" idx="1"/>
+          </p:nvPr>
+        </p:nvSpPr>
+        <p:spPr/>
+        <p:txBody>
+          <a:bodyPr/>
+          <a:lstStyle/>
+          <a:p>
+            <a:r>
+              <a:rPr lang="pt-PT" dirty="0" err="1" smtClean="0"/>
+              <a:t>Health</a:t>
+            </a:r>
+            <a:r>
+              <a:rPr lang="pt-PT" dirty="0" smtClean="0"/>
+              <a:t> </a:t>
+            </a:r>
+            <a:r>
+              <a:rPr lang="pt-PT" dirty="0" err="1" smtClean="0"/>
+              <a:t>Problems</a:t>
+            </a:r>
+            <a:r>
+              <a:rPr lang="pt-PT" dirty="0" smtClean="0"/>
+              <a:t> (stress, </a:t>
+            </a:r>
+            <a:r>
+              <a:rPr lang="pt-PT" dirty="0" err="1" smtClean="0"/>
+              <a:t>pollution</a:t>
+            </a:r>
+            <a:r>
+              <a:rPr lang="pt-PT" dirty="0" smtClean="0"/>
+              <a:t>,</a:t>
+            </a:r>
+            <a:r>
+              <a:rPr lang="pt-PT" baseline="0" dirty="0" smtClean="0"/>
+              <a:t> etc.) -&gt; </a:t>
+            </a:r>
+            <a:r>
+              <a:rPr lang="pt-PT" baseline="0" dirty="0" err="1" smtClean="0"/>
+              <a:t>related</a:t>
+            </a:r>
+            <a:r>
+              <a:rPr lang="pt-PT" baseline="0" dirty="0" smtClean="0"/>
+              <a:t> </a:t>
+            </a:r>
+            <a:r>
+              <a:rPr lang="pt-PT" baseline="0" dirty="0" err="1" smtClean="0"/>
+              <a:t>with</a:t>
+            </a:r>
+            <a:r>
+              <a:rPr lang="pt-PT" baseline="0" dirty="0" smtClean="0"/>
+              <a:t> </a:t>
+            </a:r>
+            <a:r>
+              <a:rPr lang="pt-PT" baseline="0" dirty="0" err="1" smtClean="0"/>
+              <a:t>environment</a:t>
+            </a:r>
+            <a:endParaRPr lang="pt-PT" dirty="0" smtClean="0"/>
+          </a:p>
+          <a:p>
+            <a:r>
+              <a:rPr lang="pt-PT" dirty="0" err="1" smtClean="0"/>
+              <a:t>Economic</a:t>
+            </a:r>
+            <a:r>
+              <a:rPr lang="pt-PT" baseline="0" dirty="0" smtClean="0"/>
+              <a:t> </a:t>
+            </a:r>
+            <a:r>
+              <a:rPr lang="pt-PT" baseline="0" dirty="0" err="1" smtClean="0"/>
+              <a:t>impact</a:t>
+            </a:r>
+            <a:endParaRPr lang="pt-PT" baseline="0" dirty="0" smtClean="0"/>
+          </a:p>
+          <a:p>
+            <a:r>
+              <a:rPr lang="pt-PT" baseline="0" dirty="0" err="1" smtClean="0"/>
+              <a:t>Environmental</a:t>
+            </a:r>
+            <a:r>
+              <a:rPr lang="pt-PT" baseline="0" dirty="0" smtClean="0"/>
+              <a:t> </a:t>
+            </a:r>
+            <a:r>
+              <a:rPr lang="pt-PT" baseline="0" dirty="0" err="1" smtClean="0"/>
+              <a:t>impact</a:t>
+            </a:r>
+            <a:endParaRPr lang="pt-PT" dirty="0"/>
+          </a:p>
+        </p:txBody>
+      </p:sp>
+      <p:sp>
+        <p:nvSpPr>
+          <p:cNvPr id="4" name="Marcador de Posição do Número do Diapositivo 3"/>
+          <p:cNvSpPr>
+            <a:spLocks noGrp="1"/>
+          </p:cNvSpPr>
+          <p:nvPr>
+            <p:ph type="sldNum" sz="quarter" idx="10"/>
+          </p:nvPr>
+        </p:nvSpPr>
+        <p:spPr/>
+        <p:txBody>
+          <a:bodyPr/>
+          <a:lstStyle/>
+          <a:p>
+            <a:fld id="{3AC54132-D928-D54C-ABBE-ACE1209FEA7D}" type="slidenum">
+              <a:rPr lang="pt-PT" smtClean="0"/>
+              <a:t>17</a:t>
+            </a:fld>
+            <a:endParaRPr lang="pt-PT"/>
+          </a:p>
+        </p:txBody>
+      </p:sp>
+    </p:spTree>
+    <p:extLst>
+      <p:ext uri="{BB962C8B-B14F-4D97-AF65-F5344CB8AC3E}">
+        <p14:creationId xmlns:p14="http://schemas.microsoft.com/office/powerpoint/2010/main" val="610406970"/>
+      </p:ext>
+    </p:extLst>
+  </p:cSld>
+  <p:clrMapOvr>
+    <a:masterClrMapping/>
+  </p:clrMapOvr>
+</p:notes>
+</file>
+
+<file path=ppt/notesSlides/notesSlide17.xml><?xml version="1.0" encoding="utf-8"?>
+<p:notes xmlns:a="http://schemas.openxmlformats.org/drawingml/2006/main" xmlns:r="http://schemas.openxmlformats.org/officeDocument/2006/relationships" xmlns:p="http://schemas.openxmlformats.org/presentationml/2006/main">
+  <p:cSld>
+    <p:spTree>
+      <p:nvGrpSpPr>
+        <p:cNvPr id="1" name=""/>
+        <p:cNvGrpSpPr/>
+        <p:nvPr/>
+      </p:nvGrpSpPr>
+      <p:grpSpPr>
+        <a:xfrm>
+          <a:off x="0" y="0"/>
+          <a:ext cx="0" cy="0"/>
+          <a:chOff x="0" y="0"/>
+          <a:chExt cx="0" cy="0"/>
+        </a:xfrm>
+      </p:grpSpPr>
+      <p:sp>
+        <p:nvSpPr>
+          <p:cNvPr id="2" name="Marcador de Posição da Imagem do Diapositivo 1"/>
+          <p:cNvSpPr>
+            <a:spLocks noGrp="1" noRot="1" noChangeAspect="1"/>
+          </p:cNvSpPr>
+          <p:nvPr>
+            <p:ph type="sldImg"/>
+          </p:nvPr>
+        </p:nvSpPr>
+        <p:spPr/>
+      </p:sp>
+      <p:sp>
+        <p:nvSpPr>
+          <p:cNvPr id="3" name="Marcador de Posição de Notas 2"/>
+          <p:cNvSpPr>
+            <a:spLocks noGrp="1"/>
+          </p:cNvSpPr>
+          <p:nvPr>
+            <p:ph type="body" idx="1"/>
+          </p:nvPr>
+        </p:nvSpPr>
+        <p:spPr/>
+        <p:txBody>
+          <a:bodyPr/>
+          <a:lstStyle/>
+          <a:p>
+            <a:r>
+              <a:rPr lang="pt-PT" dirty="0" err="1" smtClean="0"/>
+              <a:t>Health</a:t>
+            </a:r>
+            <a:r>
+              <a:rPr lang="pt-PT" dirty="0" smtClean="0"/>
+              <a:t> </a:t>
+            </a:r>
+            <a:r>
+              <a:rPr lang="pt-PT" dirty="0" err="1" smtClean="0"/>
+              <a:t>Problems</a:t>
+            </a:r>
+            <a:r>
+              <a:rPr lang="pt-PT" dirty="0" smtClean="0"/>
+              <a:t> (stress, </a:t>
+            </a:r>
+            <a:r>
+              <a:rPr lang="pt-PT" dirty="0" err="1" smtClean="0"/>
+              <a:t>pollution</a:t>
+            </a:r>
+            <a:r>
+              <a:rPr lang="pt-PT" dirty="0" smtClean="0"/>
+              <a:t>,</a:t>
+            </a:r>
+            <a:r>
+              <a:rPr lang="pt-PT" baseline="0" dirty="0" smtClean="0"/>
+              <a:t> etc.) -&gt; </a:t>
+            </a:r>
+            <a:r>
+              <a:rPr lang="pt-PT" baseline="0" dirty="0" err="1" smtClean="0"/>
+              <a:t>related</a:t>
+            </a:r>
+            <a:r>
+              <a:rPr lang="pt-PT" baseline="0" dirty="0" smtClean="0"/>
+              <a:t> </a:t>
+            </a:r>
+            <a:r>
+              <a:rPr lang="pt-PT" baseline="0" dirty="0" err="1" smtClean="0"/>
+              <a:t>with</a:t>
+            </a:r>
+            <a:r>
+              <a:rPr lang="pt-PT" baseline="0" dirty="0" smtClean="0"/>
+              <a:t> </a:t>
+            </a:r>
+            <a:r>
+              <a:rPr lang="pt-PT" baseline="0" dirty="0" err="1" smtClean="0"/>
+              <a:t>environment</a:t>
+            </a:r>
+            <a:endParaRPr lang="pt-PT" dirty="0" smtClean="0"/>
+          </a:p>
+          <a:p>
+            <a:r>
+              <a:rPr lang="pt-PT" dirty="0" err="1" smtClean="0"/>
+              <a:t>Economic</a:t>
+            </a:r>
+            <a:r>
+              <a:rPr lang="pt-PT" baseline="0" dirty="0" smtClean="0"/>
+              <a:t> </a:t>
+            </a:r>
+            <a:r>
+              <a:rPr lang="pt-PT" baseline="0" dirty="0" err="1" smtClean="0"/>
+              <a:t>impact</a:t>
+            </a:r>
+            <a:endParaRPr lang="pt-PT" baseline="0" dirty="0" smtClean="0"/>
+          </a:p>
+          <a:p>
+            <a:r>
+              <a:rPr lang="pt-PT" baseline="0" dirty="0" err="1" smtClean="0"/>
+              <a:t>Environmental</a:t>
+            </a:r>
+            <a:r>
+              <a:rPr lang="pt-PT" baseline="0" dirty="0" smtClean="0"/>
+              <a:t> </a:t>
+            </a:r>
+            <a:r>
+              <a:rPr lang="pt-PT" baseline="0" dirty="0" err="1" smtClean="0"/>
+              <a:t>impact</a:t>
+            </a:r>
+            <a:endParaRPr lang="pt-PT" dirty="0"/>
+          </a:p>
+        </p:txBody>
+      </p:sp>
+      <p:sp>
+        <p:nvSpPr>
+          <p:cNvPr id="4" name="Marcador de Posição do Número do Diapositivo 3"/>
+          <p:cNvSpPr>
+            <a:spLocks noGrp="1"/>
+          </p:cNvSpPr>
+          <p:nvPr>
+            <p:ph type="sldNum" sz="quarter" idx="10"/>
+          </p:nvPr>
+        </p:nvSpPr>
+        <p:spPr/>
+        <p:txBody>
+          <a:bodyPr/>
+          <a:lstStyle/>
+          <a:p>
+            <a:fld id="{3AC54132-D928-D54C-ABBE-ACE1209FEA7D}" type="slidenum">
+              <a:rPr lang="pt-PT" smtClean="0"/>
+              <a:t>18</a:t>
+            </a:fld>
+            <a:endParaRPr lang="pt-PT"/>
+          </a:p>
+        </p:txBody>
+      </p:sp>
+    </p:spTree>
+    <p:extLst>
+      <p:ext uri="{BB962C8B-B14F-4D97-AF65-F5344CB8AC3E}">
+        <p14:creationId xmlns:p14="http://schemas.microsoft.com/office/powerpoint/2010/main" val="924817980"/>
+      </p:ext>
+    </p:extLst>
+  </p:cSld>
+  <p:clrMapOvr>
+    <a:masterClrMapping/>
+  </p:clrMapOvr>
+</p:notes>
+</file>
+
+<file path=ppt/notesSlides/notesSlide18.xml><?xml version="1.0" encoding="utf-8"?>
+<p:notes xmlns:a="http://schemas.openxmlformats.org/drawingml/2006/main" xmlns:r="http://schemas.openxmlformats.org/officeDocument/2006/relationships" xmlns:p="http://schemas.openxmlformats.org/presentationml/2006/main">
+  <p:cSld>
+    <p:spTree>
+      <p:nvGrpSpPr>
+        <p:cNvPr id="1" name=""/>
+        <p:cNvGrpSpPr/>
+        <p:nvPr/>
+      </p:nvGrpSpPr>
+      <p:grpSpPr>
+        <a:xfrm>
+          <a:off x="0" y="0"/>
+          <a:ext cx="0" cy="0"/>
+          <a:chOff x="0" y="0"/>
+          <a:chExt cx="0" cy="0"/>
+        </a:xfrm>
+      </p:grpSpPr>
+      <p:sp>
+        <p:nvSpPr>
+          <p:cNvPr id="2" name="Marcador de Posição da Imagem do Diapositivo 1"/>
+          <p:cNvSpPr>
+            <a:spLocks noGrp="1" noRot="1" noChangeAspect="1"/>
+          </p:cNvSpPr>
+          <p:nvPr>
+            <p:ph type="sldImg"/>
+          </p:nvPr>
+        </p:nvSpPr>
+        <p:spPr/>
+      </p:sp>
+      <p:sp>
+        <p:nvSpPr>
+          <p:cNvPr id="3" name="Marcador de Posição de Notas 2"/>
+          <p:cNvSpPr>
+            <a:spLocks noGrp="1"/>
+          </p:cNvSpPr>
+          <p:nvPr>
+            <p:ph type="body" idx="1"/>
+          </p:nvPr>
+        </p:nvSpPr>
+        <p:spPr/>
+        <p:txBody>
+          <a:bodyPr/>
+          <a:lstStyle/>
+          <a:p>
+            <a:r>
+              <a:rPr lang="pt-PT" dirty="0" err="1" smtClean="0"/>
+              <a:t>Health</a:t>
+            </a:r>
+            <a:r>
+              <a:rPr lang="pt-PT" dirty="0" smtClean="0"/>
+              <a:t> </a:t>
+            </a:r>
+            <a:r>
+              <a:rPr lang="pt-PT" dirty="0" err="1" smtClean="0"/>
+              <a:t>Problems</a:t>
+            </a:r>
+            <a:r>
+              <a:rPr lang="pt-PT" dirty="0" smtClean="0"/>
+              <a:t> (stress, </a:t>
+            </a:r>
+            <a:r>
+              <a:rPr lang="pt-PT" dirty="0" err="1" smtClean="0"/>
+              <a:t>pollution</a:t>
+            </a:r>
+            <a:r>
+              <a:rPr lang="pt-PT" dirty="0" smtClean="0"/>
+              <a:t>,</a:t>
+            </a:r>
+            <a:r>
+              <a:rPr lang="pt-PT" baseline="0" dirty="0" smtClean="0"/>
+              <a:t> etc.) -&gt; </a:t>
+            </a:r>
+            <a:r>
+              <a:rPr lang="pt-PT" baseline="0" dirty="0" err="1" smtClean="0"/>
+              <a:t>related</a:t>
+            </a:r>
+            <a:r>
+              <a:rPr lang="pt-PT" baseline="0" dirty="0" smtClean="0"/>
+              <a:t> </a:t>
+            </a:r>
+            <a:r>
+              <a:rPr lang="pt-PT" baseline="0" dirty="0" err="1" smtClean="0"/>
+              <a:t>with</a:t>
+            </a:r>
+            <a:r>
+              <a:rPr lang="pt-PT" baseline="0" dirty="0" smtClean="0"/>
+              <a:t> </a:t>
+            </a:r>
+            <a:r>
+              <a:rPr lang="pt-PT" baseline="0" dirty="0" err="1" smtClean="0"/>
+              <a:t>environment</a:t>
+            </a:r>
+            <a:endParaRPr lang="pt-PT" dirty="0" smtClean="0"/>
+          </a:p>
+          <a:p>
+            <a:r>
+              <a:rPr lang="pt-PT" dirty="0" err="1" smtClean="0"/>
+              <a:t>Economic</a:t>
+            </a:r>
+            <a:r>
+              <a:rPr lang="pt-PT" baseline="0" dirty="0" smtClean="0"/>
+              <a:t> </a:t>
+            </a:r>
+            <a:r>
+              <a:rPr lang="pt-PT" baseline="0" dirty="0" err="1" smtClean="0"/>
+              <a:t>impact</a:t>
+            </a:r>
+            <a:endParaRPr lang="pt-PT" baseline="0" dirty="0" smtClean="0"/>
+          </a:p>
+          <a:p>
+            <a:r>
+              <a:rPr lang="pt-PT" baseline="0" dirty="0" err="1" smtClean="0"/>
+              <a:t>Environmental</a:t>
+            </a:r>
+            <a:r>
+              <a:rPr lang="pt-PT" baseline="0" dirty="0" smtClean="0"/>
+              <a:t> </a:t>
+            </a:r>
+            <a:r>
+              <a:rPr lang="pt-PT" baseline="0" dirty="0" err="1" smtClean="0"/>
+              <a:t>impact</a:t>
+            </a:r>
+            <a:endParaRPr lang="pt-PT" dirty="0"/>
+          </a:p>
+        </p:txBody>
+      </p:sp>
+      <p:sp>
+        <p:nvSpPr>
+          <p:cNvPr id="4" name="Marcador de Posição do Número do Diapositivo 3"/>
+          <p:cNvSpPr>
+            <a:spLocks noGrp="1"/>
+          </p:cNvSpPr>
+          <p:nvPr>
+            <p:ph type="sldNum" sz="quarter" idx="10"/>
+          </p:nvPr>
+        </p:nvSpPr>
+        <p:spPr/>
+        <p:txBody>
+          <a:bodyPr/>
+          <a:lstStyle/>
+          <a:p>
+            <a:fld id="{3AC54132-D928-D54C-ABBE-ACE1209FEA7D}" type="slidenum">
+              <a:rPr lang="pt-PT" smtClean="0"/>
+              <a:t>19</a:t>
+            </a:fld>
+            <a:endParaRPr lang="pt-PT"/>
+          </a:p>
+        </p:txBody>
+      </p:sp>
+    </p:spTree>
+    <p:extLst>
+      <p:ext uri="{BB962C8B-B14F-4D97-AF65-F5344CB8AC3E}">
+        <p14:creationId xmlns:p14="http://schemas.microsoft.com/office/powerpoint/2010/main" val="886354255"/>
       </p:ext>
     </p:extLst>
   </p:cSld>
@@ -7213,6 +7865,638 @@
     <p:extLst>
       <p:ext uri="{BB962C8B-B14F-4D97-AF65-F5344CB8AC3E}">
         <p14:creationId xmlns:p14="http://schemas.microsoft.com/office/powerpoint/2010/main" val="1003476902"/>
+      </p:ext>
+    </p:extLst>
+  </p:cSld>
+  <p:clrMapOvr>
+    <a:masterClrMapping/>
+  </p:clrMapOvr>
+  <p:timing>
+    <p:tnLst>
+      <p:par>
+        <p:cTn id="1" dur="indefinite" restart="never" nodeType="tmRoot"/>
+      </p:par>
+    </p:tnLst>
+  </p:timing>
+</p:sld>
+</file>
+
+<file path=ppt/slides/slide16.xml><?xml version="1.0" encoding="utf-8"?>
+<p:sld xmlns:a="http://schemas.openxmlformats.org/drawingml/2006/main" xmlns:r="http://schemas.openxmlformats.org/officeDocument/2006/relationships" xmlns:p="http://schemas.openxmlformats.org/presentationml/2006/main">
+  <p:cSld>
+    <p:bg>
+      <p:bgPr>
+        <a:solidFill>
+          <a:schemeClr val="bg1">
+            <a:lumMod val="95000"/>
+          </a:schemeClr>
+        </a:solidFill>
+        <a:effectLst/>
+      </p:bgPr>
+    </p:bg>
+    <p:spTree>
+      <p:nvGrpSpPr>
+        <p:cNvPr id="1" name=""/>
+        <p:cNvGrpSpPr/>
+        <p:nvPr/>
+      </p:nvGrpSpPr>
+      <p:grpSpPr>
+        <a:xfrm>
+          <a:off x="0" y="0"/>
+          <a:ext cx="0" cy="0"/>
+          <a:chOff x="0" y="0"/>
+          <a:chExt cx="0" cy="0"/>
+        </a:xfrm>
+      </p:grpSpPr>
+      <p:sp>
+        <p:nvSpPr>
+          <p:cNvPr id="3" name="CaixaDeTexto 2"/>
+          <p:cNvSpPr txBox="1"/>
+          <p:nvPr/>
+        </p:nvSpPr>
+        <p:spPr>
+          <a:xfrm>
+            <a:off x="1099973" y="2434106"/>
+            <a:ext cx="1746258" cy="1446550"/>
+          </a:xfrm>
+          <a:prstGeom prst="rect">
+            <a:avLst/>
+          </a:prstGeom>
+          <a:noFill/>
+        </p:spPr>
+        <p:txBody>
+          <a:bodyPr wrap="square" rtlCol="0">
+            <a:spAutoFit/>
+          </a:bodyPr>
+          <a:lstStyle/>
+          <a:p>
+            <a:r>
+              <a:rPr lang="pt-PT" sz="8800" dirty="0" smtClean="0">
+                <a:solidFill>
+                  <a:srgbClr val="B9122B"/>
+                </a:solidFill>
+              </a:rPr>
+              <a:t>#5</a:t>
+            </a:r>
+            <a:endParaRPr lang="pt-PT" sz="8800" dirty="0">
+              <a:solidFill>
+                <a:srgbClr val="B9122B"/>
+              </a:solidFill>
+            </a:endParaRPr>
+          </a:p>
+        </p:txBody>
+      </p:sp>
+      <p:sp>
+        <p:nvSpPr>
+          <p:cNvPr id="4" name="Marcador de Posição do Número do Diapositivo 3"/>
+          <p:cNvSpPr>
+            <a:spLocks noGrp="1"/>
+          </p:cNvSpPr>
+          <p:nvPr>
+            <p:ph type="sldNum" sz="quarter" idx="12"/>
+          </p:nvPr>
+        </p:nvSpPr>
+        <p:spPr/>
+        <p:txBody>
+          <a:bodyPr/>
+          <a:lstStyle/>
+          <a:p>
+            <a:fld id="{5683189C-B5E2-F345-AC06-1CEB972D3557}" type="slidenum">
+              <a:rPr lang="pt-PT" smtClean="0"/>
+              <a:t>16</a:t>
+            </a:fld>
+            <a:endParaRPr lang="pt-PT"/>
+          </a:p>
+        </p:txBody>
+      </p:sp>
+      <p:sp>
+        <p:nvSpPr>
+          <p:cNvPr id="13" name="CaixaDeTexto 12"/>
+          <p:cNvSpPr txBox="1"/>
+          <p:nvPr/>
+        </p:nvSpPr>
+        <p:spPr>
+          <a:xfrm>
+            <a:off x="2846231" y="2649550"/>
+            <a:ext cx="7457554" cy="1015663"/>
+          </a:xfrm>
+          <a:prstGeom prst="rect">
+            <a:avLst/>
+          </a:prstGeom>
+          <a:noFill/>
+        </p:spPr>
+        <p:txBody>
+          <a:bodyPr wrap="none" rtlCol="0">
+            <a:spAutoFit/>
+          </a:bodyPr>
+          <a:lstStyle/>
+          <a:p>
+            <a:r>
+              <a:rPr lang="pt-PT" sz="6000" dirty="0" err="1" smtClean="0">
+                <a:solidFill>
+                  <a:srgbClr val="00568A"/>
+                </a:solidFill>
+              </a:rPr>
+              <a:t>Predictive</a:t>
+            </a:r>
+            <a:r>
+              <a:rPr lang="pt-PT" sz="6000" dirty="0" smtClean="0">
+                <a:solidFill>
+                  <a:srgbClr val="00568A"/>
+                </a:solidFill>
+              </a:rPr>
+              <a:t> data </a:t>
+            </a:r>
+            <a:r>
+              <a:rPr lang="pt-PT" sz="6000" dirty="0" err="1" smtClean="0">
+                <a:solidFill>
+                  <a:srgbClr val="00568A"/>
+                </a:solidFill>
+              </a:rPr>
+              <a:t>analysis</a:t>
+            </a:r>
+            <a:endParaRPr lang="pt-PT" sz="6000" dirty="0">
+              <a:solidFill>
+                <a:srgbClr val="00568A"/>
+              </a:solidFill>
+            </a:endParaRPr>
+          </a:p>
+        </p:txBody>
+      </p:sp>
+    </p:spTree>
+    <p:extLst>
+      <p:ext uri="{BB962C8B-B14F-4D97-AF65-F5344CB8AC3E}">
+        <p14:creationId xmlns:p14="http://schemas.microsoft.com/office/powerpoint/2010/main" val="375898863"/>
+      </p:ext>
+    </p:extLst>
+  </p:cSld>
+  <p:clrMapOvr>
+    <a:masterClrMapping/>
+  </p:clrMapOvr>
+  <p:timing>
+    <p:tnLst>
+      <p:par>
+        <p:cTn id="1" dur="indefinite" restart="never" nodeType="tmRoot"/>
+      </p:par>
+    </p:tnLst>
+  </p:timing>
+</p:sld>
+</file>
+
+<file path=ppt/slides/slide17.xml><?xml version="1.0" encoding="utf-8"?>
+<p:sld xmlns:a="http://schemas.openxmlformats.org/drawingml/2006/main" xmlns:r="http://schemas.openxmlformats.org/officeDocument/2006/relationships" xmlns:p="http://schemas.openxmlformats.org/presentationml/2006/main">
+  <p:cSld>
+    <p:bg>
+      <p:bgPr>
+        <a:solidFill>
+          <a:schemeClr val="bg1">
+            <a:lumMod val="95000"/>
+          </a:schemeClr>
+        </a:solidFill>
+        <a:effectLst/>
+      </p:bgPr>
+    </p:bg>
+    <p:spTree>
+      <p:nvGrpSpPr>
+        <p:cNvPr id="1" name=""/>
+        <p:cNvGrpSpPr/>
+        <p:nvPr/>
+      </p:nvGrpSpPr>
+      <p:grpSpPr>
+        <a:xfrm>
+          <a:off x="0" y="0"/>
+          <a:ext cx="0" cy="0"/>
+          <a:chOff x="0" y="0"/>
+          <a:chExt cx="0" cy="0"/>
+        </a:xfrm>
+      </p:grpSpPr>
+      <p:sp>
+        <p:nvSpPr>
+          <p:cNvPr id="3" name="CaixaDeTexto 2"/>
+          <p:cNvSpPr txBox="1"/>
+          <p:nvPr/>
+        </p:nvSpPr>
+        <p:spPr>
+          <a:xfrm>
+            <a:off x="1099973" y="2434106"/>
+            <a:ext cx="1746258" cy="1446550"/>
+          </a:xfrm>
+          <a:prstGeom prst="rect">
+            <a:avLst/>
+          </a:prstGeom>
+          <a:noFill/>
+        </p:spPr>
+        <p:txBody>
+          <a:bodyPr wrap="square" rtlCol="0">
+            <a:spAutoFit/>
+          </a:bodyPr>
+          <a:lstStyle/>
+          <a:p>
+            <a:r>
+              <a:rPr lang="pt-PT" sz="8800" dirty="0" smtClean="0">
+                <a:solidFill>
+                  <a:srgbClr val="B9122B"/>
+                </a:solidFill>
+              </a:rPr>
+              <a:t>#6</a:t>
+            </a:r>
+            <a:endParaRPr lang="pt-PT" sz="8800" dirty="0">
+              <a:solidFill>
+                <a:srgbClr val="B9122B"/>
+              </a:solidFill>
+            </a:endParaRPr>
+          </a:p>
+        </p:txBody>
+      </p:sp>
+      <p:sp>
+        <p:nvSpPr>
+          <p:cNvPr id="4" name="Marcador de Posição do Número do Diapositivo 3"/>
+          <p:cNvSpPr>
+            <a:spLocks noGrp="1"/>
+          </p:cNvSpPr>
+          <p:nvPr>
+            <p:ph type="sldNum" sz="quarter" idx="12"/>
+          </p:nvPr>
+        </p:nvSpPr>
+        <p:spPr/>
+        <p:txBody>
+          <a:bodyPr/>
+          <a:lstStyle/>
+          <a:p>
+            <a:fld id="{5683189C-B5E2-F345-AC06-1CEB972D3557}" type="slidenum">
+              <a:rPr lang="pt-PT" smtClean="0"/>
+              <a:t>17</a:t>
+            </a:fld>
+            <a:endParaRPr lang="pt-PT"/>
+          </a:p>
+        </p:txBody>
+      </p:sp>
+      <p:sp>
+        <p:nvSpPr>
+          <p:cNvPr id="13" name="CaixaDeTexto 12"/>
+          <p:cNvSpPr txBox="1"/>
+          <p:nvPr/>
+        </p:nvSpPr>
+        <p:spPr>
+          <a:xfrm>
+            <a:off x="2846231" y="2649550"/>
+            <a:ext cx="9068508" cy="1015663"/>
+          </a:xfrm>
+          <a:prstGeom prst="rect">
+            <a:avLst/>
+          </a:prstGeom>
+          <a:noFill/>
+        </p:spPr>
+        <p:txBody>
+          <a:bodyPr wrap="none" rtlCol="0">
+            <a:spAutoFit/>
+          </a:bodyPr>
+          <a:lstStyle/>
+          <a:p>
+            <a:r>
+              <a:rPr lang="pt-PT" sz="6000" dirty="0" err="1" smtClean="0">
+                <a:solidFill>
+                  <a:srgbClr val="00568A"/>
+                </a:solidFill>
+              </a:rPr>
+              <a:t>Limitations</a:t>
+            </a:r>
+            <a:r>
+              <a:rPr lang="pt-PT" sz="6000" dirty="0" smtClean="0">
+                <a:solidFill>
+                  <a:srgbClr val="00568A"/>
+                </a:solidFill>
+              </a:rPr>
+              <a:t> </a:t>
+            </a:r>
+            <a:r>
+              <a:rPr lang="pt-PT" sz="6000" dirty="0" err="1" smtClean="0">
+                <a:solidFill>
+                  <a:srgbClr val="00568A"/>
+                </a:solidFill>
+              </a:rPr>
+              <a:t>and</a:t>
+            </a:r>
+            <a:r>
+              <a:rPr lang="pt-PT" sz="6000" dirty="0" smtClean="0">
+                <a:solidFill>
+                  <a:srgbClr val="00568A"/>
+                </a:solidFill>
+              </a:rPr>
+              <a:t> Future </a:t>
+            </a:r>
+            <a:r>
+              <a:rPr lang="pt-PT" sz="6000" dirty="0" err="1" smtClean="0">
+                <a:solidFill>
+                  <a:srgbClr val="00568A"/>
+                </a:solidFill>
+              </a:rPr>
+              <a:t>Work</a:t>
+            </a:r>
+            <a:endParaRPr lang="pt-PT" sz="6000" dirty="0">
+              <a:solidFill>
+                <a:srgbClr val="00568A"/>
+              </a:solidFill>
+            </a:endParaRPr>
+          </a:p>
+        </p:txBody>
+      </p:sp>
+    </p:spTree>
+    <p:extLst>
+      <p:ext uri="{BB962C8B-B14F-4D97-AF65-F5344CB8AC3E}">
+        <p14:creationId xmlns:p14="http://schemas.microsoft.com/office/powerpoint/2010/main" val="1071797658"/>
+      </p:ext>
+    </p:extLst>
+  </p:cSld>
+  <p:clrMapOvr>
+    <a:masterClrMapping/>
+  </p:clrMapOvr>
+  <p:timing>
+    <p:tnLst>
+      <p:par>
+        <p:cTn id="1" dur="indefinite" restart="never" nodeType="tmRoot"/>
+      </p:par>
+    </p:tnLst>
+  </p:timing>
+</p:sld>
+</file>
+
+<file path=ppt/slides/slide18.xml><?xml version="1.0" encoding="utf-8"?>
+<p:sld xmlns:a="http://schemas.openxmlformats.org/drawingml/2006/main" xmlns:r="http://schemas.openxmlformats.org/officeDocument/2006/relationships" xmlns:p="http://schemas.openxmlformats.org/presentationml/2006/main">
+  <p:cSld>
+    <p:bg>
+      <p:bgPr>
+        <a:solidFill>
+          <a:schemeClr val="bg1">
+            <a:lumMod val="95000"/>
+          </a:schemeClr>
+        </a:solidFill>
+        <a:effectLst/>
+      </p:bgPr>
+    </p:bg>
+    <p:spTree>
+      <p:nvGrpSpPr>
+        <p:cNvPr id="1" name=""/>
+        <p:cNvGrpSpPr/>
+        <p:nvPr/>
+      </p:nvGrpSpPr>
+      <p:grpSpPr>
+        <a:xfrm>
+          <a:off x="0" y="0"/>
+          <a:ext cx="0" cy="0"/>
+          <a:chOff x="0" y="0"/>
+          <a:chExt cx="0" cy="0"/>
+        </a:xfrm>
+      </p:grpSpPr>
+      <p:sp>
+        <p:nvSpPr>
+          <p:cNvPr id="3" name="CaixaDeTexto 2"/>
+          <p:cNvSpPr txBox="1"/>
+          <p:nvPr/>
+        </p:nvSpPr>
+        <p:spPr>
+          <a:xfrm>
+            <a:off x="1099973" y="2434106"/>
+            <a:ext cx="1746258" cy="1446550"/>
+          </a:xfrm>
+          <a:prstGeom prst="rect">
+            <a:avLst/>
+          </a:prstGeom>
+          <a:noFill/>
+        </p:spPr>
+        <p:txBody>
+          <a:bodyPr wrap="square" rtlCol="0">
+            <a:spAutoFit/>
+          </a:bodyPr>
+          <a:lstStyle/>
+          <a:p>
+            <a:r>
+              <a:rPr lang="pt-PT" sz="8800" dirty="0" smtClean="0">
+                <a:solidFill>
+                  <a:srgbClr val="B9122B"/>
+                </a:solidFill>
+              </a:rPr>
+              <a:t>#7</a:t>
+            </a:r>
+            <a:endParaRPr lang="pt-PT" sz="8800" dirty="0">
+              <a:solidFill>
+                <a:srgbClr val="B9122B"/>
+              </a:solidFill>
+            </a:endParaRPr>
+          </a:p>
+        </p:txBody>
+      </p:sp>
+      <p:sp>
+        <p:nvSpPr>
+          <p:cNvPr id="4" name="Marcador de Posição do Número do Diapositivo 3"/>
+          <p:cNvSpPr>
+            <a:spLocks noGrp="1"/>
+          </p:cNvSpPr>
+          <p:nvPr>
+            <p:ph type="sldNum" sz="quarter" idx="12"/>
+          </p:nvPr>
+        </p:nvSpPr>
+        <p:spPr/>
+        <p:txBody>
+          <a:bodyPr/>
+          <a:lstStyle/>
+          <a:p>
+            <a:fld id="{5683189C-B5E2-F345-AC06-1CEB972D3557}" type="slidenum">
+              <a:rPr lang="pt-PT" smtClean="0"/>
+              <a:t>18</a:t>
+            </a:fld>
+            <a:endParaRPr lang="pt-PT"/>
+          </a:p>
+        </p:txBody>
+      </p:sp>
+      <p:sp>
+        <p:nvSpPr>
+          <p:cNvPr id="13" name="CaixaDeTexto 12"/>
+          <p:cNvSpPr txBox="1"/>
+          <p:nvPr/>
+        </p:nvSpPr>
+        <p:spPr>
+          <a:xfrm>
+            <a:off x="2846231" y="2649550"/>
+            <a:ext cx="3898824" cy="1015663"/>
+          </a:xfrm>
+          <a:prstGeom prst="rect">
+            <a:avLst/>
+          </a:prstGeom>
+          <a:noFill/>
+        </p:spPr>
+        <p:txBody>
+          <a:bodyPr wrap="none" rtlCol="0">
+            <a:spAutoFit/>
+          </a:bodyPr>
+          <a:lstStyle/>
+          <a:p>
+            <a:r>
+              <a:rPr lang="pt-PT" sz="6000" smtClean="0">
+                <a:solidFill>
+                  <a:srgbClr val="00568A"/>
+                </a:solidFill>
+              </a:rPr>
+              <a:t>Conclusions</a:t>
+            </a:r>
+            <a:endParaRPr lang="pt-PT" sz="6000" dirty="0">
+              <a:solidFill>
+                <a:srgbClr val="00568A"/>
+              </a:solidFill>
+            </a:endParaRPr>
+          </a:p>
+        </p:txBody>
+      </p:sp>
+    </p:spTree>
+    <p:extLst>
+      <p:ext uri="{BB962C8B-B14F-4D97-AF65-F5344CB8AC3E}">
+        <p14:creationId xmlns:p14="http://schemas.microsoft.com/office/powerpoint/2010/main" val="1473790754"/>
+      </p:ext>
+    </p:extLst>
+  </p:cSld>
+  <p:clrMapOvr>
+    <a:masterClrMapping/>
+  </p:clrMapOvr>
+  <p:timing>
+    <p:tnLst>
+      <p:par>
+        <p:cTn id="1" dur="indefinite" restart="never" nodeType="tmRoot"/>
+      </p:par>
+    </p:tnLst>
+  </p:timing>
+</p:sld>
+</file>
+
+<file path=ppt/slides/slide19.xml><?xml version="1.0" encoding="utf-8"?>
+<p:sld xmlns:a="http://schemas.openxmlformats.org/drawingml/2006/main" xmlns:r="http://schemas.openxmlformats.org/officeDocument/2006/relationships" xmlns:p="http://schemas.openxmlformats.org/presentationml/2006/main">
+  <p:cSld>
+    <p:bg>
+      <p:bgPr>
+        <a:solidFill>
+          <a:schemeClr val="bg1">
+            <a:lumMod val="95000"/>
+          </a:schemeClr>
+        </a:solidFill>
+        <a:effectLst/>
+      </p:bgPr>
+    </p:bg>
+    <p:spTree>
+      <p:nvGrpSpPr>
+        <p:cNvPr id="1" name=""/>
+        <p:cNvGrpSpPr/>
+        <p:nvPr/>
+      </p:nvGrpSpPr>
+      <p:grpSpPr>
+        <a:xfrm>
+          <a:off x="0" y="0"/>
+          <a:ext cx="0" cy="0"/>
+          <a:chOff x="0" y="0"/>
+          <a:chExt cx="0" cy="0"/>
+        </a:xfrm>
+      </p:grpSpPr>
+      <p:sp>
+        <p:nvSpPr>
+          <p:cNvPr id="3" name="CaixaDeTexto 2"/>
+          <p:cNvSpPr txBox="1"/>
+          <p:nvPr/>
+        </p:nvSpPr>
+        <p:spPr>
+          <a:xfrm>
+            <a:off x="1099973" y="2434106"/>
+            <a:ext cx="1746258" cy="1446550"/>
+          </a:xfrm>
+          <a:prstGeom prst="rect">
+            <a:avLst/>
+          </a:prstGeom>
+          <a:noFill/>
+        </p:spPr>
+        <p:txBody>
+          <a:bodyPr wrap="square" rtlCol="0">
+            <a:spAutoFit/>
+          </a:bodyPr>
+          <a:lstStyle/>
+          <a:p>
+            <a:r>
+              <a:rPr lang="pt-PT" sz="8800" dirty="0" smtClean="0">
+                <a:solidFill>
+                  <a:srgbClr val="B9122B"/>
+                </a:solidFill>
+              </a:rPr>
+              <a:t>#8</a:t>
+            </a:r>
+            <a:endParaRPr lang="pt-PT" sz="8800" dirty="0">
+              <a:solidFill>
+                <a:srgbClr val="B9122B"/>
+              </a:solidFill>
+            </a:endParaRPr>
+          </a:p>
+        </p:txBody>
+      </p:sp>
+      <p:sp>
+        <p:nvSpPr>
+          <p:cNvPr id="4" name="Marcador de Posição do Número do Diapositivo 3"/>
+          <p:cNvSpPr>
+            <a:spLocks noGrp="1"/>
+          </p:cNvSpPr>
+          <p:nvPr>
+            <p:ph type="sldNum" sz="quarter" idx="12"/>
+          </p:nvPr>
+        </p:nvSpPr>
+        <p:spPr/>
+        <p:txBody>
+          <a:bodyPr/>
+          <a:lstStyle/>
+          <a:p>
+            <a:fld id="{5683189C-B5E2-F345-AC06-1CEB972D3557}" type="slidenum">
+              <a:rPr lang="pt-PT" smtClean="0"/>
+              <a:t>19</a:t>
+            </a:fld>
+            <a:endParaRPr lang="pt-PT"/>
+          </a:p>
+        </p:txBody>
+      </p:sp>
+      <p:sp>
+        <p:nvSpPr>
+          <p:cNvPr id="13" name="CaixaDeTexto 12"/>
+          <p:cNvSpPr txBox="1"/>
+          <p:nvPr/>
+        </p:nvSpPr>
+        <p:spPr>
+          <a:xfrm>
+            <a:off x="2846231" y="2649550"/>
+            <a:ext cx="2807692" cy="1015663"/>
+          </a:xfrm>
+          <a:prstGeom prst="rect">
+            <a:avLst/>
+          </a:prstGeom>
+          <a:noFill/>
+        </p:spPr>
+        <p:txBody>
+          <a:bodyPr wrap="none" rtlCol="0">
+            <a:spAutoFit/>
+          </a:bodyPr>
+          <a:lstStyle/>
+          <a:p>
+            <a:r>
+              <a:rPr lang="pt-PT" sz="6000" dirty="0" err="1" smtClean="0">
+                <a:solidFill>
+                  <a:srgbClr val="00568A"/>
+                </a:solidFill>
+              </a:rPr>
+              <a:t>Annexes</a:t>
+            </a:r>
+            <a:endParaRPr lang="pt-PT" sz="6000" dirty="0">
+              <a:solidFill>
+                <a:srgbClr val="00568A"/>
+              </a:solidFill>
+            </a:endParaRPr>
+          </a:p>
+        </p:txBody>
+      </p:sp>
+    </p:spTree>
+    <p:extLst>
+      <p:ext uri="{BB962C8B-B14F-4D97-AF65-F5344CB8AC3E}">
+        <p14:creationId xmlns:p14="http://schemas.microsoft.com/office/powerpoint/2010/main" val="1353809460"/>
       </p:ext>
     </p:extLst>
   </p:cSld>

</xml_diff>

<commit_message>
Updates on presentation (Annexes) and added transactions file
</commit_message>
<xml_diff>
--- a/presentation/presentation.pptx
+++ b/presentation/presentation.pptx
@@ -5,7 +5,7 @@
     <p:sldMasterId id="2147483648" r:id="rId1"/>
   </p:sldMasterIdLst>
   <p:notesMasterIdLst>
-    <p:notesMasterId r:id="rId21"/>
+    <p:notesMasterId r:id="rId22"/>
   </p:notesMasterIdLst>
   <p:sldIdLst>
     <p:sldId id="257" r:id="rId2"/>
@@ -27,6 +27,7 @@
     <p:sldId id="276" r:id="rId18"/>
     <p:sldId id="277" r:id="rId19"/>
     <p:sldId id="275" r:id="rId20"/>
+    <p:sldId id="278" r:id="rId21"/>
   </p:sldIdLst>
   <p:sldSz cx="12192000" cy="6858000"/>
   <p:notesSz cx="6858000" cy="9144000"/>
@@ -2094,6 +2095,168 @@
     <p:extLst>
       <p:ext uri="{BB962C8B-B14F-4D97-AF65-F5344CB8AC3E}">
         <p14:creationId xmlns:p14="http://schemas.microsoft.com/office/powerpoint/2010/main" val="886354255"/>
+      </p:ext>
+    </p:extLst>
+  </p:cSld>
+  <p:clrMapOvr>
+    <a:masterClrMapping/>
+  </p:clrMapOvr>
+</p:notes>
+</file>
+
+<file path=ppt/notesSlides/notesSlide19.xml><?xml version="1.0" encoding="utf-8"?>
+<p:notes xmlns:a="http://schemas.openxmlformats.org/drawingml/2006/main" xmlns:r="http://schemas.openxmlformats.org/officeDocument/2006/relationships" xmlns:p="http://schemas.openxmlformats.org/presentationml/2006/main">
+  <p:cSld>
+    <p:spTree>
+      <p:nvGrpSpPr>
+        <p:cNvPr id="1" name=""/>
+        <p:cNvGrpSpPr/>
+        <p:nvPr/>
+      </p:nvGrpSpPr>
+      <p:grpSpPr>
+        <a:xfrm>
+          <a:off x="0" y="0"/>
+          <a:ext cx="0" cy="0"/>
+          <a:chOff x="0" y="0"/>
+          <a:chExt cx="0" cy="0"/>
+        </a:xfrm>
+      </p:grpSpPr>
+      <p:sp>
+        <p:nvSpPr>
+          <p:cNvPr id="2" name="Marcador de Posição da Imagem do Diapositivo 1"/>
+          <p:cNvSpPr>
+            <a:spLocks noGrp="1" noRot="1" noChangeAspect="1"/>
+          </p:cNvSpPr>
+          <p:nvPr>
+            <p:ph type="sldImg"/>
+          </p:nvPr>
+        </p:nvSpPr>
+        <p:spPr/>
+      </p:sp>
+      <p:sp>
+        <p:nvSpPr>
+          <p:cNvPr id="3" name="Marcador de Posição de Notas 2"/>
+          <p:cNvSpPr>
+            <a:spLocks noGrp="1"/>
+          </p:cNvSpPr>
+          <p:nvPr>
+            <p:ph type="body" idx="1"/>
+          </p:nvPr>
+        </p:nvSpPr>
+        <p:spPr/>
+        <p:txBody>
+          <a:bodyPr/>
+          <a:lstStyle/>
+          <a:p>
+            <a:r>
+              <a:rPr lang="pt-PT" dirty="0" err="1" smtClean="0"/>
+              <a:t>Health</a:t>
+            </a:r>
+            <a:r>
+              <a:rPr lang="pt-PT" dirty="0" smtClean="0"/>
+              <a:t> </a:t>
+            </a:r>
+            <a:r>
+              <a:rPr lang="pt-PT" dirty="0" err="1" smtClean="0"/>
+              <a:t>Problems</a:t>
+            </a:r>
+            <a:r>
+              <a:rPr lang="pt-PT" dirty="0" smtClean="0"/>
+              <a:t> (stress, </a:t>
+            </a:r>
+            <a:r>
+              <a:rPr lang="pt-PT" dirty="0" err="1" smtClean="0"/>
+              <a:t>pollution</a:t>
+            </a:r>
+            <a:r>
+              <a:rPr lang="pt-PT" dirty="0" smtClean="0"/>
+              <a:t>,</a:t>
+            </a:r>
+            <a:r>
+              <a:rPr lang="pt-PT" baseline="0" dirty="0" smtClean="0"/>
+              <a:t> etc.) -&gt; </a:t>
+            </a:r>
+            <a:r>
+              <a:rPr lang="pt-PT" baseline="0" dirty="0" err="1" smtClean="0"/>
+              <a:t>related</a:t>
+            </a:r>
+            <a:r>
+              <a:rPr lang="pt-PT" baseline="0" dirty="0" smtClean="0"/>
+              <a:t> </a:t>
+            </a:r>
+            <a:r>
+              <a:rPr lang="pt-PT" baseline="0" dirty="0" err="1" smtClean="0"/>
+              <a:t>with</a:t>
+            </a:r>
+            <a:r>
+              <a:rPr lang="pt-PT" baseline="0" dirty="0" smtClean="0"/>
+              <a:t> </a:t>
+            </a:r>
+            <a:r>
+              <a:rPr lang="pt-PT" baseline="0" dirty="0" err="1" smtClean="0"/>
+              <a:t>environment</a:t>
+            </a:r>
+            <a:endParaRPr lang="pt-PT" dirty="0" smtClean="0"/>
+          </a:p>
+          <a:p>
+            <a:r>
+              <a:rPr lang="pt-PT" dirty="0" err="1" smtClean="0"/>
+              <a:t>Economic</a:t>
+            </a:r>
+            <a:r>
+              <a:rPr lang="pt-PT" baseline="0" dirty="0" smtClean="0"/>
+              <a:t> </a:t>
+            </a:r>
+            <a:r>
+              <a:rPr lang="pt-PT" baseline="0" dirty="0" err="1" smtClean="0"/>
+              <a:t>impact</a:t>
+            </a:r>
+            <a:endParaRPr lang="pt-PT" baseline="0" dirty="0" smtClean="0"/>
+          </a:p>
+          <a:p>
+            <a:r>
+              <a:rPr lang="pt-PT" baseline="0" dirty="0" err="1" smtClean="0"/>
+              <a:t>Environmental</a:t>
+            </a:r>
+            <a:r>
+              <a:rPr lang="pt-PT" baseline="0" dirty="0" smtClean="0"/>
+              <a:t> </a:t>
+            </a:r>
+            <a:r>
+              <a:rPr lang="pt-PT" baseline="0" dirty="0" err="1" smtClean="0"/>
+              <a:t>impact</a:t>
+            </a:r>
+            <a:endParaRPr lang="pt-PT" dirty="0"/>
+          </a:p>
+        </p:txBody>
+      </p:sp>
+      <p:sp>
+        <p:nvSpPr>
+          <p:cNvPr id="4" name="Marcador de Posição do Número do Diapositivo 3"/>
+          <p:cNvSpPr>
+            <a:spLocks noGrp="1"/>
+          </p:cNvSpPr>
+          <p:nvPr>
+            <p:ph type="sldNum" sz="quarter" idx="10"/>
+          </p:nvPr>
+        </p:nvSpPr>
+        <p:spPr/>
+        <p:txBody>
+          <a:bodyPr/>
+          <a:lstStyle/>
+          <a:p>
+            <a:fld id="{3AC54132-D928-D54C-ABBE-ACE1209FEA7D}" type="slidenum">
+              <a:rPr lang="pt-PT" smtClean="0"/>
+              <a:t>20</a:t>
+            </a:fld>
+            <a:endParaRPr lang="pt-PT"/>
+          </a:p>
+        </p:txBody>
+      </p:sp>
+    </p:spTree>
+    <p:extLst>
+      <p:ext uri="{BB962C8B-B14F-4D97-AF65-F5344CB8AC3E}">
+        <p14:creationId xmlns:p14="http://schemas.microsoft.com/office/powerpoint/2010/main" val="818119612"/>
       </p:ext>
     </p:extLst>
   </p:cSld>
@@ -6579,7 +6742,7 @@
         </p:nvSpPr>
         <p:spPr>
           <a:xfrm>
-            <a:off x="2137893" y="456504"/>
+            <a:off x="2137893" y="413482"/>
             <a:ext cx="6212278" cy="769441"/>
           </a:xfrm>
           <a:prstGeom prst="rect">
@@ -6807,7 +6970,7 @@
         </p:nvSpPr>
         <p:spPr>
           <a:xfrm>
-            <a:off x="2137893" y="456504"/>
+            <a:off x="2137893" y="423309"/>
             <a:ext cx="8434553" cy="769441"/>
           </a:xfrm>
           <a:prstGeom prst="rect">
@@ -7080,7 +7243,7 @@
         </p:nvSpPr>
         <p:spPr>
           <a:xfrm>
-            <a:off x="2137893" y="456504"/>
+            <a:off x="2137893" y="405052"/>
             <a:ext cx="5705729" cy="769441"/>
           </a:xfrm>
           <a:prstGeom prst="rect">
@@ -7307,7 +7470,7 @@
         </p:nvSpPr>
         <p:spPr>
           <a:xfrm>
-            <a:off x="2137893" y="456504"/>
+            <a:off x="2137893" y="423309"/>
             <a:ext cx="4326569" cy="769441"/>
           </a:xfrm>
           <a:prstGeom prst="rect">
@@ -7519,7 +7682,7 @@
         </p:nvSpPr>
         <p:spPr>
           <a:xfrm>
-            <a:off x="2137893" y="456504"/>
+            <a:off x="2137893" y="404989"/>
             <a:ext cx="6034088" cy="769441"/>
           </a:xfrm>
           <a:prstGeom prst="rect">
@@ -7746,7 +7909,7 @@
         </p:nvSpPr>
         <p:spPr>
           <a:xfrm>
-            <a:off x="2137893" y="456504"/>
+            <a:off x="2137893" y="423309"/>
             <a:ext cx="6166945" cy="769441"/>
           </a:xfrm>
           <a:prstGeom prst="rect">
@@ -8659,6 +8822,1909 @@
 </p:sld>
 </file>
 
+<file path=ppt/slides/slide20.xml><?xml version="1.0" encoding="utf-8"?>
+<p:sld xmlns:a="http://schemas.openxmlformats.org/drawingml/2006/main" xmlns:r="http://schemas.openxmlformats.org/officeDocument/2006/relationships" xmlns:p="http://schemas.openxmlformats.org/presentationml/2006/main">
+  <p:cSld>
+    <p:spTree>
+      <p:nvGrpSpPr>
+        <p:cNvPr id="1" name=""/>
+        <p:cNvGrpSpPr/>
+        <p:nvPr/>
+      </p:nvGrpSpPr>
+      <p:grpSpPr>
+        <a:xfrm>
+          <a:off x="0" y="0"/>
+          <a:ext cx="0" cy="0"/>
+          <a:chOff x="0" y="0"/>
+          <a:chExt cx="0" cy="0"/>
+        </a:xfrm>
+      </p:grpSpPr>
+      <p:sp>
+        <p:nvSpPr>
+          <p:cNvPr id="2" name="CaixaDeTexto 1"/>
+          <p:cNvSpPr txBox="1"/>
+          <p:nvPr/>
+        </p:nvSpPr>
+        <p:spPr>
+          <a:xfrm>
+            <a:off x="0" y="0"/>
+            <a:ext cx="12192000" cy="1579418"/>
+          </a:xfrm>
+          <a:prstGeom prst="rect">
+            <a:avLst/>
+          </a:prstGeom>
+          <a:solidFill>
+            <a:schemeClr val="bg1">
+              <a:lumMod val="95000"/>
+            </a:schemeClr>
+          </a:solidFill>
+        </p:spPr>
+        <p:txBody>
+          <a:bodyPr wrap="square" rtlCol="0">
+            <a:spAutoFit/>
+          </a:bodyPr>
+          <a:lstStyle/>
+          <a:p>
+            <a:endParaRPr lang="pt-PT" dirty="0"/>
+          </a:p>
+        </p:txBody>
+      </p:sp>
+      <p:sp>
+        <p:nvSpPr>
+          <p:cNvPr id="3" name="CaixaDeTexto 2"/>
+          <p:cNvSpPr txBox="1"/>
+          <p:nvPr/>
+        </p:nvSpPr>
+        <p:spPr>
+          <a:xfrm>
+            <a:off x="623455" y="346365"/>
+            <a:ext cx="1668984" cy="923330"/>
+          </a:xfrm>
+          <a:prstGeom prst="rect">
+            <a:avLst/>
+          </a:prstGeom>
+          <a:noFill/>
+        </p:spPr>
+        <p:txBody>
+          <a:bodyPr wrap="square" rtlCol="0">
+            <a:spAutoFit/>
+          </a:bodyPr>
+          <a:lstStyle/>
+          <a:p>
+            <a:r>
+              <a:rPr lang="pt-PT" sz="5400" dirty="0" smtClean="0">
+                <a:solidFill>
+                  <a:srgbClr val="B9122B"/>
+                </a:solidFill>
+              </a:rPr>
+              <a:t>#</a:t>
+            </a:r>
+            <a:r>
+              <a:rPr lang="pt-PT" sz="5400" dirty="0" smtClean="0">
+                <a:solidFill>
+                  <a:srgbClr val="B9122B"/>
+                </a:solidFill>
+              </a:rPr>
+              <a:t>AN</a:t>
+            </a:r>
+            <a:endParaRPr lang="pt-PT" sz="5400" dirty="0">
+              <a:solidFill>
+                <a:srgbClr val="B9122B"/>
+              </a:solidFill>
+            </a:endParaRPr>
+          </a:p>
+        </p:txBody>
+      </p:sp>
+      <p:sp>
+        <p:nvSpPr>
+          <p:cNvPr id="5" name="CaixaDeTexto 4"/>
+          <p:cNvSpPr txBox="1"/>
+          <p:nvPr/>
+        </p:nvSpPr>
+        <p:spPr>
+          <a:xfrm>
+            <a:off x="2137893" y="404988"/>
+            <a:ext cx="4079707" cy="769441"/>
+          </a:xfrm>
+          <a:prstGeom prst="rect">
+            <a:avLst/>
+          </a:prstGeom>
+          <a:noFill/>
+        </p:spPr>
+        <p:txBody>
+          <a:bodyPr wrap="none" rtlCol="0">
+            <a:spAutoFit/>
+          </a:bodyPr>
+          <a:lstStyle/>
+          <a:p>
+            <a:r>
+              <a:rPr lang="pt-PT" sz="4400" dirty="0" smtClean="0">
+                <a:solidFill>
+                  <a:srgbClr val="00568A"/>
+                </a:solidFill>
+              </a:rPr>
+              <a:t>Data </a:t>
+            </a:r>
+            <a:r>
+              <a:rPr lang="pt-PT" sz="4400" dirty="0" err="1" smtClean="0">
+                <a:solidFill>
+                  <a:srgbClr val="00568A"/>
+                </a:solidFill>
+              </a:rPr>
+              <a:t>preparation</a:t>
+            </a:r>
+            <a:endParaRPr lang="pt-PT" sz="4400" dirty="0">
+              <a:solidFill>
+                <a:srgbClr val="00568A"/>
+              </a:solidFill>
+            </a:endParaRPr>
+          </a:p>
+        </p:txBody>
+      </p:sp>
+      <p:sp>
+        <p:nvSpPr>
+          <p:cNvPr id="4" name="Marcador de Posição do Número do Diapositivo 3"/>
+          <p:cNvSpPr>
+            <a:spLocks noGrp="1"/>
+          </p:cNvSpPr>
+          <p:nvPr>
+            <p:ph type="sldNum" sz="quarter" idx="12"/>
+          </p:nvPr>
+        </p:nvSpPr>
+        <p:spPr/>
+        <p:txBody>
+          <a:bodyPr/>
+          <a:lstStyle/>
+          <a:p>
+            <a:fld id="{5683189C-B5E2-F345-AC06-1CEB972D3557}" type="slidenum">
+              <a:rPr lang="pt-PT" smtClean="0"/>
+              <a:t>20</a:t>
+            </a:fld>
+            <a:endParaRPr lang="pt-PT"/>
+          </a:p>
+        </p:txBody>
+      </p:sp>
+      <p:graphicFrame>
+        <p:nvGraphicFramePr>
+          <p:cNvPr id="8" name="Tabela 7"/>
+          <p:cNvGraphicFramePr>
+            <a:graphicFrameLocks noGrp="1"/>
+          </p:cNvGraphicFramePr>
+          <p:nvPr>
+            <p:extLst>
+              <p:ext uri="{D42A27DB-BD31-4B8C-83A1-F6EECF244321}">
+                <p14:modId xmlns:p14="http://schemas.microsoft.com/office/powerpoint/2010/main" val="1314926404"/>
+              </p:ext>
+            </p:extLst>
+          </p:nvPr>
+        </p:nvGraphicFramePr>
+        <p:xfrm>
+          <a:off x="623455" y="2362178"/>
+          <a:ext cx="3720085" cy="1483360"/>
+        </p:xfrm>
+        <a:graphic>
+          <a:graphicData uri="http://schemas.openxmlformats.org/drawingml/2006/table">
+            <a:tbl>
+              <a:tblPr firstRow="1" bandRow="1">
+                <a:tableStyleId>{5C22544A-7EE6-4342-B048-85BDC9FD1C3A}</a:tableStyleId>
+              </a:tblPr>
+              <a:tblGrid>
+                <a:gridCol w="757555"/>
+                <a:gridCol w="859155"/>
+                <a:gridCol w="1033082"/>
+                <a:gridCol w="1070293"/>
+              </a:tblGrid>
+              <a:tr h="370840">
+                <a:tc>
+                  <a:txBody>
+                    <a:bodyPr/>
+                    <a:lstStyle/>
+                    <a:p>
+                      <a:pPr algn="ctr"/>
+                      <a:r>
+                        <a:rPr lang="pt-PT" sz="1400" dirty="0" err="1" smtClean="0"/>
+                        <a:t>disp_id</a:t>
+                      </a:r>
+                      <a:endParaRPr lang="pt-PT" sz="1400" dirty="0"/>
+                    </a:p>
+                  </a:txBody>
+                  <a:tcPr>
+                    <a:solidFill>
+                      <a:srgbClr val="00568A"/>
+                    </a:solidFill>
+                  </a:tcPr>
+                </a:tc>
+                <a:tc>
+                  <a:txBody>
+                    <a:bodyPr/>
+                    <a:lstStyle/>
+                    <a:p>
+                      <a:pPr algn="ctr"/>
+                      <a:r>
+                        <a:rPr lang="pt-PT" sz="1400" dirty="0" err="1" smtClean="0"/>
+                        <a:t>client_id</a:t>
+                      </a:r>
+                      <a:endParaRPr lang="pt-PT" sz="1400" dirty="0"/>
+                    </a:p>
+                  </a:txBody>
+                  <a:tcPr>
+                    <a:solidFill>
+                      <a:srgbClr val="00568A"/>
+                    </a:solidFill>
+                  </a:tcPr>
+                </a:tc>
+                <a:tc>
+                  <a:txBody>
+                    <a:bodyPr/>
+                    <a:lstStyle/>
+                    <a:p>
+                      <a:pPr algn="ctr"/>
+                      <a:r>
+                        <a:rPr lang="pt-PT" sz="1400" dirty="0" err="1" smtClean="0"/>
+                        <a:t>account_id</a:t>
+                      </a:r>
+                      <a:endParaRPr lang="pt-PT" sz="1400" dirty="0"/>
+                    </a:p>
+                  </a:txBody>
+                  <a:tcPr>
+                    <a:solidFill>
+                      <a:srgbClr val="00568A"/>
+                    </a:solidFill>
+                  </a:tcPr>
+                </a:tc>
+                <a:tc>
+                  <a:txBody>
+                    <a:bodyPr/>
+                    <a:lstStyle/>
+                    <a:p>
+                      <a:pPr algn="ctr"/>
+                      <a:r>
+                        <a:rPr lang="pt-PT" sz="1400" dirty="0" err="1" smtClean="0"/>
+                        <a:t>type</a:t>
+                      </a:r>
+                      <a:endParaRPr lang="pt-PT" sz="1400" dirty="0"/>
+                    </a:p>
+                  </a:txBody>
+                  <a:tcPr>
+                    <a:solidFill>
+                      <a:srgbClr val="00568A"/>
+                    </a:solidFill>
+                  </a:tcPr>
+                </a:tc>
+              </a:tr>
+              <a:tr h="370840">
+                <a:tc>
+                  <a:txBody>
+                    <a:bodyPr/>
+                    <a:lstStyle/>
+                    <a:p>
+                      <a:pPr algn="ctr"/>
+                      <a:r>
+                        <a:rPr lang="pt-PT" sz="1400" dirty="0" smtClean="0"/>
+                        <a:t>1</a:t>
+                      </a:r>
+                      <a:endParaRPr lang="pt-PT" sz="1400" dirty="0"/>
+                    </a:p>
+                  </a:txBody>
+                  <a:tcPr/>
+                </a:tc>
+                <a:tc>
+                  <a:txBody>
+                    <a:bodyPr/>
+                    <a:lstStyle/>
+                    <a:p>
+                      <a:pPr algn="ctr"/>
+                      <a:r>
+                        <a:rPr lang="pt-PT" sz="1400" dirty="0" smtClean="0"/>
+                        <a:t>1</a:t>
+                      </a:r>
+                      <a:endParaRPr lang="pt-PT" sz="1400" dirty="0"/>
+                    </a:p>
+                  </a:txBody>
+                  <a:tcPr/>
+                </a:tc>
+                <a:tc>
+                  <a:txBody>
+                    <a:bodyPr/>
+                    <a:lstStyle/>
+                    <a:p>
+                      <a:pPr algn="ctr"/>
+                      <a:r>
+                        <a:rPr lang="pt-PT" sz="1400" dirty="0" smtClean="0"/>
+                        <a:t>1</a:t>
+                      </a:r>
+                      <a:endParaRPr lang="pt-PT" sz="1400" dirty="0"/>
+                    </a:p>
+                  </a:txBody>
+                  <a:tcPr/>
+                </a:tc>
+                <a:tc>
+                  <a:txBody>
+                    <a:bodyPr/>
+                    <a:lstStyle/>
+                    <a:p>
+                      <a:pPr algn="ctr"/>
+                      <a:r>
+                        <a:rPr lang="pt-PT" sz="1400" dirty="0" smtClean="0"/>
+                        <a:t>OWNER</a:t>
+                      </a:r>
+                      <a:endParaRPr lang="pt-PT" sz="1400" dirty="0"/>
+                    </a:p>
+                  </a:txBody>
+                  <a:tcPr/>
+                </a:tc>
+              </a:tr>
+              <a:tr h="370840">
+                <a:tc>
+                  <a:txBody>
+                    <a:bodyPr/>
+                    <a:lstStyle/>
+                    <a:p>
+                      <a:pPr algn="ctr"/>
+                      <a:r>
+                        <a:rPr lang="pt-PT" sz="1400" dirty="0" smtClean="0"/>
+                        <a:t>2</a:t>
+                      </a:r>
+                      <a:endParaRPr lang="pt-PT" sz="1400" dirty="0"/>
+                    </a:p>
+                  </a:txBody>
+                  <a:tcPr/>
+                </a:tc>
+                <a:tc>
+                  <a:txBody>
+                    <a:bodyPr/>
+                    <a:lstStyle/>
+                    <a:p>
+                      <a:pPr algn="ctr"/>
+                      <a:r>
+                        <a:rPr lang="pt-PT" sz="1400" dirty="0" smtClean="0"/>
+                        <a:t>2</a:t>
+                      </a:r>
+                      <a:endParaRPr lang="pt-PT" sz="1400" dirty="0"/>
+                    </a:p>
+                  </a:txBody>
+                  <a:tcPr/>
+                </a:tc>
+                <a:tc>
+                  <a:txBody>
+                    <a:bodyPr/>
+                    <a:lstStyle/>
+                    <a:p>
+                      <a:pPr algn="ctr"/>
+                      <a:r>
+                        <a:rPr lang="pt-PT" sz="1400" dirty="0" smtClean="0"/>
+                        <a:t>2</a:t>
+                      </a:r>
+                      <a:endParaRPr lang="pt-PT" sz="1400" dirty="0"/>
+                    </a:p>
+                  </a:txBody>
+                  <a:tcPr/>
+                </a:tc>
+                <a:tc>
+                  <a:txBody>
+                    <a:bodyPr/>
+                    <a:lstStyle/>
+                    <a:p>
+                      <a:pPr algn="ctr"/>
+                      <a:r>
+                        <a:rPr lang="pt-PT" sz="1400" dirty="0" smtClean="0"/>
+                        <a:t>OWNER</a:t>
+                      </a:r>
+                      <a:endParaRPr lang="pt-PT" sz="1400" dirty="0"/>
+                    </a:p>
+                  </a:txBody>
+                  <a:tcPr/>
+                </a:tc>
+              </a:tr>
+              <a:tr h="370840">
+                <a:tc>
+                  <a:txBody>
+                    <a:bodyPr/>
+                    <a:lstStyle/>
+                    <a:p>
+                      <a:pPr algn="ctr"/>
+                      <a:r>
+                        <a:rPr lang="pt-PT" sz="1400" dirty="0" smtClean="0"/>
+                        <a:t>3</a:t>
+                      </a:r>
+                      <a:endParaRPr lang="pt-PT" sz="1400" dirty="0"/>
+                    </a:p>
+                  </a:txBody>
+                  <a:tcPr/>
+                </a:tc>
+                <a:tc>
+                  <a:txBody>
+                    <a:bodyPr/>
+                    <a:lstStyle/>
+                    <a:p>
+                      <a:pPr algn="ctr"/>
+                      <a:r>
+                        <a:rPr lang="pt-PT" sz="1400" dirty="0" smtClean="0"/>
+                        <a:t>3</a:t>
+                      </a:r>
+                      <a:endParaRPr lang="pt-PT" sz="1400" dirty="0"/>
+                    </a:p>
+                  </a:txBody>
+                  <a:tcPr/>
+                </a:tc>
+                <a:tc>
+                  <a:txBody>
+                    <a:bodyPr/>
+                    <a:lstStyle/>
+                    <a:p>
+                      <a:pPr algn="ctr"/>
+                      <a:r>
+                        <a:rPr lang="pt-PT" sz="1400" dirty="0" smtClean="0"/>
+                        <a:t>2</a:t>
+                      </a:r>
+                      <a:endParaRPr lang="pt-PT" sz="1400" dirty="0"/>
+                    </a:p>
+                  </a:txBody>
+                  <a:tcPr/>
+                </a:tc>
+                <a:tc>
+                  <a:txBody>
+                    <a:bodyPr/>
+                    <a:lstStyle/>
+                    <a:p>
+                      <a:pPr algn="ctr"/>
+                      <a:r>
+                        <a:rPr lang="pt-PT" sz="1400" dirty="0" smtClean="0"/>
+                        <a:t>DISPONENT</a:t>
+                      </a:r>
+                      <a:endParaRPr lang="pt-PT" sz="1400" dirty="0"/>
+                    </a:p>
+                  </a:txBody>
+                  <a:tcPr/>
+                </a:tc>
+              </a:tr>
+            </a:tbl>
+          </a:graphicData>
+        </a:graphic>
+      </p:graphicFrame>
+      <p:sp>
+        <p:nvSpPr>
+          <p:cNvPr id="9" name="CaixaDeTexto 8"/>
+          <p:cNvSpPr txBox="1"/>
+          <p:nvPr/>
+        </p:nvSpPr>
+        <p:spPr>
+          <a:xfrm>
+            <a:off x="527203" y="1846212"/>
+            <a:ext cx="2088084" cy="335756"/>
+          </a:xfrm>
+          <a:prstGeom prst="rect">
+            <a:avLst/>
+          </a:prstGeom>
+          <a:noFill/>
+        </p:spPr>
+        <p:txBody>
+          <a:bodyPr wrap="square" rtlCol="0">
+            <a:spAutoFit/>
+          </a:bodyPr>
+          <a:lstStyle/>
+          <a:p>
+            <a:r>
+              <a:rPr lang="pt-PT" b="1" dirty="0" err="1" smtClean="0"/>
+              <a:t>Disposition</a:t>
+            </a:r>
+            <a:endParaRPr lang="pt-PT" b="1" dirty="0"/>
+          </a:p>
+        </p:txBody>
+      </p:sp>
+      <p:graphicFrame>
+        <p:nvGraphicFramePr>
+          <p:cNvPr id="10" name="Tabela 9"/>
+          <p:cNvGraphicFramePr>
+            <a:graphicFrameLocks noGrp="1"/>
+          </p:cNvGraphicFramePr>
+          <p:nvPr>
+            <p:extLst>
+              <p:ext uri="{D42A27DB-BD31-4B8C-83A1-F6EECF244321}">
+                <p14:modId xmlns:p14="http://schemas.microsoft.com/office/powerpoint/2010/main" val="1426416136"/>
+              </p:ext>
+            </p:extLst>
+          </p:nvPr>
+        </p:nvGraphicFramePr>
+        <p:xfrm>
+          <a:off x="623455" y="4560872"/>
+          <a:ext cx="4248342" cy="1483360"/>
+        </p:xfrm>
+        <a:graphic>
+          <a:graphicData uri="http://schemas.openxmlformats.org/drawingml/2006/table">
+            <a:tbl>
+              <a:tblPr firstRow="1" bandRow="1">
+                <a:tableStyleId>{5C22544A-7EE6-4342-B048-85BDC9FD1C3A}</a:tableStyleId>
+              </a:tblPr>
+              <a:tblGrid>
+                <a:gridCol w="1033082"/>
+                <a:gridCol w="966724"/>
+                <a:gridCol w="1483043"/>
+                <a:gridCol w="765493"/>
+              </a:tblGrid>
+              <a:tr h="370840">
+                <a:tc>
+                  <a:txBody>
+                    <a:bodyPr/>
+                    <a:lstStyle/>
+                    <a:p>
+                      <a:pPr algn="ctr"/>
+                      <a:r>
+                        <a:rPr lang="pt-PT" sz="1400" dirty="0" err="1" smtClean="0"/>
+                        <a:t>account_id</a:t>
+                      </a:r>
+                      <a:endParaRPr lang="pt-PT" sz="1400" dirty="0"/>
+                    </a:p>
+                  </a:txBody>
+                  <a:tcPr>
+                    <a:solidFill>
+                      <a:srgbClr val="00568A"/>
+                    </a:solidFill>
+                  </a:tcPr>
+                </a:tc>
+                <a:tc>
+                  <a:txBody>
+                    <a:bodyPr/>
+                    <a:lstStyle/>
+                    <a:p>
+                      <a:pPr algn="ctr"/>
+                      <a:r>
+                        <a:rPr lang="pt-PT" sz="1400" dirty="0" err="1" smtClean="0"/>
+                        <a:t>district_id</a:t>
+                      </a:r>
+                      <a:endParaRPr lang="pt-PT" sz="1400" dirty="0"/>
+                    </a:p>
+                  </a:txBody>
+                  <a:tcPr>
+                    <a:solidFill>
+                      <a:srgbClr val="00568A"/>
+                    </a:solidFill>
+                  </a:tcPr>
+                </a:tc>
+                <a:tc>
+                  <a:txBody>
+                    <a:bodyPr/>
+                    <a:lstStyle/>
+                    <a:p>
+                      <a:pPr algn="ctr"/>
+                      <a:r>
+                        <a:rPr lang="pt-PT" sz="1400" dirty="0" err="1" smtClean="0"/>
+                        <a:t>frequency</a:t>
+                      </a:r>
+                      <a:endParaRPr lang="pt-PT" sz="1400" dirty="0"/>
+                    </a:p>
+                  </a:txBody>
+                  <a:tcPr>
+                    <a:solidFill>
+                      <a:srgbClr val="00568A"/>
+                    </a:solidFill>
+                  </a:tcPr>
+                </a:tc>
+                <a:tc>
+                  <a:txBody>
+                    <a:bodyPr/>
+                    <a:lstStyle/>
+                    <a:p>
+                      <a:pPr algn="ctr"/>
+                      <a:r>
+                        <a:rPr lang="pt-PT" sz="1400" dirty="0" smtClean="0"/>
+                        <a:t>date</a:t>
+                      </a:r>
+                      <a:endParaRPr lang="pt-PT" sz="1400" dirty="0"/>
+                    </a:p>
+                  </a:txBody>
+                  <a:tcPr>
+                    <a:solidFill>
+                      <a:srgbClr val="00568A"/>
+                    </a:solidFill>
+                  </a:tcPr>
+                </a:tc>
+              </a:tr>
+              <a:tr h="370840">
+                <a:tc>
+                  <a:txBody>
+                    <a:bodyPr/>
+                    <a:lstStyle/>
+                    <a:p>
+                      <a:pPr algn="ctr"/>
+                      <a:r>
+                        <a:rPr lang="pt-PT" sz="1400" dirty="0" smtClean="0"/>
+                        <a:t>576</a:t>
+                      </a:r>
+                      <a:endParaRPr lang="pt-PT" sz="1400" dirty="0"/>
+                    </a:p>
+                  </a:txBody>
+                  <a:tcPr/>
+                </a:tc>
+                <a:tc>
+                  <a:txBody>
+                    <a:bodyPr/>
+                    <a:lstStyle/>
+                    <a:p>
+                      <a:pPr algn="ctr"/>
+                      <a:r>
+                        <a:rPr lang="pt-PT" sz="1400" dirty="0" smtClean="0"/>
+                        <a:t>55</a:t>
+                      </a:r>
+                      <a:endParaRPr lang="pt-PT" sz="1400" dirty="0"/>
+                    </a:p>
+                  </a:txBody>
+                  <a:tcPr/>
+                </a:tc>
+                <a:tc>
+                  <a:txBody>
+                    <a:bodyPr/>
+                    <a:lstStyle/>
+                    <a:p>
+                      <a:pPr algn="ctr"/>
+                      <a:r>
+                        <a:rPr lang="pt-PT" sz="1400" dirty="0" err="1" smtClean="0"/>
+                        <a:t>monthly</a:t>
+                      </a:r>
+                      <a:r>
+                        <a:rPr lang="pt-PT" sz="1400" baseline="0" dirty="0" smtClean="0"/>
+                        <a:t> </a:t>
+                      </a:r>
+                      <a:r>
+                        <a:rPr lang="pt-PT" sz="1400" baseline="0" dirty="0" err="1" smtClean="0"/>
+                        <a:t>issuance</a:t>
+                      </a:r>
+                      <a:endParaRPr lang="pt-PT" sz="1400" dirty="0"/>
+                    </a:p>
+                  </a:txBody>
+                  <a:tcPr/>
+                </a:tc>
+                <a:tc>
+                  <a:txBody>
+                    <a:bodyPr/>
+                    <a:lstStyle/>
+                    <a:p>
+                      <a:pPr algn="ctr"/>
+                      <a:r>
+                        <a:rPr lang="pt-PT" sz="1400" dirty="0" smtClean="0"/>
+                        <a:t>930101</a:t>
+                      </a:r>
+                      <a:endParaRPr lang="pt-PT" sz="1400" dirty="0"/>
+                    </a:p>
+                  </a:txBody>
+                  <a:tcPr/>
+                </a:tc>
+              </a:tr>
+              <a:tr h="370840">
+                <a:tc>
+                  <a:txBody>
+                    <a:bodyPr/>
+                    <a:lstStyle/>
+                    <a:p>
+                      <a:pPr algn="ctr"/>
+                      <a:r>
+                        <a:rPr lang="pt-PT" sz="1400" dirty="0" smtClean="0"/>
+                        <a:t>3818</a:t>
+                      </a:r>
+                      <a:endParaRPr lang="pt-PT" sz="1400" dirty="0"/>
+                    </a:p>
+                  </a:txBody>
+                  <a:tcPr/>
+                </a:tc>
+                <a:tc>
+                  <a:txBody>
+                    <a:bodyPr/>
+                    <a:lstStyle/>
+                    <a:p>
+                      <a:pPr algn="ctr"/>
+                      <a:r>
+                        <a:rPr lang="pt-PT" sz="1400" dirty="0" smtClean="0"/>
+                        <a:t>74</a:t>
+                      </a:r>
+                      <a:endParaRPr lang="pt-PT" sz="1400" dirty="0"/>
+                    </a:p>
+                  </a:txBody>
+                  <a:tcPr/>
+                </a:tc>
+                <a:tc>
+                  <a:txBody>
+                    <a:bodyPr/>
+                    <a:lstStyle/>
+                    <a:p>
+                      <a:pPr marL="0" marR="0" indent="0" algn="ctr" defTabSz="914400" rtl="0" eaLnBrk="1" fontAlgn="auto" latinLnBrk="0" hangingPunct="1">
+                        <a:lnSpc>
+                          <a:spcPct val="100000"/>
+                        </a:lnSpc>
+                        <a:spcBef>
+                          <a:spcPts val="0"/>
+                        </a:spcBef>
+                        <a:spcAft>
+                          <a:spcPts val="0"/>
+                        </a:spcAft>
+                        <a:buClrTx/>
+                        <a:buSzTx/>
+                        <a:buFontTx/>
+                        <a:buNone/>
+                        <a:tabLst/>
+                        <a:defRPr/>
+                      </a:pPr>
+                      <a:r>
+                        <a:rPr lang="pt-PT" sz="1400" dirty="0" err="1" smtClean="0"/>
+                        <a:t>monthly</a:t>
+                      </a:r>
+                      <a:r>
+                        <a:rPr lang="pt-PT" sz="1400" baseline="0" dirty="0" smtClean="0"/>
+                        <a:t> </a:t>
+                      </a:r>
+                      <a:r>
+                        <a:rPr lang="pt-PT" sz="1400" baseline="0" dirty="0" err="1" smtClean="0"/>
+                        <a:t>issuance</a:t>
+                      </a:r>
+                      <a:endParaRPr lang="pt-PT" sz="1400" dirty="0" smtClean="0"/>
+                    </a:p>
+                  </a:txBody>
+                  <a:tcPr/>
+                </a:tc>
+                <a:tc>
+                  <a:txBody>
+                    <a:bodyPr/>
+                    <a:lstStyle/>
+                    <a:p>
+                      <a:pPr algn="ctr"/>
+                      <a:r>
+                        <a:rPr lang="pt-PT" sz="1400" dirty="0" smtClean="0"/>
+                        <a:t>930101</a:t>
+                      </a:r>
+                      <a:endParaRPr lang="pt-PT" sz="1400" dirty="0"/>
+                    </a:p>
+                  </a:txBody>
+                  <a:tcPr/>
+                </a:tc>
+              </a:tr>
+              <a:tr h="370840">
+                <a:tc>
+                  <a:txBody>
+                    <a:bodyPr/>
+                    <a:lstStyle/>
+                    <a:p>
+                      <a:pPr algn="ctr"/>
+                      <a:r>
+                        <a:rPr lang="pt-PT" sz="1400" dirty="0" smtClean="0"/>
+                        <a:t>704</a:t>
+                      </a:r>
+                      <a:endParaRPr lang="pt-PT" sz="1400" dirty="0"/>
+                    </a:p>
+                  </a:txBody>
+                  <a:tcPr/>
+                </a:tc>
+                <a:tc>
+                  <a:txBody>
+                    <a:bodyPr/>
+                    <a:lstStyle/>
+                    <a:p>
+                      <a:pPr algn="ctr"/>
+                      <a:r>
+                        <a:rPr lang="pt-PT" sz="1400" dirty="0" smtClean="0"/>
+                        <a:t>55</a:t>
+                      </a:r>
+                      <a:endParaRPr lang="pt-PT" sz="1400" dirty="0"/>
+                    </a:p>
+                  </a:txBody>
+                  <a:tcPr/>
+                </a:tc>
+                <a:tc>
+                  <a:txBody>
+                    <a:bodyPr/>
+                    <a:lstStyle/>
+                    <a:p>
+                      <a:pPr marL="0" marR="0" indent="0" algn="ctr" defTabSz="914400" rtl="0" eaLnBrk="1" fontAlgn="auto" latinLnBrk="0" hangingPunct="1">
+                        <a:lnSpc>
+                          <a:spcPct val="100000"/>
+                        </a:lnSpc>
+                        <a:spcBef>
+                          <a:spcPts val="0"/>
+                        </a:spcBef>
+                        <a:spcAft>
+                          <a:spcPts val="0"/>
+                        </a:spcAft>
+                        <a:buClrTx/>
+                        <a:buSzTx/>
+                        <a:buFontTx/>
+                        <a:buNone/>
+                        <a:tabLst/>
+                        <a:defRPr/>
+                      </a:pPr>
+                      <a:r>
+                        <a:rPr lang="pt-PT" sz="1400" dirty="0" err="1" smtClean="0"/>
+                        <a:t>monthly</a:t>
+                      </a:r>
+                      <a:r>
+                        <a:rPr lang="pt-PT" sz="1400" baseline="0" dirty="0" smtClean="0"/>
+                        <a:t> </a:t>
+                      </a:r>
+                      <a:r>
+                        <a:rPr lang="pt-PT" sz="1400" baseline="0" dirty="0" err="1" smtClean="0"/>
+                        <a:t>issuance</a:t>
+                      </a:r>
+                      <a:endParaRPr lang="pt-PT" sz="1400" dirty="0" smtClean="0"/>
+                    </a:p>
+                  </a:txBody>
+                  <a:tcPr/>
+                </a:tc>
+                <a:tc>
+                  <a:txBody>
+                    <a:bodyPr/>
+                    <a:lstStyle/>
+                    <a:p>
+                      <a:pPr algn="ctr"/>
+                      <a:r>
+                        <a:rPr lang="pt-PT" sz="1400" dirty="0" smtClean="0"/>
+                        <a:t>930101</a:t>
+                      </a:r>
+                      <a:endParaRPr lang="pt-PT" sz="1400" dirty="0"/>
+                    </a:p>
+                  </a:txBody>
+                  <a:tcPr/>
+                </a:tc>
+              </a:tr>
+            </a:tbl>
+          </a:graphicData>
+        </a:graphic>
+      </p:graphicFrame>
+      <p:sp>
+        <p:nvSpPr>
+          <p:cNvPr id="11" name="CaixaDeTexto 10"/>
+          <p:cNvSpPr txBox="1"/>
+          <p:nvPr/>
+        </p:nvSpPr>
+        <p:spPr>
+          <a:xfrm>
+            <a:off x="531496" y="4011212"/>
+            <a:ext cx="2088084" cy="335756"/>
+          </a:xfrm>
+          <a:prstGeom prst="rect">
+            <a:avLst/>
+          </a:prstGeom>
+          <a:noFill/>
+        </p:spPr>
+        <p:txBody>
+          <a:bodyPr wrap="square" rtlCol="0">
+            <a:spAutoFit/>
+          </a:bodyPr>
+          <a:lstStyle/>
+          <a:p>
+            <a:r>
+              <a:rPr lang="pt-PT" b="1" dirty="0" err="1" smtClean="0"/>
+              <a:t>Account</a:t>
+            </a:r>
+            <a:endParaRPr lang="pt-PT" b="1" dirty="0"/>
+          </a:p>
+        </p:txBody>
+      </p:sp>
+      <p:sp>
+        <p:nvSpPr>
+          <p:cNvPr id="12" name="CaixaDeTexto 11"/>
+          <p:cNvSpPr txBox="1"/>
+          <p:nvPr/>
+        </p:nvSpPr>
+        <p:spPr>
+          <a:xfrm>
+            <a:off x="5454641" y="1900973"/>
+            <a:ext cx="2402022" cy="369332"/>
+          </a:xfrm>
+          <a:prstGeom prst="rect">
+            <a:avLst/>
+          </a:prstGeom>
+          <a:noFill/>
+        </p:spPr>
+        <p:txBody>
+          <a:bodyPr wrap="square" rtlCol="0">
+            <a:spAutoFit/>
+          </a:bodyPr>
+          <a:lstStyle/>
+          <a:p>
+            <a:r>
+              <a:rPr lang="pt-PT" b="1" dirty="0" err="1" smtClean="0"/>
+              <a:t>Credit</a:t>
+            </a:r>
+            <a:r>
+              <a:rPr lang="pt-PT" b="1" dirty="0" smtClean="0"/>
+              <a:t> </a:t>
+            </a:r>
+            <a:r>
+              <a:rPr lang="pt-PT" b="1" dirty="0" err="1" smtClean="0"/>
+              <a:t>card</a:t>
+            </a:r>
+            <a:r>
+              <a:rPr lang="pt-PT" b="1" dirty="0" smtClean="0"/>
+              <a:t> (</a:t>
+            </a:r>
+            <a:r>
+              <a:rPr lang="pt-PT" b="1" dirty="0" err="1" smtClean="0"/>
+              <a:t>sanctions</a:t>
+            </a:r>
+            <a:r>
+              <a:rPr lang="pt-PT" b="1" dirty="0" smtClean="0"/>
+              <a:t>)</a:t>
+            </a:r>
+            <a:endParaRPr lang="pt-PT" b="1" dirty="0"/>
+          </a:p>
+        </p:txBody>
+      </p:sp>
+      <p:graphicFrame>
+        <p:nvGraphicFramePr>
+          <p:cNvPr id="13" name="Tabela 12"/>
+          <p:cNvGraphicFramePr>
+            <a:graphicFrameLocks noGrp="1"/>
+          </p:cNvGraphicFramePr>
+          <p:nvPr>
+            <p:extLst>
+              <p:ext uri="{D42A27DB-BD31-4B8C-83A1-F6EECF244321}">
+                <p14:modId xmlns:p14="http://schemas.microsoft.com/office/powerpoint/2010/main" val="1974308786"/>
+              </p:ext>
+            </p:extLst>
+          </p:nvPr>
+        </p:nvGraphicFramePr>
+        <p:xfrm>
+          <a:off x="5534851" y="2373844"/>
+          <a:ext cx="5188405" cy="1460028"/>
+        </p:xfrm>
+        <a:graphic>
+          <a:graphicData uri="http://schemas.openxmlformats.org/drawingml/2006/table">
+            <a:tbl>
+              <a:tblPr firstRow="1" bandRow="1">
+                <a:tableStyleId>{5C22544A-7EE6-4342-B048-85BDC9FD1C3A}</a:tableStyleId>
+              </a:tblPr>
+              <a:tblGrid>
+                <a:gridCol w="768795"/>
+                <a:gridCol w="857415"/>
+                <a:gridCol w="679768"/>
+                <a:gridCol w="765493"/>
+                <a:gridCol w="1033082"/>
+                <a:gridCol w="1083852"/>
+              </a:tblGrid>
+              <a:tr h="347508">
+                <a:tc>
+                  <a:txBody>
+                    <a:bodyPr/>
+                    <a:lstStyle/>
+                    <a:p>
+                      <a:pPr algn="ctr"/>
+                      <a:r>
+                        <a:rPr lang="pt-PT" sz="1400" dirty="0" err="1" smtClean="0"/>
+                        <a:t>card_id</a:t>
+                      </a:r>
+                      <a:endParaRPr lang="pt-PT" sz="1400" dirty="0"/>
+                    </a:p>
+                  </a:txBody>
+                  <a:tcPr>
+                    <a:solidFill>
+                      <a:srgbClr val="00568A"/>
+                    </a:solidFill>
+                  </a:tcPr>
+                </a:tc>
+                <a:tc>
+                  <a:txBody>
+                    <a:bodyPr/>
+                    <a:lstStyle/>
+                    <a:p>
+                      <a:pPr algn="ctr"/>
+                      <a:r>
+                        <a:rPr lang="pt-PT" sz="1400" dirty="0" err="1" smtClean="0"/>
+                        <a:t>disp_id</a:t>
+                      </a:r>
+                      <a:endParaRPr lang="pt-PT" sz="1400" dirty="0"/>
+                    </a:p>
+                  </a:txBody>
+                  <a:tcPr>
+                    <a:solidFill>
+                      <a:srgbClr val="00568A"/>
+                    </a:solidFill>
+                  </a:tcPr>
+                </a:tc>
+                <a:tc>
+                  <a:txBody>
+                    <a:bodyPr/>
+                    <a:lstStyle/>
+                    <a:p>
+                      <a:pPr algn="ctr"/>
+                      <a:r>
+                        <a:rPr lang="pt-PT" sz="1400" dirty="0" err="1" smtClean="0"/>
+                        <a:t>type</a:t>
+                      </a:r>
+                      <a:endParaRPr lang="pt-PT" sz="1400" dirty="0"/>
+                    </a:p>
+                  </a:txBody>
+                  <a:tcPr>
+                    <a:solidFill>
+                      <a:srgbClr val="00568A"/>
+                    </a:solidFill>
+                  </a:tcPr>
+                </a:tc>
+                <a:tc>
+                  <a:txBody>
+                    <a:bodyPr/>
+                    <a:lstStyle/>
+                    <a:p>
+                      <a:pPr algn="ctr"/>
+                      <a:r>
+                        <a:rPr lang="pt-PT" sz="1400" dirty="0" err="1" smtClean="0"/>
+                        <a:t>issued</a:t>
+                      </a:r>
+                      <a:endParaRPr lang="pt-PT" sz="1400" dirty="0"/>
+                    </a:p>
+                  </a:txBody>
+                  <a:tcPr>
+                    <a:solidFill>
+                      <a:srgbClr val="00568A"/>
+                    </a:solidFill>
+                  </a:tcPr>
+                </a:tc>
+                <a:tc>
+                  <a:txBody>
+                    <a:bodyPr/>
+                    <a:lstStyle/>
+                    <a:p>
+                      <a:pPr algn="ctr"/>
+                      <a:r>
+                        <a:rPr lang="pt-PT" sz="1400" dirty="0" err="1" smtClean="0"/>
+                        <a:t>account_id</a:t>
+                      </a:r>
+                      <a:endParaRPr lang="pt-PT" sz="1400" dirty="0"/>
+                    </a:p>
+                  </a:txBody>
+                  <a:tcPr>
+                    <a:solidFill>
+                      <a:srgbClr val="00568A"/>
+                    </a:solidFill>
+                  </a:tcPr>
+                </a:tc>
+                <a:tc>
+                  <a:txBody>
+                    <a:bodyPr/>
+                    <a:lstStyle/>
+                    <a:p>
+                      <a:pPr algn="ctr"/>
+                      <a:r>
+                        <a:rPr lang="pt-PT" sz="1400" dirty="0" err="1" smtClean="0"/>
+                        <a:t>k_symbol</a:t>
+                      </a:r>
+                      <a:endParaRPr lang="pt-PT" sz="1400" dirty="0"/>
+                    </a:p>
+                  </a:txBody>
+                  <a:tcPr>
+                    <a:solidFill>
+                      <a:srgbClr val="00568A"/>
+                    </a:solidFill>
+                  </a:tcPr>
+                </a:tc>
+              </a:tr>
+              <a:tr h="370840">
+                <a:tc>
+                  <a:txBody>
+                    <a:bodyPr/>
+                    <a:lstStyle/>
+                    <a:p>
+                      <a:pPr algn="ctr"/>
+                      <a:r>
+                        <a:rPr lang="pt-PT" sz="1400" dirty="0" smtClean="0"/>
+                        <a:t>1005</a:t>
+                      </a:r>
+                      <a:endParaRPr lang="pt-PT" sz="1400" dirty="0"/>
+                    </a:p>
+                  </a:txBody>
+                  <a:tcPr/>
+                </a:tc>
+                <a:tc>
+                  <a:txBody>
+                    <a:bodyPr/>
+                    <a:lstStyle/>
+                    <a:p>
+                      <a:pPr algn="ctr"/>
+                      <a:r>
+                        <a:rPr lang="pt-PT" sz="1400" dirty="0" smtClean="0"/>
+                        <a:t>9285</a:t>
+                      </a:r>
+                      <a:endParaRPr lang="pt-PT" sz="1400" dirty="0"/>
+                    </a:p>
+                  </a:txBody>
+                  <a:tcPr/>
+                </a:tc>
+                <a:tc>
+                  <a:txBody>
+                    <a:bodyPr/>
+                    <a:lstStyle/>
+                    <a:p>
+                      <a:pPr algn="ctr"/>
+                      <a:r>
+                        <a:rPr lang="pt-PT" sz="1400" dirty="0" err="1" smtClean="0"/>
+                        <a:t>classic</a:t>
+                      </a:r>
+                      <a:endParaRPr lang="pt-PT" sz="1400" dirty="0"/>
+                    </a:p>
+                  </a:txBody>
+                  <a:tcPr/>
+                </a:tc>
+                <a:tc>
+                  <a:txBody>
+                    <a:bodyPr/>
+                    <a:lstStyle/>
+                    <a:p>
+                      <a:pPr algn="ctr"/>
+                      <a:r>
+                        <a:rPr lang="pt-PT" sz="1400" dirty="0" smtClean="0"/>
+                        <a:t>931107</a:t>
+                      </a:r>
+                      <a:endParaRPr lang="pt-PT" sz="1400" dirty="0"/>
+                    </a:p>
+                  </a:txBody>
+                  <a:tcPr/>
+                </a:tc>
+                <a:tc>
+                  <a:txBody>
+                    <a:bodyPr/>
+                    <a:lstStyle/>
+                    <a:p>
+                      <a:pPr algn="ctr"/>
+                      <a:r>
+                        <a:rPr lang="pt-PT" sz="1400" dirty="0" smtClean="0"/>
+                        <a:t>5740</a:t>
+                      </a:r>
+                      <a:endParaRPr lang="pt-PT" sz="1400" dirty="0"/>
+                    </a:p>
+                  </a:txBody>
+                  <a:tcPr/>
+                </a:tc>
+                <a:tc>
+                  <a:txBody>
+                    <a:bodyPr/>
+                    <a:lstStyle/>
+                    <a:p>
+                      <a:pPr algn="ctr"/>
+                      <a:r>
+                        <a:rPr lang="pt-PT" sz="1400" dirty="0" smtClean="0"/>
+                        <a:t>negative ...</a:t>
+                      </a:r>
+                      <a:endParaRPr lang="pt-PT" sz="1400" dirty="0"/>
+                    </a:p>
+                  </a:txBody>
+                  <a:tcPr/>
+                </a:tc>
+              </a:tr>
+              <a:tr h="370840">
+                <a:tc>
+                  <a:txBody>
+                    <a:bodyPr/>
+                    <a:lstStyle/>
+                    <a:p>
+                      <a:pPr algn="ctr"/>
+                      <a:r>
+                        <a:rPr lang="pt-PT" sz="1400" dirty="0" smtClean="0"/>
+                        <a:t>104</a:t>
+                      </a:r>
+                      <a:endParaRPr lang="pt-PT" sz="1400" dirty="0"/>
+                    </a:p>
+                  </a:txBody>
+                  <a:tcPr/>
+                </a:tc>
+                <a:tc>
+                  <a:txBody>
+                    <a:bodyPr/>
+                    <a:lstStyle/>
+                    <a:p>
+                      <a:pPr algn="ctr"/>
+                      <a:r>
+                        <a:rPr lang="pt-PT" sz="1400" dirty="0" smtClean="0"/>
+                        <a:t>588</a:t>
+                      </a:r>
+                      <a:endParaRPr lang="pt-PT" sz="1400" dirty="0"/>
+                    </a:p>
+                  </a:txBody>
+                  <a:tcPr/>
+                </a:tc>
+                <a:tc>
+                  <a:txBody>
+                    <a:bodyPr/>
+                    <a:lstStyle/>
+                    <a:p>
+                      <a:pPr algn="ctr"/>
+                      <a:r>
+                        <a:rPr lang="pt-PT" sz="1400" dirty="0" err="1" smtClean="0"/>
+                        <a:t>classic</a:t>
+                      </a:r>
+                      <a:endParaRPr lang="pt-PT" sz="1400" dirty="0"/>
+                    </a:p>
+                  </a:txBody>
+                  <a:tcPr/>
+                </a:tc>
+                <a:tc>
+                  <a:txBody>
+                    <a:bodyPr/>
+                    <a:lstStyle/>
+                    <a:p>
+                      <a:pPr algn="ctr"/>
+                      <a:r>
+                        <a:rPr lang="pt-PT" sz="1400" dirty="0" smtClean="0"/>
+                        <a:t>940119</a:t>
+                      </a:r>
+                      <a:endParaRPr lang="pt-PT" sz="1400" dirty="0"/>
+                    </a:p>
+                  </a:txBody>
+                  <a:tcPr/>
+                </a:tc>
+                <a:tc>
+                  <a:txBody>
+                    <a:bodyPr/>
+                    <a:lstStyle/>
+                    <a:p>
+                      <a:pPr algn="ctr"/>
+                      <a:r>
+                        <a:rPr lang="pt-PT" sz="1400" dirty="0" smtClean="0"/>
+                        <a:t>4034</a:t>
+                      </a:r>
+                      <a:endParaRPr lang="pt-PT" sz="1400" dirty="0"/>
+                    </a:p>
+                  </a:txBody>
+                  <a:tcPr/>
+                </a:tc>
+                <a:tc>
+                  <a:txBody>
+                    <a:bodyPr/>
+                    <a:lstStyle/>
+                    <a:p>
+                      <a:pPr algn="ctr"/>
+                      <a:r>
+                        <a:rPr lang="pt-PT" sz="1400" dirty="0" smtClean="0"/>
+                        <a:t>negative ...</a:t>
+                      </a:r>
+                      <a:endParaRPr lang="pt-PT" sz="1400" dirty="0"/>
+                    </a:p>
+                  </a:txBody>
+                  <a:tcPr/>
+                </a:tc>
+              </a:tr>
+              <a:tr h="370840">
+                <a:tc>
+                  <a:txBody>
+                    <a:bodyPr/>
+                    <a:lstStyle/>
+                    <a:p>
+                      <a:pPr algn="ctr"/>
+                      <a:r>
+                        <a:rPr lang="pt-PT" sz="1400" dirty="0" smtClean="0"/>
+                        <a:t>747</a:t>
+                      </a:r>
+                      <a:endParaRPr lang="pt-PT" sz="1400" dirty="0"/>
+                    </a:p>
+                  </a:txBody>
+                  <a:tcPr/>
+                </a:tc>
+                <a:tc>
+                  <a:txBody>
+                    <a:bodyPr/>
+                    <a:lstStyle/>
+                    <a:p>
+                      <a:pPr algn="ctr"/>
+                      <a:r>
+                        <a:rPr lang="pt-PT" sz="1400" dirty="0" smtClean="0"/>
+                        <a:t>4915</a:t>
+                      </a:r>
+                      <a:endParaRPr lang="pt-PT" sz="1400" dirty="0"/>
+                    </a:p>
+                  </a:txBody>
+                  <a:tcPr/>
+                </a:tc>
+                <a:tc>
+                  <a:txBody>
+                    <a:bodyPr/>
+                    <a:lstStyle/>
+                    <a:p>
+                      <a:pPr algn="ctr"/>
+                      <a:r>
+                        <a:rPr lang="pt-PT" sz="1400" dirty="0" err="1" smtClean="0"/>
+                        <a:t>classic</a:t>
+                      </a:r>
+                      <a:endParaRPr lang="pt-PT" sz="1400" dirty="0"/>
+                    </a:p>
+                  </a:txBody>
+                  <a:tcPr/>
+                </a:tc>
+                <a:tc>
+                  <a:txBody>
+                    <a:bodyPr/>
+                    <a:lstStyle/>
+                    <a:p>
+                      <a:pPr algn="ctr"/>
+                      <a:r>
+                        <a:rPr lang="pt-PT" sz="1400" dirty="0" smtClean="0"/>
+                        <a:t>940205</a:t>
+                      </a:r>
+                      <a:endParaRPr lang="pt-PT" sz="1400" dirty="0"/>
+                    </a:p>
+                  </a:txBody>
+                  <a:tcPr/>
+                </a:tc>
+                <a:tc>
+                  <a:txBody>
+                    <a:bodyPr/>
+                    <a:lstStyle/>
+                    <a:p>
+                      <a:pPr algn="ctr"/>
+                      <a:r>
+                        <a:rPr lang="pt-PT" sz="1400" dirty="0" smtClean="0"/>
+                        <a:t>1539</a:t>
+                      </a:r>
+                      <a:endParaRPr lang="pt-PT" sz="1400" dirty="0"/>
+                    </a:p>
+                  </a:txBody>
+                  <a:tcPr/>
+                </a:tc>
+                <a:tc>
+                  <a:txBody>
+                    <a:bodyPr/>
+                    <a:lstStyle/>
+                    <a:p>
+                      <a:pPr algn="ctr"/>
+                      <a:r>
+                        <a:rPr lang="pt-PT" sz="1400" dirty="0" smtClean="0"/>
+                        <a:t>negative ...</a:t>
+                      </a:r>
+                      <a:endParaRPr lang="pt-PT" sz="1400" dirty="0"/>
+                    </a:p>
+                  </a:txBody>
+                  <a:tcPr/>
+                </a:tc>
+              </a:tr>
+            </a:tbl>
+          </a:graphicData>
+        </a:graphic>
+      </p:graphicFrame>
+      <p:graphicFrame>
+        <p:nvGraphicFramePr>
+          <p:cNvPr id="14" name="Tabela 13"/>
+          <p:cNvGraphicFramePr>
+            <a:graphicFrameLocks noGrp="1"/>
+          </p:cNvGraphicFramePr>
+          <p:nvPr>
+            <p:extLst>
+              <p:ext uri="{D42A27DB-BD31-4B8C-83A1-F6EECF244321}">
+                <p14:modId xmlns:p14="http://schemas.microsoft.com/office/powerpoint/2010/main" val="315743031"/>
+              </p:ext>
+            </p:extLst>
+          </p:nvPr>
+        </p:nvGraphicFramePr>
+        <p:xfrm>
+          <a:off x="5504370" y="4560416"/>
+          <a:ext cx="6212459" cy="1460028"/>
+        </p:xfrm>
+        <a:graphic>
+          <a:graphicData uri="http://schemas.openxmlformats.org/drawingml/2006/table">
+            <a:tbl>
+              <a:tblPr firstRow="1" bandRow="1">
+                <a:tableStyleId>{5C22544A-7EE6-4342-B048-85BDC9FD1C3A}</a:tableStyleId>
+              </a:tblPr>
+              <a:tblGrid>
+                <a:gridCol w="855408"/>
+                <a:gridCol w="1100455"/>
+                <a:gridCol w="765492"/>
+                <a:gridCol w="586105"/>
+                <a:gridCol w="1120013"/>
+                <a:gridCol w="800418"/>
+                <a:gridCol w="984568"/>
+              </a:tblGrid>
+              <a:tr h="347508">
+                <a:tc>
+                  <a:txBody>
+                    <a:bodyPr/>
+                    <a:lstStyle/>
+                    <a:p>
+                      <a:pPr algn="ctr"/>
+                      <a:r>
+                        <a:rPr lang="pt-PT" sz="1400" dirty="0" err="1" smtClean="0"/>
+                        <a:t>order_id</a:t>
+                      </a:r>
+                      <a:endParaRPr lang="pt-PT" sz="1400" dirty="0"/>
+                    </a:p>
+                  </a:txBody>
+                  <a:tcPr>
+                    <a:solidFill>
+                      <a:srgbClr val="00568A"/>
+                    </a:solidFill>
+                  </a:tcPr>
+                </a:tc>
+                <a:tc>
+                  <a:txBody>
+                    <a:bodyPr/>
+                    <a:lstStyle/>
+                    <a:p>
+                      <a:pPr algn="ctr"/>
+                      <a:r>
+                        <a:rPr lang="pt-PT" sz="1400" dirty="0" err="1" smtClean="0"/>
+                        <a:t>account_src</a:t>
+                      </a:r>
+                      <a:endParaRPr lang="pt-PT" sz="1400" dirty="0"/>
+                    </a:p>
+                  </a:txBody>
+                  <a:tcPr>
+                    <a:solidFill>
+                      <a:srgbClr val="00568A"/>
+                    </a:solidFill>
+                  </a:tcPr>
+                </a:tc>
+                <a:tc>
+                  <a:txBody>
+                    <a:bodyPr/>
+                    <a:lstStyle/>
+                    <a:p>
+                      <a:pPr algn="ctr"/>
+                      <a:r>
+                        <a:rPr lang="pt-PT" sz="1400" dirty="0" smtClean="0"/>
+                        <a:t>date</a:t>
+                      </a:r>
+                      <a:endParaRPr lang="pt-PT" sz="1400" dirty="0"/>
+                    </a:p>
+                  </a:txBody>
+                  <a:tcPr>
+                    <a:solidFill>
+                      <a:srgbClr val="00568A"/>
+                    </a:solidFill>
+                  </a:tcPr>
+                </a:tc>
+                <a:tc>
+                  <a:txBody>
+                    <a:bodyPr/>
+                    <a:lstStyle/>
+                    <a:p>
+                      <a:pPr algn="ctr"/>
+                      <a:r>
+                        <a:rPr lang="pt-PT" sz="1400" dirty="0" err="1" smtClean="0"/>
+                        <a:t>bank</a:t>
+                      </a:r>
+                      <a:endParaRPr lang="pt-PT" sz="1400" dirty="0"/>
+                    </a:p>
+                  </a:txBody>
+                  <a:tcPr>
+                    <a:solidFill>
+                      <a:srgbClr val="00568A"/>
+                    </a:solidFill>
+                  </a:tcPr>
+                </a:tc>
+                <a:tc>
+                  <a:txBody>
+                    <a:bodyPr/>
+                    <a:lstStyle/>
+                    <a:p>
+                      <a:pPr algn="ctr"/>
+                      <a:r>
+                        <a:rPr lang="pt-PT" sz="1400" dirty="0" err="1" smtClean="0"/>
+                        <a:t>account_dst</a:t>
+                      </a:r>
+                      <a:endParaRPr lang="pt-PT" sz="1400" dirty="0"/>
+                    </a:p>
+                  </a:txBody>
+                  <a:tcPr>
+                    <a:solidFill>
+                      <a:srgbClr val="00568A"/>
+                    </a:solidFill>
+                  </a:tcPr>
+                </a:tc>
+                <a:tc>
+                  <a:txBody>
+                    <a:bodyPr/>
+                    <a:lstStyle/>
+                    <a:p>
+                      <a:pPr algn="ctr"/>
+                      <a:r>
+                        <a:rPr lang="pt-PT" sz="1400" dirty="0" err="1" smtClean="0"/>
+                        <a:t>amount</a:t>
+                      </a:r>
+                      <a:endParaRPr lang="pt-PT" sz="1400" dirty="0"/>
+                    </a:p>
+                  </a:txBody>
+                  <a:tcPr>
+                    <a:solidFill>
+                      <a:srgbClr val="00568A"/>
+                    </a:solidFill>
+                  </a:tcPr>
+                </a:tc>
+                <a:tc>
+                  <a:txBody>
+                    <a:bodyPr/>
+                    <a:lstStyle/>
+                    <a:p>
+                      <a:pPr algn="ctr"/>
+                      <a:r>
+                        <a:rPr lang="pt-PT" sz="1400" dirty="0" err="1" smtClean="0"/>
+                        <a:t>k_symbol</a:t>
+                      </a:r>
+                      <a:endParaRPr lang="pt-PT" sz="1400" dirty="0"/>
+                    </a:p>
+                  </a:txBody>
+                  <a:tcPr>
+                    <a:solidFill>
+                      <a:srgbClr val="00568A"/>
+                    </a:solidFill>
+                  </a:tcPr>
+                </a:tc>
+              </a:tr>
+              <a:tr h="370840">
+                <a:tc>
+                  <a:txBody>
+                    <a:bodyPr/>
+                    <a:lstStyle/>
+                    <a:p>
+                      <a:pPr algn="ctr"/>
+                      <a:r>
+                        <a:rPr lang="pt-PT" sz="1400" dirty="0" smtClean="0"/>
+                        <a:t>1</a:t>
+                      </a:r>
+                      <a:endParaRPr lang="pt-PT" sz="1400" dirty="0"/>
+                    </a:p>
+                  </a:txBody>
+                  <a:tcPr/>
+                </a:tc>
+                <a:tc>
+                  <a:txBody>
+                    <a:bodyPr/>
+                    <a:lstStyle/>
+                    <a:p>
+                      <a:pPr algn="ctr"/>
+                      <a:r>
+                        <a:rPr lang="pt-PT" sz="1400" dirty="0" smtClean="0"/>
+                        <a:t>2</a:t>
+                      </a:r>
+                      <a:endParaRPr lang="pt-PT" sz="1400" dirty="0"/>
+                    </a:p>
+                  </a:txBody>
+                  <a:tcPr/>
+                </a:tc>
+                <a:tc>
+                  <a:txBody>
+                    <a:bodyPr/>
+                    <a:lstStyle/>
+                    <a:p>
+                      <a:pPr algn="ctr"/>
+                      <a:r>
+                        <a:rPr lang="pt-PT" sz="1400" dirty="0" smtClean="0"/>
+                        <a:t>931105</a:t>
+                      </a:r>
+                      <a:endParaRPr lang="pt-PT" sz="1400" dirty="0"/>
+                    </a:p>
+                  </a:txBody>
+                  <a:tcPr/>
+                </a:tc>
+                <a:tc>
+                  <a:txBody>
+                    <a:bodyPr/>
+                    <a:lstStyle/>
+                    <a:p>
+                      <a:pPr algn="ctr"/>
+                      <a:r>
+                        <a:rPr lang="pt-PT" sz="1400" dirty="0" smtClean="0"/>
+                        <a:t>QR</a:t>
+                      </a:r>
+                      <a:endParaRPr lang="pt-PT" sz="1400" dirty="0"/>
+                    </a:p>
+                  </a:txBody>
+                  <a:tcPr/>
+                </a:tc>
+                <a:tc>
+                  <a:txBody>
+                    <a:bodyPr/>
+                    <a:lstStyle/>
+                    <a:p>
+                      <a:pPr algn="ctr"/>
+                      <a:r>
+                        <a:rPr lang="pt-PT" sz="1400" dirty="0" smtClean="0"/>
+                        <a:t>13943797</a:t>
+                      </a:r>
+                      <a:endParaRPr lang="pt-PT" sz="1400" dirty="0"/>
+                    </a:p>
+                  </a:txBody>
+                  <a:tcPr/>
+                </a:tc>
+                <a:tc>
+                  <a:txBody>
+                    <a:bodyPr/>
+                    <a:lstStyle/>
+                    <a:p>
+                      <a:pPr algn="ctr"/>
+                      <a:r>
+                        <a:rPr lang="pt-PT" sz="1400" dirty="0" smtClean="0"/>
+                        <a:t>7266</a:t>
+                      </a:r>
+                      <a:endParaRPr lang="pt-PT" sz="1400" dirty="0"/>
+                    </a:p>
+                  </a:txBody>
+                  <a:tcPr/>
+                </a:tc>
+                <a:tc>
+                  <a:txBody>
+                    <a:bodyPr/>
+                    <a:lstStyle/>
+                    <a:p>
+                      <a:pPr algn="ctr"/>
+                      <a:r>
+                        <a:rPr lang="pt-PT" sz="1400" dirty="0" err="1" smtClean="0"/>
+                        <a:t>household</a:t>
+                      </a:r>
+                      <a:endParaRPr lang="pt-PT" sz="1400" dirty="0"/>
+                    </a:p>
+                  </a:txBody>
+                  <a:tcPr/>
+                </a:tc>
+              </a:tr>
+              <a:tr h="370840">
+                <a:tc>
+                  <a:txBody>
+                    <a:bodyPr/>
+                    <a:lstStyle/>
+                    <a:p>
+                      <a:pPr algn="ctr"/>
+                      <a:r>
+                        <a:rPr lang="pt-PT" sz="1400" dirty="0" smtClean="0"/>
+                        <a:t>2</a:t>
+                      </a:r>
+                      <a:endParaRPr lang="pt-PT" sz="1400" dirty="0"/>
+                    </a:p>
+                  </a:txBody>
+                  <a:tcPr/>
+                </a:tc>
+                <a:tc>
+                  <a:txBody>
+                    <a:bodyPr/>
+                    <a:lstStyle/>
+                    <a:p>
+                      <a:pPr algn="ctr"/>
+                      <a:r>
+                        <a:rPr lang="pt-PT" sz="1400" dirty="0" smtClean="0"/>
+                        <a:t>2</a:t>
+                      </a:r>
+                      <a:endParaRPr lang="pt-PT" sz="1400" dirty="0"/>
+                    </a:p>
+                  </a:txBody>
+                  <a:tcPr/>
+                </a:tc>
+                <a:tc>
+                  <a:txBody>
+                    <a:bodyPr/>
+                    <a:lstStyle/>
+                    <a:p>
+                      <a:pPr algn="ctr"/>
+                      <a:r>
+                        <a:rPr lang="pt-PT" sz="1400" dirty="0" smtClean="0"/>
+                        <a:t>930905</a:t>
+                      </a:r>
+                      <a:endParaRPr lang="pt-PT" sz="1400" dirty="0"/>
+                    </a:p>
+                  </a:txBody>
+                  <a:tcPr/>
+                </a:tc>
+                <a:tc>
+                  <a:txBody>
+                    <a:bodyPr/>
+                    <a:lstStyle/>
+                    <a:p>
+                      <a:pPr algn="ctr"/>
+                      <a:r>
+                        <a:rPr lang="pt-PT" sz="1400" dirty="0" smtClean="0"/>
+                        <a:t>QR</a:t>
+                      </a:r>
+                      <a:endParaRPr lang="pt-PT" sz="1400" dirty="0"/>
+                    </a:p>
+                  </a:txBody>
+                  <a:tcPr/>
+                </a:tc>
+                <a:tc>
+                  <a:txBody>
+                    <a:bodyPr/>
+                    <a:lstStyle/>
+                    <a:p>
+                      <a:pPr algn="ctr"/>
+                      <a:r>
+                        <a:rPr lang="pt-PT" sz="1400" dirty="0" smtClean="0"/>
+                        <a:t>13943797</a:t>
+                      </a:r>
+                      <a:endParaRPr lang="pt-PT" sz="1400" dirty="0"/>
+                    </a:p>
+                  </a:txBody>
+                  <a:tcPr/>
+                </a:tc>
+                <a:tc>
+                  <a:txBody>
+                    <a:bodyPr/>
+                    <a:lstStyle/>
+                    <a:p>
+                      <a:pPr algn="ctr"/>
+                      <a:r>
+                        <a:rPr lang="pt-PT" sz="1400" dirty="0" smtClean="0"/>
+                        <a:t>7266</a:t>
+                      </a:r>
+                      <a:endParaRPr lang="pt-PT" sz="1400" dirty="0"/>
+                    </a:p>
+                  </a:txBody>
+                  <a:tcPr/>
+                </a:tc>
+                <a:tc>
+                  <a:txBody>
+                    <a:bodyPr/>
+                    <a:lstStyle/>
+                    <a:p>
+                      <a:pPr algn="ctr"/>
+                      <a:r>
+                        <a:rPr lang="pt-PT" sz="1400" dirty="0" err="1" smtClean="0"/>
+                        <a:t>household</a:t>
+                      </a:r>
+                      <a:endParaRPr lang="pt-PT" sz="1400" dirty="0"/>
+                    </a:p>
+                  </a:txBody>
+                  <a:tcPr/>
+                </a:tc>
+              </a:tr>
+              <a:tr h="370840">
+                <a:tc>
+                  <a:txBody>
+                    <a:bodyPr/>
+                    <a:lstStyle/>
+                    <a:p>
+                      <a:pPr algn="ctr"/>
+                      <a:r>
+                        <a:rPr lang="pt-PT" sz="1400" dirty="0" smtClean="0"/>
+                        <a:t>3</a:t>
+                      </a:r>
+                      <a:endParaRPr lang="pt-PT" sz="1400" dirty="0"/>
+                    </a:p>
+                  </a:txBody>
+                  <a:tcPr/>
+                </a:tc>
+                <a:tc>
+                  <a:txBody>
+                    <a:bodyPr/>
+                    <a:lstStyle/>
+                    <a:p>
+                      <a:pPr algn="ctr"/>
+                      <a:r>
+                        <a:rPr lang="pt-PT" sz="1400" dirty="0" smtClean="0"/>
+                        <a:t>2</a:t>
+                      </a:r>
+                      <a:endParaRPr lang="pt-PT" sz="1400" dirty="0"/>
+                    </a:p>
+                  </a:txBody>
+                  <a:tcPr/>
+                </a:tc>
+                <a:tc>
+                  <a:txBody>
+                    <a:bodyPr/>
+                    <a:lstStyle/>
+                    <a:p>
+                      <a:pPr algn="ctr"/>
+                      <a:r>
+                        <a:rPr lang="pt-PT" sz="1400" dirty="0" smtClean="0"/>
+                        <a:t>931205</a:t>
+                      </a:r>
+                      <a:endParaRPr lang="pt-PT" sz="1400" dirty="0"/>
+                    </a:p>
+                  </a:txBody>
+                  <a:tcPr/>
+                </a:tc>
+                <a:tc>
+                  <a:txBody>
+                    <a:bodyPr/>
+                    <a:lstStyle/>
+                    <a:p>
+                      <a:pPr algn="ctr"/>
+                      <a:r>
+                        <a:rPr lang="pt-PT" sz="1400" dirty="0" smtClean="0"/>
+                        <a:t>QR</a:t>
+                      </a:r>
+                      <a:endParaRPr lang="pt-PT" sz="1400" dirty="0"/>
+                    </a:p>
+                  </a:txBody>
+                  <a:tcPr/>
+                </a:tc>
+                <a:tc>
+                  <a:txBody>
+                    <a:bodyPr/>
+                    <a:lstStyle/>
+                    <a:p>
+                      <a:pPr algn="ctr"/>
+                      <a:r>
+                        <a:rPr lang="pt-PT" sz="1400" dirty="0" smtClean="0"/>
+                        <a:t>13943797</a:t>
+                      </a:r>
+                      <a:endParaRPr lang="pt-PT" sz="1400" dirty="0"/>
+                    </a:p>
+                  </a:txBody>
+                  <a:tcPr/>
+                </a:tc>
+                <a:tc>
+                  <a:txBody>
+                    <a:bodyPr/>
+                    <a:lstStyle/>
+                    <a:p>
+                      <a:pPr algn="ctr"/>
+                      <a:r>
+                        <a:rPr lang="pt-PT" sz="1400" dirty="0" smtClean="0"/>
+                        <a:t>7266</a:t>
+                      </a:r>
+                      <a:endParaRPr lang="pt-PT" sz="1400" dirty="0"/>
+                    </a:p>
+                  </a:txBody>
+                  <a:tcPr/>
+                </a:tc>
+                <a:tc>
+                  <a:txBody>
+                    <a:bodyPr/>
+                    <a:lstStyle/>
+                    <a:p>
+                      <a:pPr algn="ctr"/>
+                      <a:r>
+                        <a:rPr lang="pt-PT" sz="1400" dirty="0" err="1" smtClean="0"/>
+                        <a:t>household</a:t>
+                      </a:r>
+                      <a:endParaRPr lang="pt-PT" sz="1400" dirty="0"/>
+                    </a:p>
+                  </a:txBody>
+                  <a:tcPr/>
+                </a:tc>
+              </a:tr>
+            </a:tbl>
+          </a:graphicData>
+        </a:graphic>
+      </p:graphicFrame>
+      <p:sp>
+        <p:nvSpPr>
+          <p:cNvPr id="15" name="CaixaDeTexto 14"/>
+          <p:cNvSpPr txBox="1"/>
+          <p:nvPr/>
+        </p:nvSpPr>
+        <p:spPr>
+          <a:xfrm>
+            <a:off x="5424160" y="4039844"/>
+            <a:ext cx="2402022" cy="369332"/>
+          </a:xfrm>
+          <a:prstGeom prst="rect">
+            <a:avLst/>
+          </a:prstGeom>
+          <a:noFill/>
+        </p:spPr>
+        <p:txBody>
+          <a:bodyPr wrap="square" rtlCol="0">
+            <a:spAutoFit/>
+          </a:bodyPr>
+          <a:lstStyle/>
+          <a:p>
+            <a:r>
+              <a:rPr lang="pt-PT" b="1" dirty="0" err="1" smtClean="0"/>
+              <a:t>Payment</a:t>
+            </a:r>
+            <a:r>
+              <a:rPr lang="pt-PT" b="1" dirty="0" smtClean="0"/>
+              <a:t> </a:t>
+            </a:r>
+            <a:r>
+              <a:rPr lang="pt-PT" b="1" dirty="0" err="1" smtClean="0"/>
+              <a:t>Orders</a:t>
+            </a:r>
+            <a:endParaRPr lang="pt-PT" b="1" dirty="0"/>
+          </a:p>
+        </p:txBody>
+      </p:sp>
+    </p:spTree>
+    <p:extLst>
+      <p:ext uri="{BB962C8B-B14F-4D97-AF65-F5344CB8AC3E}">
+        <p14:creationId xmlns:p14="http://schemas.microsoft.com/office/powerpoint/2010/main" val="977385645"/>
+      </p:ext>
+    </p:extLst>
+  </p:cSld>
+  <p:clrMapOvr>
+    <a:masterClrMapping/>
+  </p:clrMapOvr>
+  <p:timing>
+    <p:tnLst>
+      <p:par>
+        <p:cTn id="1" dur="indefinite" restart="never" nodeType="tmRoot"/>
+      </p:par>
+    </p:tnLst>
+  </p:timing>
+</p:sld>
+</file>
+
 <file path=ppt/slides/slide3.xml><?xml version="1.0" encoding="utf-8"?>
 <p:sld xmlns:a="http://schemas.openxmlformats.org/drawingml/2006/main" xmlns:r="http://schemas.openxmlformats.org/officeDocument/2006/relationships" xmlns:p="http://schemas.openxmlformats.org/presentationml/2006/main">
   <p:cSld>
@@ -11045,7 +13111,7 @@
         </p:nvSpPr>
         <p:spPr>
           <a:xfrm>
-            <a:off x="2137893" y="456504"/>
+            <a:off x="2137893" y="404988"/>
             <a:ext cx="4684488" cy="769441"/>
           </a:xfrm>
           <a:prstGeom prst="rect">

</xml_diff>

<commit_message>
Added more slides to presentation. Also added payment orders
</commit_message>
<xml_diff>
--- a/presentation/presentation.pptx
+++ b/presentation/presentation.pptx
@@ -5,7 +5,7 @@
     <p:sldMasterId id="2147483648" r:id="rId1"/>
   </p:sldMasterIdLst>
   <p:notesMasterIdLst>
-    <p:notesMasterId r:id="rId22"/>
+    <p:notesMasterId r:id="rId24"/>
   </p:notesMasterIdLst>
   <p:sldIdLst>
     <p:sldId id="257" r:id="rId2"/>
@@ -28,6 +28,8 @@
     <p:sldId id="277" r:id="rId19"/>
     <p:sldId id="275" r:id="rId20"/>
     <p:sldId id="278" r:id="rId21"/>
+    <p:sldId id="279" r:id="rId22"/>
+    <p:sldId id="280" r:id="rId23"/>
   </p:sldIdLst>
   <p:sldSz cx="12192000" cy="6858000"/>
   <p:notesSz cx="6858000" cy="9144000"/>
@@ -2419,6 +2421,330 @@
     <p:extLst>
       <p:ext uri="{BB962C8B-B14F-4D97-AF65-F5344CB8AC3E}">
         <p14:creationId xmlns:p14="http://schemas.microsoft.com/office/powerpoint/2010/main" val="497904736"/>
+      </p:ext>
+    </p:extLst>
+  </p:cSld>
+  <p:clrMapOvr>
+    <a:masterClrMapping/>
+  </p:clrMapOvr>
+</p:notes>
+</file>
+
+<file path=ppt/notesSlides/notesSlide20.xml><?xml version="1.0" encoding="utf-8"?>
+<p:notes xmlns:a="http://schemas.openxmlformats.org/drawingml/2006/main" xmlns:r="http://schemas.openxmlformats.org/officeDocument/2006/relationships" xmlns:p="http://schemas.openxmlformats.org/presentationml/2006/main">
+  <p:cSld>
+    <p:spTree>
+      <p:nvGrpSpPr>
+        <p:cNvPr id="1" name=""/>
+        <p:cNvGrpSpPr/>
+        <p:nvPr/>
+      </p:nvGrpSpPr>
+      <p:grpSpPr>
+        <a:xfrm>
+          <a:off x="0" y="0"/>
+          <a:ext cx="0" cy="0"/>
+          <a:chOff x="0" y="0"/>
+          <a:chExt cx="0" cy="0"/>
+        </a:xfrm>
+      </p:grpSpPr>
+      <p:sp>
+        <p:nvSpPr>
+          <p:cNvPr id="2" name="Marcador de Posição da Imagem do Diapositivo 1"/>
+          <p:cNvSpPr>
+            <a:spLocks noGrp="1" noRot="1" noChangeAspect="1"/>
+          </p:cNvSpPr>
+          <p:nvPr>
+            <p:ph type="sldImg"/>
+          </p:nvPr>
+        </p:nvSpPr>
+        <p:spPr/>
+      </p:sp>
+      <p:sp>
+        <p:nvSpPr>
+          <p:cNvPr id="3" name="Marcador de Posição de Notas 2"/>
+          <p:cNvSpPr>
+            <a:spLocks noGrp="1"/>
+          </p:cNvSpPr>
+          <p:nvPr>
+            <p:ph type="body" idx="1"/>
+          </p:nvPr>
+        </p:nvSpPr>
+        <p:spPr/>
+        <p:txBody>
+          <a:bodyPr/>
+          <a:lstStyle/>
+          <a:p>
+            <a:r>
+              <a:rPr lang="pt-PT" dirty="0" err="1" smtClean="0"/>
+              <a:t>Health</a:t>
+            </a:r>
+            <a:r>
+              <a:rPr lang="pt-PT" dirty="0" smtClean="0"/>
+              <a:t> </a:t>
+            </a:r>
+            <a:r>
+              <a:rPr lang="pt-PT" dirty="0" err="1" smtClean="0"/>
+              <a:t>Problems</a:t>
+            </a:r>
+            <a:r>
+              <a:rPr lang="pt-PT" dirty="0" smtClean="0"/>
+              <a:t> (stress, </a:t>
+            </a:r>
+            <a:r>
+              <a:rPr lang="pt-PT" dirty="0" err="1" smtClean="0"/>
+              <a:t>pollution</a:t>
+            </a:r>
+            <a:r>
+              <a:rPr lang="pt-PT" dirty="0" smtClean="0"/>
+              <a:t>,</a:t>
+            </a:r>
+            <a:r>
+              <a:rPr lang="pt-PT" baseline="0" dirty="0" smtClean="0"/>
+              <a:t> etc.) -&gt; </a:t>
+            </a:r>
+            <a:r>
+              <a:rPr lang="pt-PT" baseline="0" dirty="0" err="1" smtClean="0"/>
+              <a:t>related</a:t>
+            </a:r>
+            <a:r>
+              <a:rPr lang="pt-PT" baseline="0" dirty="0" smtClean="0"/>
+              <a:t> </a:t>
+            </a:r>
+            <a:r>
+              <a:rPr lang="pt-PT" baseline="0" dirty="0" err="1" smtClean="0"/>
+              <a:t>with</a:t>
+            </a:r>
+            <a:r>
+              <a:rPr lang="pt-PT" baseline="0" dirty="0" smtClean="0"/>
+              <a:t> </a:t>
+            </a:r>
+            <a:r>
+              <a:rPr lang="pt-PT" baseline="0" dirty="0" err="1" smtClean="0"/>
+              <a:t>environment</a:t>
+            </a:r>
+            <a:endParaRPr lang="pt-PT" dirty="0" smtClean="0"/>
+          </a:p>
+          <a:p>
+            <a:r>
+              <a:rPr lang="pt-PT" dirty="0" err="1" smtClean="0"/>
+              <a:t>Economic</a:t>
+            </a:r>
+            <a:r>
+              <a:rPr lang="pt-PT" baseline="0" dirty="0" smtClean="0"/>
+              <a:t> </a:t>
+            </a:r>
+            <a:r>
+              <a:rPr lang="pt-PT" baseline="0" dirty="0" err="1" smtClean="0"/>
+              <a:t>impact</a:t>
+            </a:r>
+            <a:endParaRPr lang="pt-PT" baseline="0" dirty="0" smtClean="0"/>
+          </a:p>
+          <a:p>
+            <a:r>
+              <a:rPr lang="pt-PT" baseline="0" dirty="0" err="1" smtClean="0"/>
+              <a:t>Environmental</a:t>
+            </a:r>
+            <a:r>
+              <a:rPr lang="pt-PT" baseline="0" dirty="0" smtClean="0"/>
+              <a:t> </a:t>
+            </a:r>
+            <a:r>
+              <a:rPr lang="pt-PT" baseline="0" dirty="0" err="1" smtClean="0"/>
+              <a:t>impact</a:t>
+            </a:r>
+            <a:endParaRPr lang="pt-PT" dirty="0"/>
+          </a:p>
+        </p:txBody>
+      </p:sp>
+      <p:sp>
+        <p:nvSpPr>
+          <p:cNvPr id="4" name="Marcador de Posição do Número do Diapositivo 3"/>
+          <p:cNvSpPr>
+            <a:spLocks noGrp="1"/>
+          </p:cNvSpPr>
+          <p:nvPr>
+            <p:ph type="sldNum" sz="quarter" idx="10"/>
+          </p:nvPr>
+        </p:nvSpPr>
+        <p:spPr/>
+        <p:txBody>
+          <a:bodyPr/>
+          <a:lstStyle/>
+          <a:p>
+            <a:fld id="{3AC54132-D928-D54C-ABBE-ACE1209FEA7D}" type="slidenum">
+              <a:rPr lang="pt-PT" smtClean="0"/>
+              <a:t>21</a:t>
+            </a:fld>
+            <a:endParaRPr lang="pt-PT"/>
+          </a:p>
+        </p:txBody>
+      </p:sp>
+    </p:spTree>
+    <p:extLst>
+      <p:ext uri="{BB962C8B-B14F-4D97-AF65-F5344CB8AC3E}">
+        <p14:creationId xmlns:p14="http://schemas.microsoft.com/office/powerpoint/2010/main" val="651060035"/>
+      </p:ext>
+    </p:extLst>
+  </p:cSld>
+  <p:clrMapOvr>
+    <a:masterClrMapping/>
+  </p:clrMapOvr>
+</p:notes>
+</file>
+
+<file path=ppt/notesSlides/notesSlide21.xml><?xml version="1.0" encoding="utf-8"?>
+<p:notes xmlns:a="http://schemas.openxmlformats.org/drawingml/2006/main" xmlns:r="http://schemas.openxmlformats.org/officeDocument/2006/relationships" xmlns:p="http://schemas.openxmlformats.org/presentationml/2006/main">
+  <p:cSld>
+    <p:spTree>
+      <p:nvGrpSpPr>
+        <p:cNvPr id="1" name=""/>
+        <p:cNvGrpSpPr/>
+        <p:nvPr/>
+      </p:nvGrpSpPr>
+      <p:grpSpPr>
+        <a:xfrm>
+          <a:off x="0" y="0"/>
+          <a:ext cx="0" cy="0"/>
+          <a:chOff x="0" y="0"/>
+          <a:chExt cx="0" cy="0"/>
+        </a:xfrm>
+      </p:grpSpPr>
+      <p:sp>
+        <p:nvSpPr>
+          <p:cNvPr id="2" name="Marcador de Posição da Imagem do Diapositivo 1"/>
+          <p:cNvSpPr>
+            <a:spLocks noGrp="1" noRot="1" noChangeAspect="1"/>
+          </p:cNvSpPr>
+          <p:nvPr>
+            <p:ph type="sldImg"/>
+          </p:nvPr>
+        </p:nvSpPr>
+        <p:spPr/>
+      </p:sp>
+      <p:sp>
+        <p:nvSpPr>
+          <p:cNvPr id="3" name="Marcador de Posição de Notas 2"/>
+          <p:cNvSpPr>
+            <a:spLocks noGrp="1"/>
+          </p:cNvSpPr>
+          <p:nvPr>
+            <p:ph type="body" idx="1"/>
+          </p:nvPr>
+        </p:nvSpPr>
+        <p:spPr/>
+        <p:txBody>
+          <a:bodyPr/>
+          <a:lstStyle/>
+          <a:p>
+            <a:r>
+              <a:rPr lang="pt-PT" dirty="0" err="1" smtClean="0"/>
+              <a:t>Health</a:t>
+            </a:r>
+            <a:r>
+              <a:rPr lang="pt-PT" dirty="0" smtClean="0"/>
+              <a:t> </a:t>
+            </a:r>
+            <a:r>
+              <a:rPr lang="pt-PT" dirty="0" err="1" smtClean="0"/>
+              <a:t>Problems</a:t>
+            </a:r>
+            <a:r>
+              <a:rPr lang="pt-PT" dirty="0" smtClean="0"/>
+              <a:t> (stress, </a:t>
+            </a:r>
+            <a:r>
+              <a:rPr lang="pt-PT" dirty="0" err="1" smtClean="0"/>
+              <a:t>pollution</a:t>
+            </a:r>
+            <a:r>
+              <a:rPr lang="pt-PT" dirty="0" smtClean="0"/>
+              <a:t>,</a:t>
+            </a:r>
+            <a:r>
+              <a:rPr lang="pt-PT" baseline="0" dirty="0" smtClean="0"/>
+              <a:t> etc.) -&gt; </a:t>
+            </a:r>
+            <a:r>
+              <a:rPr lang="pt-PT" baseline="0" dirty="0" err="1" smtClean="0"/>
+              <a:t>related</a:t>
+            </a:r>
+            <a:r>
+              <a:rPr lang="pt-PT" baseline="0" dirty="0" smtClean="0"/>
+              <a:t> </a:t>
+            </a:r>
+            <a:r>
+              <a:rPr lang="pt-PT" baseline="0" dirty="0" err="1" smtClean="0"/>
+              <a:t>with</a:t>
+            </a:r>
+            <a:r>
+              <a:rPr lang="pt-PT" baseline="0" dirty="0" smtClean="0"/>
+              <a:t> </a:t>
+            </a:r>
+            <a:r>
+              <a:rPr lang="pt-PT" baseline="0" dirty="0" err="1" smtClean="0"/>
+              <a:t>environment</a:t>
+            </a:r>
+            <a:endParaRPr lang="pt-PT" dirty="0" smtClean="0"/>
+          </a:p>
+          <a:p>
+            <a:r>
+              <a:rPr lang="pt-PT" dirty="0" err="1" smtClean="0"/>
+              <a:t>Economic</a:t>
+            </a:r>
+            <a:r>
+              <a:rPr lang="pt-PT" baseline="0" dirty="0" smtClean="0"/>
+              <a:t> </a:t>
+            </a:r>
+            <a:r>
+              <a:rPr lang="pt-PT" baseline="0" dirty="0" err="1" smtClean="0"/>
+              <a:t>impact</a:t>
+            </a:r>
+            <a:endParaRPr lang="pt-PT" baseline="0" dirty="0" smtClean="0"/>
+          </a:p>
+          <a:p>
+            <a:r>
+              <a:rPr lang="pt-PT" baseline="0" dirty="0" err="1" smtClean="0"/>
+              <a:t>Environmental</a:t>
+            </a:r>
+            <a:r>
+              <a:rPr lang="pt-PT" baseline="0" dirty="0" smtClean="0"/>
+              <a:t> </a:t>
+            </a:r>
+            <a:r>
+              <a:rPr lang="pt-PT" baseline="0" dirty="0" err="1" smtClean="0"/>
+              <a:t>impact</a:t>
+            </a:r>
+            <a:endParaRPr lang="pt-PT" dirty="0"/>
+          </a:p>
+        </p:txBody>
+      </p:sp>
+      <p:sp>
+        <p:nvSpPr>
+          <p:cNvPr id="4" name="Marcador de Posição do Número do Diapositivo 3"/>
+          <p:cNvSpPr>
+            <a:spLocks noGrp="1"/>
+          </p:cNvSpPr>
+          <p:nvPr>
+            <p:ph type="sldNum" sz="quarter" idx="10"/>
+          </p:nvPr>
+        </p:nvSpPr>
+        <p:spPr/>
+        <p:txBody>
+          <a:bodyPr/>
+          <a:lstStyle/>
+          <a:p>
+            <a:fld id="{3AC54132-D928-D54C-ABBE-ACE1209FEA7D}" type="slidenum">
+              <a:rPr lang="pt-PT" smtClean="0"/>
+              <a:t>22</a:t>
+            </a:fld>
+            <a:endParaRPr lang="pt-PT"/>
+          </a:p>
+        </p:txBody>
+      </p:sp>
+    </p:spTree>
+    <p:extLst>
+      <p:ext uri="{BB962C8B-B14F-4D97-AF65-F5344CB8AC3E}">
+        <p14:creationId xmlns:p14="http://schemas.microsoft.com/office/powerpoint/2010/main" val="427175435"/>
       </p:ext>
     </p:extLst>
   </p:cSld>
@@ -6970,7 +7296,7 @@
         </p:nvSpPr>
         <p:spPr>
           <a:xfrm>
-            <a:off x="2137893" y="423309"/>
+            <a:off x="2137893" y="407267"/>
             <a:ext cx="8434553" cy="769441"/>
           </a:xfrm>
           <a:prstGeom prst="rect">
@@ -7470,7 +7796,7 @@
         </p:nvSpPr>
         <p:spPr>
           <a:xfrm>
-            <a:off x="2137893" y="423309"/>
+            <a:off x="2137893" y="407267"/>
             <a:ext cx="4326569" cy="769441"/>
           </a:xfrm>
           <a:prstGeom prst="rect">
@@ -10709,6 +11035,1605 @@
     <p:extLst>
       <p:ext uri="{BB962C8B-B14F-4D97-AF65-F5344CB8AC3E}">
         <p14:creationId xmlns:p14="http://schemas.microsoft.com/office/powerpoint/2010/main" val="977385645"/>
+      </p:ext>
+    </p:extLst>
+  </p:cSld>
+  <p:clrMapOvr>
+    <a:masterClrMapping/>
+  </p:clrMapOvr>
+  <p:timing>
+    <p:tnLst>
+      <p:par>
+        <p:cTn id="1" dur="indefinite" restart="never" nodeType="tmRoot"/>
+      </p:par>
+    </p:tnLst>
+  </p:timing>
+</p:sld>
+</file>
+
+<file path=ppt/slides/slide21.xml><?xml version="1.0" encoding="utf-8"?>
+<p:sld xmlns:a="http://schemas.openxmlformats.org/drawingml/2006/main" xmlns:r="http://schemas.openxmlformats.org/officeDocument/2006/relationships" xmlns:p="http://schemas.openxmlformats.org/presentationml/2006/main">
+  <p:cSld>
+    <p:spTree>
+      <p:nvGrpSpPr>
+        <p:cNvPr id="1" name=""/>
+        <p:cNvGrpSpPr/>
+        <p:nvPr/>
+      </p:nvGrpSpPr>
+      <p:grpSpPr>
+        <a:xfrm>
+          <a:off x="0" y="0"/>
+          <a:ext cx="0" cy="0"/>
+          <a:chOff x="0" y="0"/>
+          <a:chExt cx="0" cy="0"/>
+        </a:xfrm>
+      </p:grpSpPr>
+      <p:sp>
+        <p:nvSpPr>
+          <p:cNvPr id="2" name="CaixaDeTexto 1"/>
+          <p:cNvSpPr txBox="1"/>
+          <p:nvPr/>
+        </p:nvSpPr>
+        <p:spPr>
+          <a:xfrm>
+            <a:off x="0" y="0"/>
+            <a:ext cx="12192000" cy="1579418"/>
+          </a:xfrm>
+          <a:prstGeom prst="rect">
+            <a:avLst/>
+          </a:prstGeom>
+          <a:solidFill>
+            <a:schemeClr val="bg1">
+              <a:lumMod val="95000"/>
+            </a:schemeClr>
+          </a:solidFill>
+        </p:spPr>
+        <p:txBody>
+          <a:bodyPr wrap="square" rtlCol="0">
+            <a:spAutoFit/>
+          </a:bodyPr>
+          <a:lstStyle/>
+          <a:p>
+            <a:endParaRPr lang="pt-PT" dirty="0"/>
+          </a:p>
+        </p:txBody>
+      </p:sp>
+      <p:sp>
+        <p:nvSpPr>
+          <p:cNvPr id="3" name="CaixaDeTexto 2"/>
+          <p:cNvSpPr txBox="1"/>
+          <p:nvPr/>
+        </p:nvSpPr>
+        <p:spPr>
+          <a:xfrm>
+            <a:off x="623455" y="346365"/>
+            <a:ext cx="1668984" cy="923330"/>
+          </a:xfrm>
+          <a:prstGeom prst="rect">
+            <a:avLst/>
+          </a:prstGeom>
+          <a:noFill/>
+        </p:spPr>
+        <p:txBody>
+          <a:bodyPr wrap="square" rtlCol="0">
+            <a:spAutoFit/>
+          </a:bodyPr>
+          <a:lstStyle/>
+          <a:p>
+            <a:r>
+              <a:rPr lang="pt-PT" sz="5400" dirty="0" smtClean="0">
+                <a:solidFill>
+                  <a:srgbClr val="B9122B"/>
+                </a:solidFill>
+              </a:rPr>
+              <a:t>#</a:t>
+            </a:r>
+            <a:r>
+              <a:rPr lang="pt-PT" sz="5400" dirty="0" smtClean="0">
+                <a:solidFill>
+                  <a:srgbClr val="B9122B"/>
+                </a:solidFill>
+              </a:rPr>
+              <a:t>AN</a:t>
+            </a:r>
+            <a:endParaRPr lang="pt-PT" sz="5400" dirty="0">
+              <a:solidFill>
+                <a:srgbClr val="B9122B"/>
+              </a:solidFill>
+            </a:endParaRPr>
+          </a:p>
+        </p:txBody>
+      </p:sp>
+      <p:sp>
+        <p:nvSpPr>
+          <p:cNvPr id="5" name="CaixaDeTexto 4"/>
+          <p:cNvSpPr txBox="1"/>
+          <p:nvPr/>
+        </p:nvSpPr>
+        <p:spPr>
+          <a:xfrm>
+            <a:off x="2137893" y="404988"/>
+            <a:ext cx="4079707" cy="769441"/>
+          </a:xfrm>
+          <a:prstGeom prst="rect">
+            <a:avLst/>
+          </a:prstGeom>
+          <a:noFill/>
+        </p:spPr>
+        <p:txBody>
+          <a:bodyPr wrap="none" rtlCol="0">
+            <a:spAutoFit/>
+          </a:bodyPr>
+          <a:lstStyle/>
+          <a:p>
+            <a:r>
+              <a:rPr lang="pt-PT" sz="4400" dirty="0" smtClean="0">
+                <a:solidFill>
+                  <a:srgbClr val="00568A"/>
+                </a:solidFill>
+              </a:rPr>
+              <a:t>Data </a:t>
+            </a:r>
+            <a:r>
+              <a:rPr lang="pt-PT" sz="4400" dirty="0" err="1" smtClean="0">
+                <a:solidFill>
+                  <a:srgbClr val="00568A"/>
+                </a:solidFill>
+              </a:rPr>
+              <a:t>preparation</a:t>
+            </a:r>
+            <a:endParaRPr lang="pt-PT" sz="4400" dirty="0">
+              <a:solidFill>
+                <a:srgbClr val="00568A"/>
+              </a:solidFill>
+            </a:endParaRPr>
+          </a:p>
+        </p:txBody>
+      </p:sp>
+      <p:sp>
+        <p:nvSpPr>
+          <p:cNvPr id="4" name="Marcador de Posição do Número do Diapositivo 3"/>
+          <p:cNvSpPr>
+            <a:spLocks noGrp="1"/>
+          </p:cNvSpPr>
+          <p:nvPr>
+            <p:ph type="sldNum" sz="quarter" idx="12"/>
+          </p:nvPr>
+        </p:nvSpPr>
+        <p:spPr/>
+        <p:txBody>
+          <a:bodyPr/>
+          <a:lstStyle/>
+          <a:p>
+            <a:fld id="{5683189C-B5E2-F345-AC06-1CEB972D3557}" type="slidenum">
+              <a:rPr lang="pt-PT" smtClean="0"/>
+              <a:t>21</a:t>
+            </a:fld>
+            <a:endParaRPr lang="pt-PT"/>
+          </a:p>
+        </p:txBody>
+      </p:sp>
+      <p:sp>
+        <p:nvSpPr>
+          <p:cNvPr id="9" name="CaixaDeTexto 8"/>
+          <p:cNvSpPr txBox="1"/>
+          <p:nvPr/>
+        </p:nvSpPr>
+        <p:spPr>
+          <a:xfrm>
+            <a:off x="527203" y="1846212"/>
+            <a:ext cx="2088084" cy="369332"/>
+          </a:xfrm>
+          <a:prstGeom prst="rect">
+            <a:avLst/>
+          </a:prstGeom>
+          <a:noFill/>
+        </p:spPr>
+        <p:txBody>
+          <a:bodyPr wrap="square" rtlCol="0">
+            <a:spAutoFit/>
+          </a:bodyPr>
+          <a:lstStyle/>
+          <a:p>
+            <a:r>
+              <a:rPr lang="pt-PT" b="1" dirty="0" err="1" smtClean="0"/>
+              <a:t>District</a:t>
+            </a:r>
+            <a:endParaRPr lang="pt-PT" b="1" dirty="0"/>
+          </a:p>
+        </p:txBody>
+      </p:sp>
+      <p:graphicFrame>
+        <p:nvGraphicFramePr>
+          <p:cNvPr id="14" name="Tabela 13"/>
+          <p:cNvGraphicFramePr>
+            <a:graphicFrameLocks noGrp="1"/>
+          </p:cNvGraphicFramePr>
+          <p:nvPr>
+            <p:extLst>
+              <p:ext uri="{D42A27DB-BD31-4B8C-83A1-F6EECF244321}">
+                <p14:modId xmlns:p14="http://schemas.microsoft.com/office/powerpoint/2010/main" val="1434083874"/>
+              </p:ext>
+            </p:extLst>
+          </p:nvPr>
+        </p:nvGraphicFramePr>
+        <p:xfrm>
+          <a:off x="623455" y="2370043"/>
+          <a:ext cx="10293669" cy="1460028"/>
+        </p:xfrm>
+        <a:graphic>
+          <a:graphicData uri="http://schemas.openxmlformats.org/drawingml/2006/table">
+            <a:tbl>
+              <a:tblPr firstRow="1" bandRow="1">
+                <a:tableStyleId>{5C22544A-7EE6-4342-B048-85BDC9FD1C3A}</a:tableStyleId>
+              </a:tblPr>
+              <a:tblGrid>
+                <a:gridCol w="575882"/>
+                <a:gridCol w="1060386"/>
+                <a:gridCol w="1425512"/>
+                <a:gridCol w="2020634"/>
+                <a:gridCol w="1623441"/>
+                <a:gridCol w="1623441"/>
+                <a:gridCol w="984568"/>
+                <a:gridCol w="979805"/>
+              </a:tblGrid>
+              <a:tr h="347508">
+                <a:tc>
+                  <a:txBody>
+                    <a:bodyPr/>
+                    <a:lstStyle/>
+                    <a:p>
+                      <a:pPr algn="ctr"/>
+                      <a:r>
+                        <a:rPr lang="pt-PT" sz="1400" dirty="0" err="1" smtClean="0"/>
+                        <a:t>code</a:t>
+                      </a:r>
+                      <a:endParaRPr lang="pt-PT" sz="1400" dirty="0"/>
+                    </a:p>
+                  </a:txBody>
+                  <a:tcPr>
+                    <a:solidFill>
+                      <a:srgbClr val="00568A"/>
+                    </a:solidFill>
+                  </a:tcPr>
+                </a:tc>
+                <a:tc>
+                  <a:txBody>
+                    <a:bodyPr/>
+                    <a:lstStyle/>
+                    <a:p>
+                      <a:pPr algn="ctr"/>
+                      <a:r>
+                        <a:rPr lang="pt-PT" sz="1400" dirty="0" err="1" smtClean="0"/>
+                        <a:t>name</a:t>
+                      </a:r>
+                      <a:endParaRPr lang="pt-PT" sz="1400" dirty="0"/>
+                    </a:p>
+                  </a:txBody>
+                  <a:tcPr>
+                    <a:solidFill>
+                      <a:srgbClr val="00568A"/>
+                    </a:solidFill>
+                  </a:tcPr>
+                </a:tc>
+                <a:tc>
+                  <a:txBody>
+                    <a:bodyPr/>
+                    <a:lstStyle/>
+                    <a:p>
+                      <a:pPr algn="ctr"/>
+                      <a:r>
+                        <a:rPr lang="pt-PT" sz="1400" dirty="0" err="1" smtClean="0"/>
+                        <a:t>region</a:t>
+                      </a:r>
+                      <a:endParaRPr lang="pt-PT" sz="1400" dirty="0"/>
+                    </a:p>
+                  </a:txBody>
+                  <a:tcPr>
+                    <a:solidFill>
+                      <a:srgbClr val="00568A"/>
+                    </a:solidFill>
+                  </a:tcPr>
+                </a:tc>
+                <a:tc>
+                  <a:txBody>
+                    <a:bodyPr/>
+                    <a:lstStyle/>
+                    <a:p>
+                      <a:pPr algn="ctr"/>
+                      <a:r>
+                        <a:rPr lang="pt-PT" sz="1400" dirty="0" err="1" smtClean="0"/>
+                        <a:t>ratio_urban_inhabitants</a:t>
+                      </a:r>
+                      <a:endParaRPr lang="pt-PT" sz="1400" dirty="0"/>
+                    </a:p>
+                  </a:txBody>
+                  <a:tcPr>
+                    <a:solidFill>
+                      <a:srgbClr val="00568A"/>
+                    </a:solidFill>
+                  </a:tcPr>
+                </a:tc>
+                <a:tc>
+                  <a:txBody>
+                    <a:bodyPr/>
+                    <a:lstStyle/>
+                    <a:p>
+                      <a:pPr algn="ctr"/>
+                      <a:r>
+                        <a:rPr lang="pt-PT" sz="1400" dirty="0" smtClean="0"/>
+                        <a:t>unemployment_95</a:t>
+                      </a:r>
+                      <a:endParaRPr lang="pt-PT" sz="1400" dirty="0"/>
+                    </a:p>
+                  </a:txBody>
+                  <a:tcPr>
+                    <a:solidFill>
+                      <a:srgbClr val="00568A"/>
+                    </a:solidFill>
+                  </a:tcPr>
+                </a:tc>
+                <a:tc>
+                  <a:txBody>
+                    <a:bodyPr/>
+                    <a:lstStyle/>
+                    <a:p>
+                      <a:pPr algn="ctr"/>
+                      <a:r>
+                        <a:rPr lang="pt-PT" sz="1400" dirty="0" smtClean="0"/>
+                        <a:t>unemployment_96</a:t>
+                      </a:r>
+                      <a:endParaRPr lang="pt-PT" sz="1400" dirty="0"/>
+                    </a:p>
+                  </a:txBody>
+                  <a:tcPr>
+                    <a:solidFill>
+                      <a:srgbClr val="00568A"/>
+                    </a:solidFill>
+                  </a:tcPr>
+                </a:tc>
+                <a:tc>
+                  <a:txBody>
+                    <a:bodyPr/>
+                    <a:lstStyle/>
+                    <a:p>
+                      <a:pPr algn="ctr"/>
+                      <a:r>
+                        <a:rPr lang="pt-PT" sz="1400" dirty="0" smtClean="0"/>
+                        <a:t>crimes_95</a:t>
+                      </a:r>
+                      <a:endParaRPr lang="pt-PT" sz="1400" dirty="0"/>
+                    </a:p>
+                  </a:txBody>
+                  <a:tcPr>
+                    <a:solidFill>
+                      <a:srgbClr val="00568A"/>
+                    </a:solidFill>
+                  </a:tcPr>
+                </a:tc>
+                <a:tc>
+                  <a:txBody>
+                    <a:bodyPr/>
+                    <a:lstStyle/>
+                    <a:p>
+                      <a:pPr algn="ctr"/>
+                      <a:r>
+                        <a:rPr lang="pt-PT" sz="1400" dirty="0" smtClean="0"/>
+                        <a:t>crimes_96</a:t>
+                      </a:r>
+                      <a:endParaRPr lang="pt-PT" sz="1400" dirty="0"/>
+                    </a:p>
+                  </a:txBody>
+                  <a:tcPr>
+                    <a:solidFill>
+                      <a:srgbClr val="00568A"/>
+                    </a:solidFill>
+                  </a:tcPr>
+                </a:tc>
+              </a:tr>
+              <a:tr h="370840">
+                <a:tc>
+                  <a:txBody>
+                    <a:bodyPr/>
+                    <a:lstStyle/>
+                    <a:p>
+                      <a:pPr algn="ctr"/>
+                      <a:r>
+                        <a:rPr lang="pt-PT" sz="1400" dirty="0" smtClean="0"/>
+                        <a:t>1</a:t>
+                      </a:r>
+                      <a:endParaRPr lang="pt-PT" sz="1400" dirty="0"/>
+                    </a:p>
+                  </a:txBody>
+                  <a:tcPr/>
+                </a:tc>
+                <a:tc>
+                  <a:txBody>
+                    <a:bodyPr/>
+                    <a:lstStyle/>
+                    <a:p>
+                      <a:pPr algn="ctr"/>
+                      <a:r>
+                        <a:rPr lang="pt-PT" sz="1400" dirty="0" err="1" smtClean="0"/>
+                        <a:t>Hl.m</a:t>
+                      </a:r>
+                      <a:r>
+                        <a:rPr lang="pt-PT" sz="1400" dirty="0" smtClean="0"/>
+                        <a:t>. Praha</a:t>
+                      </a:r>
+                      <a:endParaRPr lang="pt-PT" sz="1400" dirty="0"/>
+                    </a:p>
+                  </a:txBody>
+                  <a:tcPr/>
+                </a:tc>
+                <a:tc>
+                  <a:txBody>
+                    <a:bodyPr/>
+                    <a:lstStyle/>
+                    <a:p>
+                      <a:pPr algn="ctr"/>
+                      <a:r>
+                        <a:rPr lang="pt-PT" sz="1400" dirty="0" smtClean="0"/>
+                        <a:t>Prague</a:t>
+                      </a:r>
+                      <a:endParaRPr lang="pt-PT" sz="1400" dirty="0"/>
+                    </a:p>
+                  </a:txBody>
+                  <a:tcPr/>
+                </a:tc>
+                <a:tc>
+                  <a:txBody>
+                    <a:bodyPr/>
+                    <a:lstStyle/>
+                    <a:p>
+                      <a:pPr algn="ctr"/>
+                      <a:r>
+                        <a:rPr lang="pt-PT" sz="1400" dirty="0" smtClean="0"/>
+                        <a:t>100</a:t>
+                      </a:r>
+                      <a:endParaRPr lang="pt-PT" sz="1400" dirty="0"/>
+                    </a:p>
+                  </a:txBody>
+                  <a:tcPr/>
+                </a:tc>
+                <a:tc>
+                  <a:txBody>
+                    <a:bodyPr/>
+                    <a:lstStyle/>
+                    <a:p>
+                      <a:pPr algn="ctr"/>
+                      <a:r>
+                        <a:rPr lang="pt-PT" sz="1400" dirty="0" smtClean="0"/>
+                        <a:t>0.29</a:t>
+                      </a:r>
+                      <a:endParaRPr lang="pt-PT" sz="1400" dirty="0"/>
+                    </a:p>
+                  </a:txBody>
+                  <a:tcPr/>
+                </a:tc>
+                <a:tc>
+                  <a:txBody>
+                    <a:bodyPr/>
+                    <a:lstStyle/>
+                    <a:p>
+                      <a:pPr algn="ctr"/>
+                      <a:r>
+                        <a:rPr lang="pt-PT" sz="1400" dirty="0" smtClean="0"/>
+                        <a:t>0.43</a:t>
+                      </a:r>
+                      <a:endParaRPr lang="pt-PT" sz="1400" dirty="0"/>
+                    </a:p>
+                  </a:txBody>
+                  <a:tcPr/>
+                </a:tc>
+                <a:tc>
+                  <a:txBody>
+                    <a:bodyPr/>
+                    <a:lstStyle/>
+                    <a:p>
+                      <a:pPr algn="ctr"/>
+                      <a:r>
+                        <a:rPr lang="pt-PT" sz="1400" dirty="0" smtClean="0"/>
+                        <a:t>85677</a:t>
+                      </a:r>
+                      <a:endParaRPr lang="pt-PT" sz="1400" dirty="0"/>
+                    </a:p>
+                  </a:txBody>
+                  <a:tcPr/>
+                </a:tc>
+                <a:tc>
+                  <a:txBody>
+                    <a:bodyPr/>
+                    <a:lstStyle/>
+                    <a:p>
+                      <a:pPr algn="ctr"/>
+                      <a:r>
+                        <a:rPr lang="pt-PT" sz="1400" dirty="0" smtClean="0"/>
+                        <a:t>99107</a:t>
+                      </a:r>
+                      <a:endParaRPr lang="pt-PT" sz="1400" dirty="0"/>
+                    </a:p>
+                  </a:txBody>
+                  <a:tcPr/>
+                </a:tc>
+              </a:tr>
+              <a:tr h="370840">
+                <a:tc>
+                  <a:txBody>
+                    <a:bodyPr/>
+                    <a:lstStyle/>
+                    <a:p>
+                      <a:pPr algn="ctr"/>
+                      <a:r>
+                        <a:rPr lang="pt-PT" sz="1400" dirty="0" smtClean="0"/>
+                        <a:t>2</a:t>
+                      </a:r>
+                      <a:endParaRPr lang="pt-PT" sz="1400" dirty="0"/>
+                    </a:p>
+                  </a:txBody>
+                  <a:tcPr/>
+                </a:tc>
+                <a:tc>
+                  <a:txBody>
+                    <a:bodyPr/>
+                    <a:lstStyle/>
+                    <a:p>
+                      <a:pPr algn="ctr"/>
+                      <a:r>
+                        <a:rPr lang="pt-PT" sz="1400" dirty="0" err="1" smtClean="0"/>
+                        <a:t>Benesov</a:t>
+                      </a:r>
+                      <a:endParaRPr lang="pt-PT" sz="1400" dirty="0"/>
+                    </a:p>
+                  </a:txBody>
+                  <a:tcPr/>
+                </a:tc>
+                <a:tc>
+                  <a:txBody>
+                    <a:bodyPr/>
+                    <a:lstStyle/>
+                    <a:p>
+                      <a:pPr algn="ctr"/>
+                      <a:r>
+                        <a:rPr lang="pt-PT" sz="1400" dirty="0" smtClean="0"/>
+                        <a:t>Central Bohemia</a:t>
+                      </a:r>
+                      <a:endParaRPr lang="pt-PT" sz="1400" dirty="0"/>
+                    </a:p>
+                  </a:txBody>
+                  <a:tcPr/>
+                </a:tc>
+                <a:tc>
+                  <a:txBody>
+                    <a:bodyPr/>
+                    <a:lstStyle/>
+                    <a:p>
+                      <a:pPr algn="ctr"/>
+                      <a:r>
+                        <a:rPr lang="pt-PT" sz="1400" dirty="0" smtClean="0"/>
+                        <a:t>46.7</a:t>
+                      </a:r>
+                      <a:endParaRPr lang="pt-PT" sz="1400" dirty="0"/>
+                    </a:p>
+                  </a:txBody>
+                  <a:tcPr/>
+                </a:tc>
+                <a:tc>
+                  <a:txBody>
+                    <a:bodyPr/>
+                    <a:lstStyle/>
+                    <a:p>
+                      <a:pPr algn="ctr"/>
+                      <a:r>
+                        <a:rPr lang="pt-PT" sz="1400" dirty="0" smtClean="0"/>
+                        <a:t>1.57</a:t>
+                      </a:r>
+                      <a:endParaRPr lang="pt-PT" sz="1400" dirty="0"/>
+                    </a:p>
+                  </a:txBody>
+                  <a:tcPr/>
+                </a:tc>
+                <a:tc>
+                  <a:txBody>
+                    <a:bodyPr/>
+                    <a:lstStyle/>
+                    <a:p>
+                      <a:pPr algn="ctr"/>
+                      <a:r>
+                        <a:rPr lang="pt-PT" sz="1400" dirty="0" smtClean="0"/>
+                        <a:t>1.85</a:t>
+                      </a:r>
+                      <a:endParaRPr lang="pt-PT" sz="1400" dirty="0"/>
+                    </a:p>
+                  </a:txBody>
+                  <a:tcPr/>
+                </a:tc>
+                <a:tc>
+                  <a:txBody>
+                    <a:bodyPr/>
+                    <a:lstStyle/>
+                    <a:p>
+                      <a:pPr algn="ctr"/>
+                      <a:r>
+                        <a:rPr lang="pt-PT" sz="1400" dirty="0" smtClean="0"/>
+                        <a:t>2159</a:t>
+                      </a:r>
+                      <a:endParaRPr lang="pt-PT" sz="1400" dirty="0"/>
+                    </a:p>
+                  </a:txBody>
+                  <a:tcPr/>
+                </a:tc>
+                <a:tc>
+                  <a:txBody>
+                    <a:bodyPr/>
+                    <a:lstStyle/>
+                    <a:p>
+                      <a:pPr algn="ctr"/>
+                      <a:r>
+                        <a:rPr lang="pt-PT" sz="1400" dirty="0" smtClean="0"/>
+                        <a:t>2674</a:t>
+                      </a:r>
+                      <a:endParaRPr lang="pt-PT" sz="1400" dirty="0"/>
+                    </a:p>
+                  </a:txBody>
+                  <a:tcPr/>
+                </a:tc>
+              </a:tr>
+              <a:tr h="370840">
+                <a:tc>
+                  <a:txBody>
+                    <a:bodyPr/>
+                    <a:lstStyle/>
+                    <a:p>
+                      <a:pPr algn="ctr"/>
+                      <a:r>
+                        <a:rPr lang="pt-PT" sz="1400" dirty="0" smtClean="0"/>
+                        <a:t>3</a:t>
+                      </a:r>
+                      <a:endParaRPr lang="pt-PT" sz="1400" dirty="0"/>
+                    </a:p>
+                  </a:txBody>
+                  <a:tcPr/>
+                </a:tc>
+                <a:tc>
+                  <a:txBody>
+                    <a:bodyPr/>
+                    <a:lstStyle/>
+                    <a:p>
+                      <a:pPr algn="ctr"/>
+                      <a:r>
+                        <a:rPr lang="pt-PT" sz="1400" dirty="0" err="1" smtClean="0"/>
+                        <a:t>Beroun</a:t>
+                      </a:r>
+                      <a:endParaRPr lang="pt-PT" sz="1400" dirty="0"/>
+                    </a:p>
+                  </a:txBody>
+                  <a:tcPr/>
+                </a:tc>
+                <a:tc>
+                  <a:txBody>
+                    <a:bodyPr/>
+                    <a:lstStyle/>
+                    <a:p>
+                      <a:pPr algn="ctr"/>
+                      <a:r>
+                        <a:rPr lang="pt-PT" sz="1400" dirty="0" smtClean="0"/>
+                        <a:t>Central Bohemia</a:t>
+                      </a:r>
+                      <a:endParaRPr lang="pt-PT" sz="1400" dirty="0"/>
+                    </a:p>
+                  </a:txBody>
+                  <a:tcPr/>
+                </a:tc>
+                <a:tc>
+                  <a:txBody>
+                    <a:bodyPr/>
+                    <a:lstStyle/>
+                    <a:p>
+                      <a:pPr algn="ctr"/>
+                      <a:r>
+                        <a:rPr lang="pt-PT" sz="1400" dirty="0" smtClean="0"/>
+                        <a:t>41.7</a:t>
+                      </a:r>
+                      <a:endParaRPr lang="pt-PT" sz="1400" dirty="0"/>
+                    </a:p>
+                  </a:txBody>
+                  <a:tcPr/>
+                </a:tc>
+                <a:tc>
+                  <a:txBody>
+                    <a:bodyPr/>
+                    <a:lstStyle/>
+                    <a:p>
+                      <a:pPr algn="ctr"/>
+                      <a:r>
+                        <a:rPr lang="pt-PT" sz="1400" dirty="0" smtClean="0"/>
+                        <a:t>1.95</a:t>
+                      </a:r>
+                      <a:endParaRPr lang="pt-PT" sz="1400" dirty="0"/>
+                    </a:p>
+                  </a:txBody>
+                  <a:tcPr/>
+                </a:tc>
+                <a:tc>
+                  <a:txBody>
+                    <a:bodyPr/>
+                    <a:lstStyle/>
+                    <a:p>
+                      <a:pPr algn="ctr"/>
+                      <a:r>
+                        <a:rPr lang="pt-PT" sz="1400" dirty="0" smtClean="0"/>
+                        <a:t>2.21</a:t>
+                      </a:r>
+                      <a:endParaRPr lang="pt-PT" sz="1400" dirty="0"/>
+                    </a:p>
+                  </a:txBody>
+                  <a:tcPr/>
+                </a:tc>
+                <a:tc>
+                  <a:txBody>
+                    <a:bodyPr/>
+                    <a:lstStyle/>
+                    <a:p>
+                      <a:pPr algn="ctr"/>
+                      <a:r>
+                        <a:rPr lang="pt-PT" sz="1400" dirty="0" smtClean="0"/>
+                        <a:t>2824</a:t>
+                      </a:r>
+                      <a:endParaRPr lang="pt-PT" sz="1400" dirty="0"/>
+                    </a:p>
+                  </a:txBody>
+                  <a:tcPr/>
+                </a:tc>
+                <a:tc>
+                  <a:txBody>
+                    <a:bodyPr/>
+                    <a:lstStyle/>
+                    <a:p>
+                      <a:pPr algn="ctr"/>
+                      <a:r>
+                        <a:rPr lang="pt-PT" sz="1400" dirty="0" smtClean="0"/>
+                        <a:t>2813</a:t>
+                      </a:r>
+                      <a:endParaRPr lang="pt-PT" sz="1400" dirty="0"/>
+                    </a:p>
+                  </a:txBody>
+                  <a:tcPr/>
+                </a:tc>
+              </a:tr>
+            </a:tbl>
+          </a:graphicData>
+        </a:graphic>
+      </p:graphicFrame>
+      <p:sp>
+        <p:nvSpPr>
+          <p:cNvPr id="17" name="CaixaDeTexto 16"/>
+          <p:cNvSpPr txBox="1"/>
+          <p:nvPr/>
+        </p:nvSpPr>
+        <p:spPr>
+          <a:xfrm>
+            <a:off x="531496" y="4011212"/>
+            <a:ext cx="2088084" cy="369332"/>
+          </a:xfrm>
+          <a:prstGeom prst="rect">
+            <a:avLst/>
+          </a:prstGeom>
+          <a:noFill/>
+        </p:spPr>
+        <p:txBody>
+          <a:bodyPr wrap="square" rtlCol="0">
+            <a:spAutoFit/>
+          </a:bodyPr>
+          <a:lstStyle/>
+          <a:p>
+            <a:r>
+              <a:rPr lang="pt-PT" b="1" dirty="0" err="1" smtClean="0"/>
+              <a:t>Client</a:t>
+            </a:r>
+            <a:endParaRPr lang="pt-PT" b="1" dirty="0"/>
+          </a:p>
+        </p:txBody>
+      </p:sp>
+      <p:graphicFrame>
+        <p:nvGraphicFramePr>
+          <p:cNvPr id="18" name="Tabela 17"/>
+          <p:cNvGraphicFramePr>
+            <a:graphicFrameLocks noGrp="1"/>
+          </p:cNvGraphicFramePr>
+          <p:nvPr>
+            <p:extLst>
+              <p:ext uri="{D42A27DB-BD31-4B8C-83A1-F6EECF244321}">
+                <p14:modId xmlns:p14="http://schemas.microsoft.com/office/powerpoint/2010/main" val="281346180"/>
+              </p:ext>
+            </p:extLst>
+          </p:nvPr>
+        </p:nvGraphicFramePr>
+        <p:xfrm>
+          <a:off x="623454" y="4557496"/>
+          <a:ext cx="5900992" cy="1460028"/>
+        </p:xfrm>
+        <a:graphic>
+          <a:graphicData uri="http://schemas.openxmlformats.org/drawingml/2006/table">
+            <a:tbl>
+              <a:tblPr firstRow="1" bandRow="1">
+                <a:tableStyleId>{5C22544A-7EE6-4342-B048-85BDC9FD1C3A}</a:tableStyleId>
+              </a:tblPr>
+              <a:tblGrid>
+                <a:gridCol w="859155"/>
+                <a:gridCol w="1254442"/>
+                <a:gridCol w="966724"/>
+                <a:gridCol w="584518"/>
+                <a:gridCol w="713105"/>
+                <a:gridCol w="538480"/>
+                <a:gridCol w="984568"/>
+              </a:tblGrid>
+              <a:tr h="347508">
+                <a:tc>
+                  <a:txBody>
+                    <a:bodyPr/>
+                    <a:lstStyle/>
+                    <a:p>
+                      <a:pPr algn="ctr"/>
+                      <a:r>
+                        <a:rPr lang="pt-PT" sz="1400" dirty="0" err="1" smtClean="0"/>
+                        <a:t>client_id</a:t>
+                      </a:r>
+                      <a:endParaRPr lang="pt-PT" sz="1400" dirty="0"/>
+                    </a:p>
+                  </a:txBody>
+                  <a:tcPr>
+                    <a:solidFill>
+                      <a:srgbClr val="00568A"/>
+                    </a:solidFill>
+                  </a:tcPr>
+                </a:tc>
+                <a:tc>
+                  <a:txBody>
+                    <a:bodyPr/>
+                    <a:lstStyle/>
+                    <a:p>
+                      <a:pPr algn="ctr"/>
+                      <a:r>
+                        <a:rPr lang="pt-PT" sz="1400" dirty="0" err="1" smtClean="0"/>
+                        <a:t>birth_number</a:t>
+                      </a:r>
+                      <a:endParaRPr lang="pt-PT" sz="1400" dirty="0"/>
+                    </a:p>
+                  </a:txBody>
+                  <a:tcPr>
+                    <a:solidFill>
+                      <a:srgbClr val="00568A"/>
+                    </a:solidFill>
+                  </a:tcPr>
+                </a:tc>
+                <a:tc>
+                  <a:txBody>
+                    <a:bodyPr/>
+                    <a:lstStyle/>
+                    <a:p>
+                      <a:pPr algn="ctr"/>
+                      <a:r>
+                        <a:rPr lang="pt-PT" sz="1400" dirty="0" err="1" smtClean="0"/>
+                        <a:t>district_id</a:t>
+                      </a:r>
+                      <a:endParaRPr lang="pt-PT" sz="1400" dirty="0"/>
+                    </a:p>
+                  </a:txBody>
+                  <a:tcPr>
+                    <a:solidFill>
+                      <a:srgbClr val="00568A"/>
+                    </a:solidFill>
+                  </a:tcPr>
+                </a:tc>
+                <a:tc>
+                  <a:txBody>
+                    <a:bodyPr/>
+                    <a:lstStyle/>
+                    <a:p>
+                      <a:pPr algn="ctr"/>
+                      <a:r>
+                        <a:rPr lang="pt-PT" sz="1400" dirty="0" err="1" smtClean="0"/>
+                        <a:t>year</a:t>
+                      </a:r>
+                      <a:endParaRPr lang="pt-PT" sz="1400" dirty="0"/>
+                    </a:p>
+                  </a:txBody>
+                  <a:tcPr>
+                    <a:solidFill>
+                      <a:srgbClr val="00568A"/>
+                    </a:solidFill>
+                  </a:tcPr>
+                </a:tc>
+                <a:tc>
+                  <a:txBody>
+                    <a:bodyPr/>
+                    <a:lstStyle/>
+                    <a:p>
+                      <a:pPr algn="ctr"/>
+                      <a:r>
+                        <a:rPr lang="pt-PT" sz="1400" dirty="0" err="1" smtClean="0"/>
+                        <a:t>month</a:t>
+                      </a:r>
+                      <a:endParaRPr lang="pt-PT" sz="1400" dirty="0"/>
+                    </a:p>
+                  </a:txBody>
+                  <a:tcPr>
+                    <a:solidFill>
+                      <a:srgbClr val="00568A"/>
+                    </a:solidFill>
+                  </a:tcPr>
+                </a:tc>
+                <a:tc>
+                  <a:txBody>
+                    <a:bodyPr/>
+                    <a:lstStyle/>
+                    <a:p>
+                      <a:pPr algn="ctr"/>
+                      <a:r>
+                        <a:rPr lang="pt-PT" sz="1400" dirty="0" err="1" smtClean="0"/>
+                        <a:t>day</a:t>
+                      </a:r>
+                      <a:endParaRPr lang="pt-PT" sz="1400" dirty="0"/>
+                    </a:p>
+                  </a:txBody>
+                  <a:tcPr>
+                    <a:solidFill>
+                      <a:srgbClr val="00568A"/>
+                    </a:solidFill>
+                  </a:tcPr>
+                </a:tc>
+                <a:tc>
+                  <a:txBody>
+                    <a:bodyPr/>
+                    <a:lstStyle/>
+                    <a:p>
+                      <a:pPr algn="ctr"/>
+                      <a:r>
+                        <a:rPr lang="pt-PT" sz="1400" dirty="0" err="1" smtClean="0"/>
+                        <a:t>gender</a:t>
+                      </a:r>
+                      <a:endParaRPr lang="pt-PT" sz="1400" dirty="0"/>
+                    </a:p>
+                  </a:txBody>
+                  <a:tcPr>
+                    <a:solidFill>
+                      <a:srgbClr val="00568A"/>
+                    </a:solidFill>
+                  </a:tcPr>
+                </a:tc>
+              </a:tr>
+              <a:tr h="370840">
+                <a:tc>
+                  <a:txBody>
+                    <a:bodyPr/>
+                    <a:lstStyle/>
+                    <a:p>
+                      <a:pPr algn="ctr"/>
+                      <a:r>
+                        <a:rPr lang="pt-PT" sz="1400" dirty="0" smtClean="0"/>
+                        <a:t>1</a:t>
+                      </a:r>
+                      <a:endParaRPr lang="pt-PT" sz="1400" dirty="0"/>
+                    </a:p>
+                  </a:txBody>
+                  <a:tcPr/>
+                </a:tc>
+                <a:tc>
+                  <a:txBody>
+                    <a:bodyPr/>
+                    <a:lstStyle/>
+                    <a:p>
+                      <a:pPr algn="ctr"/>
+                      <a:r>
+                        <a:rPr lang="pt-PT" sz="1400" dirty="0" smtClean="0"/>
+                        <a:t>706213</a:t>
+                      </a:r>
+                      <a:endParaRPr lang="pt-PT" sz="1400" dirty="0"/>
+                    </a:p>
+                  </a:txBody>
+                  <a:tcPr/>
+                </a:tc>
+                <a:tc>
+                  <a:txBody>
+                    <a:bodyPr/>
+                    <a:lstStyle/>
+                    <a:p>
+                      <a:pPr algn="ctr"/>
+                      <a:r>
+                        <a:rPr lang="pt-PT" sz="1400" dirty="0" smtClean="0"/>
+                        <a:t>18</a:t>
+                      </a:r>
+                      <a:endParaRPr lang="pt-PT" sz="1400" dirty="0"/>
+                    </a:p>
+                  </a:txBody>
+                  <a:tcPr/>
+                </a:tc>
+                <a:tc>
+                  <a:txBody>
+                    <a:bodyPr/>
+                    <a:lstStyle/>
+                    <a:p>
+                      <a:pPr algn="ctr"/>
+                      <a:r>
+                        <a:rPr lang="pt-PT" sz="1400" dirty="0" smtClean="0"/>
+                        <a:t>1970</a:t>
+                      </a:r>
+                      <a:endParaRPr lang="pt-PT" sz="1400" dirty="0"/>
+                    </a:p>
+                  </a:txBody>
+                  <a:tcPr/>
+                </a:tc>
+                <a:tc>
+                  <a:txBody>
+                    <a:bodyPr/>
+                    <a:lstStyle/>
+                    <a:p>
+                      <a:pPr algn="ctr"/>
+                      <a:r>
+                        <a:rPr lang="pt-PT" sz="1400" dirty="0" smtClean="0"/>
+                        <a:t>12</a:t>
+                      </a:r>
+                      <a:endParaRPr lang="pt-PT" sz="1400" dirty="0"/>
+                    </a:p>
+                  </a:txBody>
+                  <a:tcPr/>
+                </a:tc>
+                <a:tc>
+                  <a:txBody>
+                    <a:bodyPr/>
+                    <a:lstStyle/>
+                    <a:p>
+                      <a:pPr algn="ctr"/>
+                      <a:r>
+                        <a:rPr lang="pt-PT" sz="1400" dirty="0" smtClean="0"/>
+                        <a:t>13</a:t>
+                      </a:r>
+                      <a:endParaRPr lang="pt-PT" sz="1400" dirty="0"/>
+                    </a:p>
+                  </a:txBody>
+                  <a:tcPr/>
+                </a:tc>
+                <a:tc>
+                  <a:txBody>
+                    <a:bodyPr/>
+                    <a:lstStyle/>
+                    <a:p>
+                      <a:pPr algn="ctr"/>
+                      <a:r>
+                        <a:rPr lang="pt-PT" sz="1400" dirty="0" smtClean="0"/>
+                        <a:t>f</a:t>
+                      </a:r>
+                      <a:endParaRPr lang="pt-PT" sz="1400" dirty="0"/>
+                    </a:p>
+                  </a:txBody>
+                  <a:tcPr/>
+                </a:tc>
+              </a:tr>
+              <a:tr h="370840">
+                <a:tc>
+                  <a:txBody>
+                    <a:bodyPr/>
+                    <a:lstStyle/>
+                    <a:p>
+                      <a:pPr algn="ctr"/>
+                      <a:r>
+                        <a:rPr lang="pt-PT" sz="1400" dirty="0" smtClean="0"/>
+                        <a:t>2</a:t>
+                      </a:r>
+                      <a:endParaRPr lang="pt-PT" sz="1400" dirty="0"/>
+                    </a:p>
+                  </a:txBody>
+                  <a:tcPr/>
+                </a:tc>
+                <a:tc>
+                  <a:txBody>
+                    <a:bodyPr/>
+                    <a:lstStyle/>
+                    <a:p>
+                      <a:pPr algn="ctr"/>
+                      <a:r>
+                        <a:rPr lang="pt-PT" sz="1400" dirty="0" smtClean="0"/>
+                        <a:t>450204</a:t>
+                      </a:r>
+                      <a:endParaRPr lang="pt-PT" sz="1400" dirty="0"/>
+                    </a:p>
+                  </a:txBody>
+                  <a:tcPr/>
+                </a:tc>
+                <a:tc>
+                  <a:txBody>
+                    <a:bodyPr/>
+                    <a:lstStyle/>
+                    <a:p>
+                      <a:pPr algn="ctr"/>
+                      <a:r>
+                        <a:rPr lang="pt-PT" sz="1400" dirty="0" smtClean="0"/>
+                        <a:t>1</a:t>
+                      </a:r>
+                      <a:endParaRPr lang="pt-PT" sz="1400" dirty="0"/>
+                    </a:p>
+                  </a:txBody>
+                  <a:tcPr/>
+                </a:tc>
+                <a:tc>
+                  <a:txBody>
+                    <a:bodyPr/>
+                    <a:lstStyle/>
+                    <a:p>
+                      <a:pPr algn="ctr"/>
+                      <a:r>
+                        <a:rPr lang="pt-PT" sz="1400" dirty="0" smtClean="0"/>
+                        <a:t>1945</a:t>
+                      </a:r>
+                      <a:endParaRPr lang="pt-PT" sz="1400" dirty="0"/>
+                    </a:p>
+                  </a:txBody>
+                  <a:tcPr/>
+                </a:tc>
+                <a:tc>
+                  <a:txBody>
+                    <a:bodyPr/>
+                    <a:lstStyle/>
+                    <a:p>
+                      <a:pPr algn="ctr"/>
+                      <a:r>
+                        <a:rPr lang="pt-PT" sz="1400" dirty="0" smtClean="0"/>
+                        <a:t>02</a:t>
+                      </a:r>
+                      <a:endParaRPr lang="pt-PT" sz="1400" dirty="0"/>
+                    </a:p>
+                  </a:txBody>
+                  <a:tcPr/>
+                </a:tc>
+                <a:tc>
+                  <a:txBody>
+                    <a:bodyPr/>
+                    <a:lstStyle/>
+                    <a:p>
+                      <a:pPr algn="ctr"/>
+                      <a:r>
+                        <a:rPr lang="pt-PT" sz="1400" dirty="0" smtClean="0"/>
+                        <a:t>04</a:t>
+                      </a:r>
+                      <a:endParaRPr lang="pt-PT" sz="1400" dirty="0"/>
+                    </a:p>
+                  </a:txBody>
+                  <a:tcPr/>
+                </a:tc>
+                <a:tc>
+                  <a:txBody>
+                    <a:bodyPr/>
+                    <a:lstStyle/>
+                    <a:p>
+                      <a:pPr algn="ctr"/>
+                      <a:r>
+                        <a:rPr lang="pt-PT" sz="1400" dirty="0" smtClean="0"/>
+                        <a:t>m</a:t>
+                      </a:r>
+                      <a:endParaRPr lang="pt-PT" sz="1400" dirty="0"/>
+                    </a:p>
+                  </a:txBody>
+                  <a:tcPr/>
+                </a:tc>
+              </a:tr>
+              <a:tr h="370840">
+                <a:tc>
+                  <a:txBody>
+                    <a:bodyPr/>
+                    <a:lstStyle/>
+                    <a:p>
+                      <a:pPr algn="ctr"/>
+                      <a:r>
+                        <a:rPr lang="pt-PT" sz="1400" dirty="0" smtClean="0"/>
+                        <a:t>3</a:t>
+                      </a:r>
+                      <a:endParaRPr lang="pt-PT" sz="1400" dirty="0"/>
+                    </a:p>
+                  </a:txBody>
+                  <a:tcPr/>
+                </a:tc>
+                <a:tc>
+                  <a:txBody>
+                    <a:bodyPr/>
+                    <a:lstStyle/>
+                    <a:p>
+                      <a:pPr algn="ctr"/>
+                      <a:r>
+                        <a:rPr lang="pt-PT" sz="1400" dirty="0" smtClean="0"/>
+                        <a:t>406009</a:t>
+                      </a:r>
+                      <a:endParaRPr lang="pt-PT" sz="1400" dirty="0"/>
+                    </a:p>
+                  </a:txBody>
+                  <a:tcPr/>
+                </a:tc>
+                <a:tc>
+                  <a:txBody>
+                    <a:bodyPr/>
+                    <a:lstStyle/>
+                    <a:p>
+                      <a:pPr algn="ctr"/>
+                      <a:r>
+                        <a:rPr lang="pt-PT" sz="1400" dirty="0" smtClean="0"/>
+                        <a:t>1</a:t>
+                      </a:r>
+                      <a:endParaRPr lang="pt-PT" sz="1400" dirty="0"/>
+                    </a:p>
+                  </a:txBody>
+                  <a:tcPr/>
+                </a:tc>
+                <a:tc>
+                  <a:txBody>
+                    <a:bodyPr/>
+                    <a:lstStyle/>
+                    <a:p>
+                      <a:pPr algn="ctr"/>
+                      <a:r>
+                        <a:rPr lang="pt-PT" sz="1400" dirty="0" smtClean="0"/>
+                        <a:t>1940</a:t>
+                      </a:r>
+                      <a:endParaRPr lang="pt-PT" sz="1400" dirty="0"/>
+                    </a:p>
+                  </a:txBody>
+                  <a:tcPr/>
+                </a:tc>
+                <a:tc>
+                  <a:txBody>
+                    <a:bodyPr/>
+                    <a:lstStyle/>
+                    <a:p>
+                      <a:pPr algn="ctr"/>
+                      <a:r>
+                        <a:rPr lang="pt-PT" sz="1400" dirty="0" smtClean="0"/>
+                        <a:t>10</a:t>
+                      </a:r>
+                      <a:endParaRPr lang="pt-PT" sz="1400" dirty="0"/>
+                    </a:p>
+                  </a:txBody>
+                  <a:tcPr/>
+                </a:tc>
+                <a:tc>
+                  <a:txBody>
+                    <a:bodyPr/>
+                    <a:lstStyle/>
+                    <a:p>
+                      <a:pPr algn="ctr"/>
+                      <a:r>
+                        <a:rPr lang="pt-PT" sz="1400" dirty="0" smtClean="0"/>
+                        <a:t>09</a:t>
+                      </a:r>
+                      <a:endParaRPr lang="pt-PT" sz="1400" dirty="0"/>
+                    </a:p>
+                  </a:txBody>
+                  <a:tcPr/>
+                </a:tc>
+                <a:tc>
+                  <a:txBody>
+                    <a:bodyPr/>
+                    <a:lstStyle/>
+                    <a:p>
+                      <a:pPr algn="ctr"/>
+                      <a:r>
+                        <a:rPr lang="pt-PT" sz="1400" dirty="0" smtClean="0"/>
+                        <a:t>f</a:t>
+                      </a:r>
+                      <a:endParaRPr lang="pt-PT" sz="1400" dirty="0"/>
+                    </a:p>
+                  </a:txBody>
+                  <a:tcPr/>
+                </a:tc>
+              </a:tr>
+            </a:tbl>
+          </a:graphicData>
+        </a:graphic>
+      </p:graphicFrame>
+    </p:spTree>
+    <p:extLst>
+      <p:ext uri="{BB962C8B-B14F-4D97-AF65-F5344CB8AC3E}">
+        <p14:creationId xmlns:p14="http://schemas.microsoft.com/office/powerpoint/2010/main" val="908378194"/>
+      </p:ext>
+    </p:extLst>
+  </p:cSld>
+  <p:clrMapOvr>
+    <a:masterClrMapping/>
+  </p:clrMapOvr>
+  <p:timing>
+    <p:tnLst>
+      <p:par>
+        <p:cTn id="1" dur="indefinite" restart="never" nodeType="tmRoot"/>
+      </p:par>
+    </p:tnLst>
+  </p:timing>
+</p:sld>
+</file>
+
+<file path=ppt/slides/slide22.xml><?xml version="1.0" encoding="utf-8"?>
+<p:sld xmlns:a="http://schemas.openxmlformats.org/drawingml/2006/main" xmlns:r="http://schemas.openxmlformats.org/officeDocument/2006/relationships" xmlns:p="http://schemas.openxmlformats.org/presentationml/2006/main">
+  <p:cSld>
+    <p:spTree>
+      <p:nvGrpSpPr>
+        <p:cNvPr id="1" name=""/>
+        <p:cNvGrpSpPr/>
+        <p:nvPr/>
+      </p:nvGrpSpPr>
+      <p:grpSpPr>
+        <a:xfrm>
+          <a:off x="0" y="0"/>
+          <a:ext cx="0" cy="0"/>
+          <a:chOff x="0" y="0"/>
+          <a:chExt cx="0" cy="0"/>
+        </a:xfrm>
+      </p:grpSpPr>
+      <p:sp>
+        <p:nvSpPr>
+          <p:cNvPr id="2" name="CaixaDeTexto 1"/>
+          <p:cNvSpPr txBox="1"/>
+          <p:nvPr/>
+        </p:nvSpPr>
+        <p:spPr>
+          <a:xfrm>
+            <a:off x="0" y="0"/>
+            <a:ext cx="12192000" cy="1579418"/>
+          </a:xfrm>
+          <a:prstGeom prst="rect">
+            <a:avLst/>
+          </a:prstGeom>
+          <a:solidFill>
+            <a:schemeClr val="bg1">
+              <a:lumMod val="95000"/>
+            </a:schemeClr>
+          </a:solidFill>
+        </p:spPr>
+        <p:txBody>
+          <a:bodyPr wrap="square" rtlCol="0">
+            <a:spAutoFit/>
+          </a:bodyPr>
+          <a:lstStyle/>
+          <a:p>
+            <a:endParaRPr lang="pt-PT" dirty="0"/>
+          </a:p>
+        </p:txBody>
+      </p:sp>
+      <p:sp>
+        <p:nvSpPr>
+          <p:cNvPr id="3" name="CaixaDeTexto 2"/>
+          <p:cNvSpPr txBox="1"/>
+          <p:nvPr/>
+        </p:nvSpPr>
+        <p:spPr>
+          <a:xfrm>
+            <a:off x="623455" y="346365"/>
+            <a:ext cx="1668984" cy="923330"/>
+          </a:xfrm>
+          <a:prstGeom prst="rect">
+            <a:avLst/>
+          </a:prstGeom>
+          <a:noFill/>
+        </p:spPr>
+        <p:txBody>
+          <a:bodyPr wrap="square" rtlCol="0">
+            <a:spAutoFit/>
+          </a:bodyPr>
+          <a:lstStyle/>
+          <a:p>
+            <a:r>
+              <a:rPr lang="pt-PT" sz="5400" dirty="0" smtClean="0">
+                <a:solidFill>
+                  <a:srgbClr val="B9122B"/>
+                </a:solidFill>
+              </a:rPr>
+              <a:t>#</a:t>
+            </a:r>
+            <a:r>
+              <a:rPr lang="pt-PT" sz="5400" dirty="0" smtClean="0">
+                <a:solidFill>
+                  <a:srgbClr val="B9122B"/>
+                </a:solidFill>
+              </a:rPr>
+              <a:t>AN</a:t>
+            </a:r>
+            <a:endParaRPr lang="pt-PT" sz="5400" dirty="0">
+              <a:solidFill>
+                <a:srgbClr val="B9122B"/>
+              </a:solidFill>
+            </a:endParaRPr>
+          </a:p>
+        </p:txBody>
+      </p:sp>
+      <p:sp>
+        <p:nvSpPr>
+          <p:cNvPr id="5" name="CaixaDeTexto 4"/>
+          <p:cNvSpPr txBox="1"/>
+          <p:nvPr/>
+        </p:nvSpPr>
+        <p:spPr>
+          <a:xfrm>
+            <a:off x="2115502" y="513363"/>
+            <a:ext cx="9363332" cy="584775"/>
+          </a:xfrm>
+          <a:prstGeom prst="rect">
+            <a:avLst/>
+          </a:prstGeom>
+          <a:noFill/>
+        </p:spPr>
+        <p:txBody>
+          <a:bodyPr wrap="none" rtlCol="0">
+            <a:spAutoFit/>
+          </a:bodyPr>
+          <a:lstStyle/>
+          <a:p>
+            <a:r>
+              <a:rPr lang="pt-PT" sz="3200" dirty="0" err="1" smtClean="0">
+                <a:solidFill>
+                  <a:srgbClr val="00568A"/>
+                </a:solidFill>
+              </a:rPr>
+              <a:t>Decision</a:t>
+            </a:r>
+            <a:r>
+              <a:rPr lang="pt-PT" sz="3200" dirty="0" smtClean="0">
+                <a:solidFill>
+                  <a:srgbClr val="00568A"/>
+                </a:solidFill>
+              </a:rPr>
+              <a:t> </a:t>
+            </a:r>
+            <a:r>
+              <a:rPr lang="pt-PT" sz="3200" dirty="0" err="1" smtClean="0">
+                <a:solidFill>
+                  <a:srgbClr val="00568A"/>
+                </a:solidFill>
+              </a:rPr>
+              <a:t>Tree</a:t>
+            </a:r>
+            <a:r>
+              <a:rPr lang="pt-PT" sz="3200" dirty="0" smtClean="0">
+                <a:solidFill>
+                  <a:srgbClr val="00568A"/>
+                </a:solidFill>
+              </a:rPr>
+              <a:t> </a:t>
+            </a:r>
+            <a:r>
+              <a:rPr lang="mr-IN" sz="3200" dirty="0" smtClean="0">
+                <a:solidFill>
+                  <a:srgbClr val="00568A"/>
+                </a:solidFill>
+              </a:rPr>
+              <a:t>–</a:t>
+            </a:r>
+            <a:r>
+              <a:rPr lang="pt-PT" sz="3200" dirty="0" smtClean="0">
+                <a:solidFill>
+                  <a:srgbClr val="00568A"/>
+                </a:solidFill>
+              </a:rPr>
+              <a:t> </a:t>
+            </a:r>
+            <a:r>
+              <a:rPr lang="pt-PT" sz="3200" dirty="0" err="1" smtClean="0">
+                <a:solidFill>
+                  <a:srgbClr val="00568A"/>
+                </a:solidFill>
+              </a:rPr>
+              <a:t>Loan</a:t>
+            </a:r>
+            <a:r>
+              <a:rPr lang="pt-PT" sz="3200" dirty="0" smtClean="0">
+                <a:solidFill>
+                  <a:srgbClr val="00568A"/>
+                </a:solidFill>
+              </a:rPr>
+              <a:t> </a:t>
+            </a:r>
+            <a:r>
+              <a:rPr lang="pt-PT" sz="3200" dirty="0" err="1" smtClean="0">
+                <a:solidFill>
+                  <a:srgbClr val="00568A"/>
+                </a:solidFill>
+              </a:rPr>
+              <a:t>success</a:t>
+            </a:r>
+            <a:r>
+              <a:rPr lang="pt-PT" sz="3200" dirty="0">
+                <a:solidFill>
+                  <a:srgbClr val="00568A"/>
+                </a:solidFill>
+              </a:rPr>
+              <a:t> </a:t>
+            </a:r>
+            <a:r>
+              <a:rPr lang="pt-PT" sz="3200" dirty="0" smtClean="0">
+                <a:solidFill>
+                  <a:srgbClr val="00568A"/>
+                </a:solidFill>
+              </a:rPr>
+              <a:t>(</a:t>
+            </a:r>
+            <a:r>
+              <a:rPr lang="pt-PT" sz="3200" dirty="0" err="1" smtClean="0">
+                <a:solidFill>
+                  <a:srgbClr val="00568A"/>
+                </a:solidFill>
+              </a:rPr>
+              <a:t>amount</a:t>
+            </a:r>
+            <a:r>
+              <a:rPr lang="pt-PT" sz="3200" dirty="0" smtClean="0">
+                <a:solidFill>
+                  <a:srgbClr val="00568A"/>
+                </a:solidFill>
+              </a:rPr>
+              <a:t>, </a:t>
+            </a:r>
+            <a:r>
+              <a:rPr lang="pt-PT" sz="3200" dirty="0" err="1" smtClean="0">
+                <a:solidFill>
+                  <a:srgbClr val="00568A"/>
+                </a:solidFill>
+              </a:rPr>
+              <a:t>salary</a:t>
+            </a:r>
+            <a:r>
+              <a:rPr lang="pt-PT" sz="3200" dirty="0" smtClean="0">
+                <a:solidFill>
+                  <a:srgbClr val="00568A"/>
+                </a:solidFill>
+              </a:rPr>
+              <a:t>, </a:t>
+            </a:r>
+            <a:r>
+              <a:rPr lang="pt-PT" sz="3200" dirty="0" err="1" smtClean="0">
+                <a:solidFill>
+                  <a:srgbClr val="00568A"/>
+                </a:solidFill>
+              </a:rPr>
+              <a:t>duration</a:t>
+            </a:r>
+            <a:r>
+              <a:rPr lang="pt-PT" sz="3200" dirty="0" smtClean="0">
+                <a:solidFill>
+                  <a:srgbClr val="00568A"/>
+                </a:solidFill>
+              </a:rPr>
+              <a:t>)</a:t>
+            </a:r>
+            <a:endParaRPr lang="pt-PT" sz="3200" dirty="0">
+              <a:solidFill>
+                <a:srgbClr val="00568A"/>
+              </a:solidFill>
+            </a:endParaRPr>
+          </a:p>
+        </p:txBody>
+      </p:sp>
+      <p:sp>
+        <p:nvSpPr>
+          <p:cNvPr id="4" name="Marcador de Posição do Número do Diapositivo 3"/>
+          <p:cNvSpPr>
+            <a:spLocks noGrp="1"/>
+          </p:cNvSpPr>
+          <p:nvPr>
+            <p:ph type="sldNum" sz="quarter" idx="12"/>
+          </p:nvPr>
+        </p:nvSpPr>
+        <p:spPr/>
+        <p:txBody>
+          <a:bodyPr/>
+          <a:lstStyle/>
+          <a:p>
+            <a:fld id="{5683189C-B5E2-F345-AC06-1CEB972D3557}" type="slidenum">
+              <a:rPr lang="pt-PT" smtClean="0"/>
+              <a:t>22</a:t>
+            </a:fld>
+            <a:endParaRPr lang="pt-PT"/>
+          </a:p>
+        </p:txBody>
+      </p:sp>
+    </p:spTree>
+    <p:extLst>
+      <p:ext uri="{BB962C8B-B14F-4D97-AF65-F5344CB8AC3E}">
+        <p14:creationId xmlns:p14="http://schemas.microsoft.com/office/powerpoint/2010/main" val="2002486517"/>
       </p:ext>
     </p:extLst>
   </p:cSld>

</xml_diff>

<commit_message>
Updates on presentation. Clusters.
</commit_message>
<xml_diff>
--- a/presentation/presentation.pptx
+++ b/presentation/presentation.pptx
@@ -5,7 +5,7 @@
     <p:sldMasterId id="2147483648" r:id="rId1"/>
   </p:sldMasterIdLst>
   <p:notesMasterIdLst>
-    <p:notesMasterId r:id="rId24"/>
+    <p:notesMasterId r:id="rId29"/>
   </p:notesMasterIdLst>
   <p:sldIdLst>
     <p:sldId id="257" r:id="rId2"/>
@@ -23,13 +23,18 @@
     <p:sldId id="261" r:id="rId14"/>
     <p:sldId id="262" r:id="rId15"/>
     <p:sldId id="263" r:id="rId16"/>
-    <p:sldId id="274" r:id="rId17"/>
-    <p:sldId id="276" r:id="rId18"/>
-    <p:sldId id="277" r:id="rId19"/>
-    <p:sldId id="275" r:id="rId20"/>
-    <p:sldId id="278" r:id="rId21"/>
-    <p:sldId id="279" r:id="rId22"/>
-    <p:sldId id="280" r:id="rId23"/>
+    <p:sldId id="281" r:id="rId17"/>
+    <p:sldId id="274" r:id="rId18"/>
+    <p:sldId id="285" r:id="rId19"/>
+    <p:sldId id="276" r:id="rId20"/>
+    <p:sldId id="282" r:id="rId21"/>
+    <p:sldId id="277" r:id="rId22"/>
+    <p:sldId id="283" r:id="rId23"/>
+    <p:sldId id="275" r:id="rId24"/>
+    <p:sldId id="284" r:id="rId25"/>
+    <p:sldId id="278" r:id="rId26"/>
+    <p:sldId id="279" r:id="rId27"/>
+    <p:sldId id="280" r:id="rId28"/>
   </p:sldIdLst>
   <p:sldSz cx="12192000" cy="6858000"/>
   <p:notesSz cx="6858000" cy="9144000"/>
@@ -1610,7 +1615,7 @@
     </p:spTree>
     <p:extLst>
       <p:ext uri="{BB962C8B-B14F-4D97-AF65-F5344CB8AC3E}">
-        <p14:creationId xmlns:p14="http://schemas.microsoft.com/office/powerpoint/2010/main" val="1982784614"/>
+        <p14:creationId xmlns:p14="http://schemas.microsoft.com/office/powerpoint/2010/main" val="1358340319"/>
       </p:ext>
     </p:extLst>
   </p:cSld>
@@ -1772,7 +1777,7 @@
     </p:spTree>
     <p:extLst>
       <p:ext uri="{BB962C8B-B14F-4D97-AF65-F5344CB8AC3E}">
-        <p14:creationId xmlns:p14="http://schemas.microsoft.com/office/powerpoint/2010/main" val="610406970"/>
+        <p14:creationId xmlns:p14="http://schemas.microsoft.com/office/powerpoint/2010/main" val="1982784614"/>
       </p:ext>
     </p:extLst>
   </p:cSld>
@@ -1934,7 +1939,7 @@
     </p:spTree>
     <p:extLst>
       <p:ext uri="{BB962C8B-B14F-4D97-AF65-F5344CB8AC3E}">
-        <p14:creationId xmlns:p14="http://schemas.microsoft.com/office/powerpoint/2010/main" val="924817980"/>
+        <p14:creationId xmlns:p14="http://schemas.microsoft.com/office/powerpoint/2010/main" val="883862793"/>
       </p:ext>
     </p:extLst>
   </p:cSld>
@@ -2096,7 +2101,7 @@
     </p:spTree>
     <p:extLst>
       <p:ext uri="{BB962C8B-B14F-4D97-AF65-F5344CB8AC3E}">
-        <p14:creationId xmlns:p14="http://schemas.microsoft.com/office/powerpoint/2010/main" val="886354255"/>
+        <p14:creationId xmlns:p14="http://schemas.microsoft.com/office/powerpoint/2010/main" val="610406970"/>
       </p:ext>
     </p:extLst>
   </p:cSld>
@@ -2258,7 +2263,7 @@
     </p:spTree>
     <p:extLst>
       <p:ext uri="{BB962C8B-B14F-4D97-AF65-F5344CB8AC3E}">
-        <p14:creationId xmlns:p14="http://schemas.microsoft.com/office/powerpoint/2010/main" val="818119612"/>
+        <p14:creationId xmlns:p14="http://schemas.microsoft.com/office/powerpoint/2010/main" val="1626925553"/>
       </p:ext>
     </p:extLst>
   </p:cSld>
@@ -2582,7 +2587,7 @@
     </p:spTree>
     <p:extLst>
       <p:ext uri="{BB962C8B-B14F-4D97-AF65-F5344CB8AC3E}">
-        <p14:creationId xmlns:p14="http://schemas.microsoft.com/office/powerpoint/2010/main" val="651060035"/>
+        <p14:creationId xmlns:p14="http://schemas.microsoft.com/office/powerpoint/2010/main" val="924817980"/>
       </p:ext>
     </p:extLst>
   </p:cSld>
@@ -2736,6 +2741,816 @@
             <a:fld id="{3AC54132-D928-D54C-ABBE-ACE1209FEA7D}" type="slidenum">
               <a:rPr lang="pt-PT" smtClean="0"/>
               <a:t>22</a:t>
+            </a:fld>
+            <a:endParaRPr lang="pt-PT"/>
+          </a:p>
+        </p:txBody>
+      </p:sp>
+    </p:spTree>
+    <p:extLst>
+      <p:ext uri="{BB962C8B-B14F-4D97-AF65-F5344CB8AC3E}">
+        <p14:creationId xmlns:p14="http://schemas.microsoft.com/office/powerpoint/2010/main" val="973953361"/>
+      </p:ext>
+    </p:extLst>
+  </p:cSld>
+  <p:clrMapOvr>
+    <a:masterClrMapping/>
+  </p:clrMapOvr>
+</p:notes>
+</file>
+
+<file path=ppt/notesSlides/notesSlide22.xml><?xml version="1.0" encoding="utf-8"?>
+<p:notes xmlns:a="http://schemas.openxmlformats.org/drawingml/2006/main" xmlns:r="http://schemas.openxmlformats.org/officeDocument/2006/relationships" xmlns:p="http://schemas.openxmlformats.org/presentationml/2006/main">
+  <p:cSld>
+    <p:spTree>
+      <p:nvGrpSpPr>
+        <p:cNvPr id="1" name=""/>
+        <p:cNvGrpSpPr/>
+        <p:nvPr/>
+      </p:nvGrpSpPr>
+      <p:grpSpPr>
+        <a:xfrm>
+          <a:off x="0" y="0"/>
+          <a:ext cx="0" cy="0"/>
+          <a:chOff x="0" y="0"/>
+          <a:chExt cx="0" cy="0"/>
+        </a:xfrm>
+      </p:grpSpPr>
+      <p:sp>
+        <p:nvSpPr>
+          <p:cNvPr id="2" name="Marcador de Posição da Imagem do Diapositivo 1"/>
+          <p:cNvSpPr>
+            <a:spLocks noGrp="1" noRot="1" noChangeAspect="1"/>
+          </p:cNvSpPr>
+          <p:nvPr>
+            <p:ph type="sldImg"/>
+          </p:nvPr>
+        </p:nvSpPr>
+        <p:spPr/>
+      </p:sp>
+      <p:sp>
+        <p:nvSpPr>
+          <p:cNvPr id="3" name="Marcador de Posição de Notas 2"/>
+          <p:cNvSpPr>
+            <a:spLocks noGrp="1"/>
+          </p:cNvSpPr>
+          <p:nvPr>
+            <p:ph type="body" idx="1"/>
+          </p:nvPr>
+        </p:nvSpPr>
+        <p:spPr/>
+        <p:txBody>
+          <a:bodyPr/>
+          <a:lstStyle/>
+          <a:p>
+            <a:r>
+              <a:rPr lang="pt-PT" dirty="0" err="1" smtClean="0"/>
+              <a:t>Health</a:t>
+            </a:r>
+            <a:r>
+              <a:rPr lang="pt-PT" dirty="0" smtClean="0"/>
+              <a:t> </a:t>
+            </a:r>
+            <a:r>
+              <a:rPr lang="pt-PT" dirty="0" err="1" smtClean="0"/>
+              <a:t>Problems</a:t>
+            </a:r>
+            <a:r>
+              <a:rPr lang="pt-PT" dirty="0" smtClean="0"/>
+              <a:t> (stress, </a:t>
+            </a:r>
+            <a:r>
+              <a:rPr lang="pt-PT" dirty="0" err="1" smtClean="0"/>
+              <a:t>pollution</a:t>
+            </a:r>
+            <a:r>
+              <a:rPr lang="pt-PT" dirty="0" smtClean="0"/>
+              <a:t>,</a:t>
+            </a:r>
+            <a:r>
+              <a:rPr lang="pt-PT" baseline="0" dirty="0" smtClean="0"/>
+              <a:t> etc.) -&gt; </a:t>
+            </a:r>
+            <a:r>
+              <a:rPr lang="pt-PT" baseline="0" dirty="0" err="1" smtClean="0"/>
+              <a:t>related</a:t>
+            </a:r>
+            <a:r>
+              <a:rPr lang="pt-PT" baseline="0" dirty="0" smtClean="0"/>
+              <a:t> </a:t>
+            </a:r>
+            <a:r>
+              <a:rPr lang="pt-PT" baseline="0" dirty="0" err="1" smtClean="0"/>
+              <a:t>with</a:t>
+            </a:r>
+            <a:r>
+              <a:rPr lang="pt-PT" baseline="0" dirty="0" smtClean="0"/>
+              <a:t> </a:t>
+            </a:r>
+            <a:r>
+              <a:rPr lang="pt-PT" baseline="0" dirty="0" err="1" smtClean="0"/>
+              <a:t>environment</a:t>
+            </a:r>
+            <a:endParaRPr lang="pt-PT" dirty="0" smtClean="0"/>
+          </a:p>
+          <a:p>
+            <a:r>
+              <a:rPr lang="pt-PT" dirty="0" err="1" smtClean="0"/>
+              <a:t>Economic</a:t>
+            </a:r>
+            <a:r>
+              <a:rPr lang="pt-PT" baseline="0" dirty="0" smtClean="0"/>
+              <a:t> </a:t>
+            </a:r>
+            <a:r>
+              <a:rPr lang="pt-PT" baseline="0" dirty="0" err="1" smtClean="0"/>
+              <a:t>impact</a:t>
+            </a:r>
+            <a:endParaRPr lang="pt-PT" baseline="0" dirty="0" smtClean="0"/>
+          </a:p>
+          <a:p>
+            <a:r>
+              <a:rPr lang="pt-PT" baseline="0" dirty="0" err="1" smtClean="0"/>
+              <a:t>Environmental</a:t>
+            </a:r>
+            <a:r>
+              <a:rPr lang="pt-PT" baseline="0" dirty="0" smtClean="0"/>
+              <a:t> </a:t>
+            </a:r>
+            <a:r>
+              <a:rPr lang="pt-PT" baseline="0" dirty="0" err="1" smtClean="0"/>
+              <a:t>impact</a:t>
+            </a:r>
+            <a:endParaRPr lang="pt-PT" dirty="0"/>
+          </a:p>
+        </p:txBody>
+      </p:sp>
+      <p:sp>
+        <p:nvSpPr>
+          <p:cNvPr id="4" name="Marcador de Posição do Número do Diapositivo 3"/>
+          <p:cNvSpPr>
+            <a:spLocks noGrp="1"/>
+          </p:cNvSpPr>
+          <p:nvPr>
+            <p:ph type="sldNum" sz="quarter" idx="10"/>
+          </p:nvPr>
+        </p:nvSpPr>
+        <p:spPr/>
+        <p:txBody>
+          <a:bodyPr/>
+          <a:lstStyle/>
+          <a:p>
+            <a:fld id="{3AC54132-D928-D54C-ABBE-ACE1209FEA7D}" type="slidenum">
+              <a:rPr lang="pt-PT" smtClean="0"/>
+              <a:t>23</a:t>
+            </a:fld>
+            <a:endParaRPr lang="pt-PT"/>
+          </a:p>
+        </p:txBody>
+      </p:sp>
+    </p:spTree>
+    <p:extLst>
+      <p:ext uri="{BB962C8B-B14F-4D97-AF65-F5344CB8AC3E}">
+        <p14:creationId xmlns:p14="http://schemas.microsoft.com/office/powerpoint/2010/main" val="886354255"/>
+      </p:ext>
+    </p:extLst>
+  </p:cSld>
+  <p:clrMapOvr>
+    <a:masterClrMapping/>
+  </p:clrMapOvr>
+</p:notes>
+</file>
+
+<file path=ppt/notesSlides/notesSlide23.xml><?xml version="1.0" encoding="utf-8"?>
+<p:notes xmlns:a="http://schemas.openxmlformats.org/drawingml/2006/main" xmlns:r="http://schemas.openxmlformats.org/officeDocument/2006/relationships" xmlns:p="http://schemas.openxmlformats.org/presentationml/2006/main">
+  <p:cSld>
+    <p:spTree>
+      <p:nvGrpSpPr>
+        <p:cNvPr id="1" name=""/>
+        <p:cNvGrpSpPr/>
+        <p:nvPr/>
+      </p:nvGrpSpPr>
+      <p:grpSpPr>
+        <a:xfrm>
+          <a:off x="0" y="0"/>
+          <a:ext cx="0" cy="0"/>
+          <a:chOff x="0" y="0"/>
+          <a:chExt cx="0" cy="0"/>
+        </a:xfrm>
+      </p:grpSpPr>
+      <p:sp>
+        <p:nvSpPr>
+          <p:cNvPr id="2" name="Marcador de Posição da Imagem do Diapositivo 1"/>
+          <p:cNvSpPr>
+            <a:spLocks noGrp="1" noRot="1" noChangeAspect="1"/>
+          </p:cNvSpPr>
+          <p:nvPr>
+            <p:ph type="sldImg"/>
+          </p:nvPr>
+        </p:nvSpPr>
+        <p:spPr/>
+      </p:sp>
+      <p:sp>
+        <p:nvSpPr>
+          <p:cNvPr id="3" name="Marcador de Posição de Notas 2"/>
+          <p:cNvSpPr>
+            <a:spLocks noGrp="1"/>
+          </p:cNvSpPr>
+          <p:nvPr>
+            <p:ph type="body" idx="1"/>
+          </p:nvPr>
+        </p:nvSpPr>
+        <p:spPr/>
+        <p:txBody>
+          <a:bodyPr/>
+          <a:lstStyle/>
+          <a:p>
+            <a:r>
+              <a:rPr lang="pt-PT" dirty="0" err="1" smtClean="0"/>
+              <a:t>Health</a:t>
+            </a:r>
+            <a:r>
+              <a:rPr lang="pt-PT" dirty="0" smtClean="0"/>
+              <a:t> </a:t>
+            </a:r>
+            <a:r>
+              <a:rPr lang="pt-PT" dirty="0" err="1" smtClean="0"/>
+              <a:t>Problems</a:t>
+            </a:r>
+            <a:r>
+              <a:rPr lang="pt-PT" dirty="0" smtClean="0"/>
+              <a:t> (stress, </a:t>
+            </a:r>
+            <a:r>
+              <a:rPr lang="pt-PT" dirty="0" err="1" smtClean="0"/>
+              <a:t>pollution</a:t>
+            </a:r>
+            <a:r>
+              <a:rPr lang="pt-PT" dirty="0" smtClean="0"/>
+              <a:t>,</a:t>
+            </a:r>
+            <a:r>
+              <a:rPr lang="pt-PT" baseline="0" dirty="0" smtClean="0"/>
+              <a:t> etc.) -&gt; </a:t>
+            </a:r>
+            <a:r>
+              <a:rPr lang="pt-PT" baseline="0" dirty="0" err="1" smtClean="0"/>
+              <a:t>related</a:t>
+            </a:r>
+            <a:r>
+              <a:rPr lang="pt-PT" baseline="0" dirty="0" smtClean="0"/>
+              <a:t> </a:t>
+            </a:r>
+            <a:r>
+              <a:rPr lang="pt-PT" baseline="0" dirty="0" err="1" smtClean="0"/>
+              <a:t>with</a:t>
+            </a:r>
+            <a:r>
+              <a:rPr lang="pt-PT" baseline="0" dirty="0" smtClean="0"/>
+              <a:t> </a:t>
+            </a:r>
+            <a:r>
+              <a:rPr lang="pt-PT" baseline="0" dirty="0" err="1" smtClean="0"/>
+              <a:t>environment</a:t>
+            </a:r>
+            <a:endParaRPr lang="pt-PT" dirty="0" smtClean="0"/>
+          </a:p>
+          <a:p>
+            <a:r>
+              <a:rPr lang="pt-PT" dirty="0" err="1" smtClean="0"/>
+              <a:t>Economic</a:t>
+            </a:r>
+            <a:r>
+              <a:rPr lang="pt-PT" baseline="0" dirty="0" smtClean="0"/>
+              <a:t> </a:t>
+            </a:r>
+            <a:r>
+              <a:rPr lang="pt-PT" baseline="0" dirty="0" err="1" smtClean="0"/>
+              <a:t>impact</a:t>
+            </a:r>
+            <a:endParaRPr lang="pt-PT" baseline="0" dirty="0" smtClean="0"/>
+          </a:p>
+          <a:p>
+            <a:r>
+              <a:rPr lang="pt-PT" baseline="0" dirty="0" err="1" smtClean="0"/>
+              <a:t>Environmental</a:t>
+            </a:r>
+            <a:r>
+              <a:rPr lang="pt-PT" baseline="0" dirty="0" smtClean="0"/>
+              <a:t> </a:t>
+            </a:r>
+            <a:r>
+              <a:rPr lang="pt-PT" baseline="0" dirty="0" err="1" smtClean="0"/>
+              <a:t>impact</a:t>
+            </a:r>
+            <a:endParaRPr lang="pt-PT" dirty="0"/>
+          </a:p>
+        </p:txBody>
+      </p:sp>
+      <p:sp>
+        <p:nvSpPr>
+          <p:cNvPr id="4" name="Marcador de Posição do Número do Diapositivo 3"/>
+          <p:cNvSpPr>
+            <a:spLocks noGrp="1"/>
+          </p:cNvSpPr>
+          <p:nvPr>
+            <p:ph type="sldNum" sz="quarter" idx="10"/>
+          </p:nvPr>
+        </p:nvSpPr>
+        <p:spPr/>
+        <p:txBody>
+          <a:bodyPr/>
+          <a:lstStyle/>
+          <a:p>
+            <a:fld id="{3AC54132-D928-D54C-ABBE-ACE1209FEA7D}" type="slidenum">
+              <a:rPr lang="pt-PT" smtClean="0"/>
+              <a:t>24</a:t>
+            </a:fld>
+            <a:endParaRPr lang="pt-PT"/>
+          </a:p>
+        </p:txBody>
+      </p:sp>
+    </p:spTree>
+    <p:extLst>
+      <p:ext uri="{BB962C8B-B14F-4D97-AF65-F5344CB8AC3E}">
+        <p14:creationId xmlns:p14="http://schemas.microsoft.com/office/powerpoint/2010/main" val="994552435"/>
+      </p:ext>
+    </p:extLst>
+  </p:cSld>
+  <p:clrMapOvr>
+    <a:masterClrMapping/>
+  </p:clrMapOvr>
+</p:notes>
+</file>
+
+<file path=ppt/notesSlides/notesSlide24.xml><?xml version="1.0" encoding="utf-8"?>
+<p:notes xmlns:a="http://schemas.openxmlformats.org/drawingml/2006/main" xmlns:r="http://schemas.openxmlformats.org/officeDocument/2006/relationships" xmlns:p="http://schemas.openxmlformats.org/presentationml/2006/main">
+  <p:cSld>
+    <p:spTree>
+      <p:nvGrpSpPr>
+        <p:cNvPr id="1" name=""/>
+        <p:cNvGrpSpPr/>
+        <p:nvPr/>
+      </p:nvGrpSpPr>
+      <p:grpSpPr>
+        <a:xfrm>
+          <a:off x="0" y="0"/>
+          <a:ext cx="0" cy="0"/>
+          <a:chOff x="0" y="0"/>
+          <a:chExt cx="0" cy="0"/>
+        </a:xfrm>
+      </p:grpSpPr>
+      <p:sp>
+        <p:nvSpPr>
+          <p:cNvPr id="2" name="Marcador de Posição da Imagem do Diapositivo 1"/>
+          <p:cNvSpPr>
+            <a:spLocks noGrp="1" noRot="1" noChangeAspect="1"/>
+          </p:cNvSpPr>
+          <p:nvPr>
+            <p:ph type="sldImg"/>
+          </p:nvPr>
+        </p:nvSpPr>
+        <p:spPr/>
+      </p:sp>
+      <p:sp>
+        <p:nvSpPr>
+          <p:cNvPr id="3" name="Marcador de Posição de Notas 2"/>
+          <p:cNvSpPr>
+            <a:spLocks noGrp="1"/>
+          </p:cNvSpPr>
+          <p:nvPr>
+            <p:ph type="body" idx="1"/>
+          </p:nvPr>
+        </p:nvSpPr>
+        <p:spPr/>
+        <p:txBody>
+          <a:bodyPr/>
+          <a:lstStyle/>
+          <a:p>
+            <a:r>
+              <a:rPr lang="pt-PT" dirty="0" err="1" smtClean="0"/>
+              <a:t>Health</a:t>
+            </a:r>
+            <a:r>
+              <a:rPr lang="pt-PT" dirty="0" smtClean="0"/>
+              <a:t> </a:t>
+            </a:r>
+            <a:r>
+              <a:rPr lang="pt-PT" dirty="0" err="1" smtClean="0"/>
+              <a:t>Problems</a:t>
+            </a:r>
+            <a:r>
+              <a:rPr lang="pt-PT" dirty="0" smtClean="0"/>
+              <a:t> (stress, </a:t>
+            </a:r>
+            <a:r>
+              <a:rPr lang="pt-PT" dirty="0" err="1" smtClean="0"/>
+              <a:t>pollution</a:t>
+            </a:r>
+            <a:r>
+              <a:rPr lang="pt-PT" dirty="0" smtClean="0"/>
+              <a:t>,</a:t>
+            </a:r>
+            <a:r>
+              <a:rPr lang="pt-PT" baseline="0" dirty="0" smtClean="0"/>
+              <a:t> etc.) -&gt; </a:t>
+            </a:r>
+            <a:r>
+              <a:rPr lang="pt-PT" baseline="0" dirty="0" err="1" smtClean="0"/>
+              <a:t>related</a:t>
+            </a:r>
+            <a:r>
+              <a:rPr lang="pt-PT" baseline="0" dirty="0" smtClean="0"/>
+              <a:t> </a:t>
+            </a:r>
+            <a:r>
+              <a:rPr lang="pt-PT" baseline="0" dirty="0" err="1" smtClean="0"/>
+              <a:t>with</a:t>
+            </a:r>
+            <a:r>
+              <a:rPr lang="pt-PT" baseline="0" dirty="0" smtClean="0"/>
+              <a:t> </a:t>
+            </a:r>
+            <a:r>
+              <a:rPr lang="pt-PT" baseline="0" dirty="0" err="1" smtClean="0"/>
+              <a:t>environment</a:t>
+            </a:r>
+            <a:endParaRPr lang="pt-PT" dirty="0" smtClean="0"/>
+          </a:p>
+          <a:p>
+            <a:r>
+              <a:rPr lang="pt-PT" dirty="0" err="1" smtClean="0"/>
+              <a:t>Economic</a:t>
+            </a:r>
+            <a:r>
+              <a:rPr lang="pt-PT" baseline="0" dirty="0" smtClean="0"/>
+              <a:t> </a:t>
+            </a:r>
+            <a:r>
+              <a:rPr lang="pt-PT" baseline="0" dirty="0" err="1" smtClean="0"/>
+              <a:t>impact</a:t>
+            </a:r>
+            <a:endParaRPr lang="pt-PT" baseline="0" dirty="0" smtClean="0"/>
+          </a:p>
+          <a:p>
+            <a:r>
+              <a:rPr lang="pt-PT" baseline="0" dirty="0" err="1" smtClean="0"/>
+              <a:t>Environmental</a:t>
+            </a:r>
+            <a:r>
+              <a:rPr lang="pt-PT" baseline="0" dirty="0" smtClean="0"/>
+              <a:t> </a:t>
+            </a:r>
+            <a:r>
+              <a:rPr lang="pt-PT" baseline="0" dirty="0" err="1" smtClean="0"/>
+              <a:t>impact</a:t>
+            </a:r>
+            <a:endParaRPr lang="pt-PT" dirty="0"/>
+          </a:p>
+        </p:txBody>
+      </p:sp>
+      <p:sp>
+        <p:nvSpPr>
+          <p:cNvPr id="4" name="Marcador de Posição do Número do Diapositivo 3"/>
+          <p:cNvSpPr>
+            <a:spLocks noGrp="1"/>
+          </p:cNvSpPr>
+          <p:nvPr>
+            <p:ph type="sldNum" sz="quarter" idx="10"/>
+          </p:nvPr>
+        </p:nvSpPr>
+        <p:spPr/>
+        <p:txBody>
+          <a:bodyPr/>
+          <a:lstStyle/>
+          <a:p>
+            <a:fld id="{3AC54132-D928-D54C-ABBE-ACE1209FEA7D}" type="slidenum">
+              <a:rPr lang="pt-PT" smtClean="0"/>
+              <a:t>25</a:t>
+            </a:fld>
+            <a:endParaRPr lang="pt-PT"/>
+          </a:p>
+        </p:txBody>
+      </p:sp>
+    </p:spTree>
+    <p:extLst>
+      <p:ext uri="{BB962C8B-B14F-4D97-AF65-F5344CB8AC3E}">
+        <p14:creationId xmlns:p14="http://schemas.microsoft.com/office/powerpoint/2010/main" val="818119612"/>
+      </p:ext>
+    </p:extLst>
+  </p:cSld>
+  <p:clrMapOvr>
+    <a:masterClrMapping/>
+  </p:clrMapOvr>
+</p:notes>
+</file>
+
+<file path=ppt/notesSlides/notesSlide25.xml><?xml version="1.0" encoding="utf-8"?>
+<p:notes xmlns:a="http://schemas.openxmlformats.org/drawingml/2006/main" xmlns:r="http://schemas.openxmlformats.org/officeDocument/2006/relationships" xmlns:p="http://schemas.openxmlformats.org/presentationml/2006/main">
+  <p:cSld>
+    <p:spTree>
+      <p:nvGrpSpPr>
+        <p:cNvPr id="1" name=""/>
+        <p:cNvGrpSpPr/>
+        <p:nvPr/>
+      </p:nvGrpSpPr>
+      <p:grpSpPr>
+        <a:xfrm>
+          <a:off x="0" y="0"/>
+          <a:ext cx="0" cy="0"/>
+          <a:chOff x="0" y="0"/>
+          <a:chExt cx="0" cy="0"/>
+        </a:xfrm>
+      </p:grpSpPr>
+      <p:sp>
+        <p:nvSpPr>
+          <p:cNvPr id="2" name="Marcador de Posição da Imagem do Diapositivo 1"/>
+          <p:cNvSpPr>
+            <a:spLocks noGrp="1" noRot="1" noChangeAspect="1"/>
+          </p:cNvSpPr>
+          <p:nvPr>
+            <p:ph type="sldImg"/>
+          </p:nvPr>
+        </p:nvSpPr>
+        <p:spPr/>
+      </p:sp>
+      <p:sp>
+        <p:nvSpPr>
+          <p:cNvPr id="3" name="Marcador de Posição de Notas 2"/>
+          <p:cNvSpPr>
+            <a:spLocks noGrp="1"/>
+          </p:cNvSpPr>
+          <p:nvPr>
+            <p:ph type="body" idx="1"/>
+          </p:nvPr>
+        </p:nvSpPr>
+        <p:spPr/>
+        <p:txBody>
+          <a:bodyPr/>
+          <a:lstStyle/>
+          <a:p>
+            <a:r>
+              <a:rPr lang="pt-PT" dirty="0" err="1" smtClean="0"/>
+              <a:t>Health</a:t>
+            </a:r>
+            <a:r>
+              <a:rPr lang="pt-PT" dirty="0" smtClean="0"/>
+              <a:t> </a:t>
+            </a:r>
+            <a:r>
+              <a:rPr lang="pt-PT" dirty="0" err="1" smtClean="0"/>
+              <a:t>Problems</a:t>
+            </a:r>
+            <a:r>
+              <a:rPr lang="pt-PT" dirty="0" smtClean="0"/>
+              <a:t> (stress, </a:t>
+            </a:r>
+            <a:r>
+              <a:rPr lang="pt-PT" dirty="0" err="1" smtClean="0"/>
+              <a:t>pollution</a:t>
+            </a:r>
+            <a:r>
+              <a:rPr lang="pt-PT" dirty="0" smtClean="0"/>
+              <a:t>,</a:t>
+            </a:r>
+            <a:r>
+              <a:rPr lang="pt-PT" baseline="0" dirty="0" smtClean="0"/>
+              <a:t> etc.) -&gt; </a:t>
+            </a:r>
+            <a:r>
+              <a:rPr lang="pt-PT" baseline="0" dirty="0" err="1" smtClean="0"/>
+              <a:t>related</a:t>
+            </a:r>
+            <a:r>
+              <a:rPr lang="pt-PT" baseline="0" dirty="0" smtClean="0"/>
+              <a:t> </a:t>
+            </a:r>
+            <a:r>
+              <a:rPr lang="pt-PT" baseline="0" dirty="0" err="1" smtClean="0"/>
+              <a:t>with</a:t>
+            </a:r>
+            <a:r>
+              <a:rPr lang="pt-PT" baseline="0" dirty="0" smtClean="0"/>
+              <a:t> </a:t>
+            </a:r>
+            <a:r>
+              <a:rPr lang="pt-PT" baseline="0" dirty="0" err="1" smtClean="0"/>
+              <a:t>environment</a:t>
+            </a:r>
+            <a:endParaRPr lang="pt-PT" dirty="0" smtClean="0"/>
+          </a:p>
+          <a:p>
+            <a:r>
+              <a:rPr lang="pt-PT" dirty="0" err="1" smtClean="0"/>
+              <a:t>Economic</a:t>
+            </a:r>
+            <a:r>
+              <a:rPr lang="pt-PT" baseline="0" dirty="0" smtClean="0"/>
+              <a:t> </a:t>
+            </a:r>
+            <a:r>
+              <a:rPr lang="pt-PT" baseline="0" dirty="0" err="1" smtClean="0"/>
+              <a:t>impact</a:t>
+            </a:r>
+            <a:endParaRPr lang="pt-PT" baseline="0" dirty="0" smtClean="0"/>
+          </a:p>
+          <a:p>
+            <a:r>
+              <a:rPr lang="pt-PT" baseline="0" dirty="0" err="1" smtClean="0"/>
+              <a:t>Environmental</a:t>
+            </a:r>
+            <a:r>
+              <a:rPr lang="pt-PT" baseline="0" dirty="0" smtClean="0"/>
+              <a:t> </a:t>
+            </a:r>
+            <a:r>
+              <a:rPr lang="pt-PT" baseline="0" dirty="0" err="1" smtClean="0"/>
+              <a:t>impact</a:t>
+            </a:r>
+            <a:endParaRPr lang="pt-PT" dirty="0"/>
+          </a:p>
+        </p:txBody>
+      </p:sp>
+      <p:sp>
+        <p:nvSpPr>
+          <p:cNvPr id="4" name="Marcador de Posição do Número do Diapositivo 3"/>
+          <p:cNvSpPr>
+            <a:spLocks noGrp="1"/>
+          </p:cNvSpPr>
+          <p:nvPr>
+            <p:ph type="sldNum" sz="quarter" idx="10"/>
+          </p:nvPr>
+        </p:nvSpPr>
+        <p:spPr/>
+        <p:txBody>
+          <a:bodyPr/>
+          <a:lstStyle/>
+          <a:p>
+            <a:fld id="{3AC54132-D928-D54C-ABBE-ACE1209FEA7D}" type="slidenum">
+              <a:rPr lang="pt-PT" smtClean="0"/>
+              <a:t>26</a:t>
+            </a:fld>
+            <a:endParaRPr lang="pt-PT"/>
+          </a:p>
+        </p:txBody>
+      </p:sp>
+    </p:spTree>
+    <p:extLst>
+      <p:ext uri="{BB962C8B-B14F-4D97-AF65-F5344CB8AC3E}">
+        <p14:creationId xmlns:p14="http://schemas.microsoft.com/office/powerpoint/2010/main" val="651060035"/>
+      </p:ext>
+    </p:extLst>
+  </p:cSld>
+  <p:clrMapOvr>
+    <a:masterClrMapping/>
+  </p:clrMapOvr>
+</p:notes>
+</file>
+
+<file path=ppt/notesSlides/notesSlide26.xml><?xml version="1.0" encoding="utf-8"?>
+<p:notes xmlns:a="http://schemas.openxmlformats.org/drawingml/2006/main" xmlns:r="http://schemas.openxmlformats.org/officeDocument/2006/relationships" xmlns:p="http://schemas.openxmlformats.org/presentationml/2006/main">
+  <p:cSld>
+    <p:spTree>
+      <p:nvGrpSpPr>
+        <p:cNvPr id="1" name=""/>
+        <p:cNvGrpSpPr/>
+        <p:nvPr/>
+      </p:nvGrpSpPr>
+      <p:grpSpPr>
+        <a:xfrm>
+          <a:off x="0" y="0"/>
+          <a:ext cx="0" cy="0"/>
+          <a:chOff x="0" y="0"/>
+          <a:chExt cx="0" cy="0"/>
+        </a:xfrm>
+      </p:grpSpPr>
+      <p:sp>
+        <p:nvSpPr>
+          <p:cNvPr id="2" name="Marcador de Posição da Imagem do Diapositivo 1"/>
+          <p:cNvSpPr>
+            <a:spLocks noGrp="1" noRot="1" noChangeAspect="1"/>
+          </p:cNvSpPr>
+          <p:nvPr>
+            <p:ph type="sldImg"/>
+          </p:nvPr>
+        </p:nvSpPr>
+        <p:spPr/>
+      </p:sp>
+      <p:sp>
+        <p:nvSpPr>
+          <p:cNvPr id="3" name="Marcador de Posição de Notas 2"/>
+          <p:cNvSpPr>
+            <a:spLocks noGrp="1"/>
+          </p:cNvSpPr>
+          <p:nvPr>
+            <p:ph type="body" idx="1"/>
+          </p:nvPr>
+        </p:nvSpPr>
+        <p:spPr/>
+        <p:txBody>
+          <a:bodyPr/>
+          <a:lstStyle/>
+          <a:p>
+            <a:r>
+              <a:rPr lang="pt-PT" dirty="0" err="1" smtClean="0"/>
+              <a:t>Health</a:t>
+            </a:r>
+            <a:r>
+              <a:rPr lang="pt-PT" dirty="0" smtClean="0"/>
+              <a:t> </a:t>
+            </a:r>
+            <a:r>
+              <a:rPr lang="pt-PT" dirty="0" err="1" smtClean="0"/>
+              <a:t>Problems</a:t>
+            </a:r>
+            <a:r>
+              <a:rPr lang="pt-PT" dirty="0" smtClean="0"/>
+              <a:t> (stress, </a:t>
+            </a:r>
+            <a:r>
+              <a:rPr lang="pt-PT" dirty="0" err="1" smtClean="0"/>
+              <a:t>pollution</a:t>
+            </a:r>
+            <a:r>
+              <a:rPr lang="pt-PT" dirty="0" smtClean="0"/>
+              <a:t>,</a:t>
+            </a:r>
+            <a:r>
+              <a:rPr lang="pt-PT" baseline="0" dirty="0" smtClean="0"/>
+              <a:t> etc.) -&gt; </a:t>
+            </a:r>
+            <a:r>
+              <a:rPr lang="pt-PT" baseline="0" dirty="0" err="1" smtClean="0"/>
+              <a:t>related</a:t>
+            </a:r>
+            <a:r>
+              <a:rPr lang="pt-PT" baseline="0" dirty="0" smtClean="0"/>
+              <a:t> </a:t>
+            </a:r>
+            <a:r>
+              <a:rPr lang="pt-PT" baseline="0" dirty="0" err="1" smtClean="0"/>
+              <a:t>with</a:t>
+            </a:r>
+            <a:r>
+              <a:rPr lang="pt-PT" baseline="0" dirty="0" smtClean="0"/>
+              <a:t> </a:t>
+            </a:r>
+            <a:r>
+              <a:rPr lang="pt-PT" baseline="0" dirty="0" err="1" smtClean="0"/>
+              <a:t>environment</a:t>
+            </a:r>
+            <a:endParaRPr lang="pt-PT" dirty="0" smtClean="0"/>
+          </a:p>
+          <a:p>
+            <a:r>
+              <a:rPr lang="pt-PT" dirty="0" err="1" smtClean="0"/>
+              <a:t>Economic</a:t>
+            </a:r>
+            <a:r>
+              <a:rPr lang="pt-PT" baseline="0" dirty="0" smtClean="0"/>
+              <a:t> </a:t>
+            </a:r>
+            <a:r>
+              <a:rPr lang="pt-PT" baseline="0" dirty="0" err="1" smtClean="0"/>
+              <a:t>impact</a:t>
+            </a:r>
+            <a:endParaRPr lang="pt-PT" baseline="0" dirty="0" smtClean="0"/>
+          </a:p>
+          <a:p>
+            <a:r>
+              <a:rPr lang="pt-PT" baseline="0" dirty="0" err="1" smtClean="0"/>
+              <a:t>Environmental</a:t>
+            </a:r>
+            <a:r>
+              <a:rPr lang="pt-PT" baseline="0" dirty="0" smtClean="0"/>
+              <a:t> </a:t>
+            </a:r>
+            <a:r>
+              <a:rPr lang="pt-PT" baseline="0" dirty="0" err="1" smtClean="0"/>
+              <a:t>impact</a:t>
+            </a:r>
+            <a:endParaRPr lang="pt-PT" dirty="0"/>
+          </a:p>
+        </p:txBody>
+      </p:sp>
+      <p:sp>
+        <p:nvSpPr>
+          <p:cNvPr id="4" name="Marcador de Posição do Número do Diapositivo 3"/>
+          <p:cNvSpPr>
+            <a:spLocks noGrp="1"/>
+          </p:cNvSpPr>
+          <p:nvPr>
+            <p:ph type="sldNum" sz="quarter" idx="10"/>
+          </p:nvPr>
+        </p:nvSpPr>
+        <p:spPr/>
+        <p:txBody>
+          <a:bodyPr/>
+          <a:lstStyle/>
+          <a:p>
+            <a:fld id="{3AC54132-D928-D54C-ABBE-ACE1209FEA7D}" type="slidenum">
+              <a:rPr lang="pt-PT" smtClean="0"/>
+              <a:t>27</a:t>
             </a:fld>
             <a:endParaRPr lang="pt-PT"/>
           </a:p>
@@ -8373,16 +9188,6 @@
 <file path=ppt/slides/slide16.xml><?xml version="1.0" encoding="utf-8"?>
 <p:sld xmlns:a="http://schemas.openxmlformats.org/drawingml/2006/main" xmlns:r="http://schemas.openxmlformats.org/officeDocument/2006/relationships" xmlns:p="http://schemas.openxmlformats.org/presentationml/2006/main">
   <p:cSld>
-    <p:bg>
-      <p:bgPr>
-        <a:solidFill>
-          <a:schemeClr val="bg1">
-            <a:lumMod val="95000"/>
-          </a:schemeClr>
-        </a:solidFill>
-        <a:effectLst/>
-      </p:bgPr>
-    </p:bg>
     <p:spTree>
       <p:nvGrpSpPr>
         <p:cNvPr id="1" name=""/>
@@ -8399,14 +9204,44 @@
       </p:grpSpPr>
       <p:sp>
         <p:nvSpPr>
+          <p:cNvPr id="2" name="CaixaDeTexto 1"/>
+          <p:cNvSpPr txBox="1"/>
+          <p:nvPr/>
+        </p:nvSpPr>
+        <p:spPr>
+          <a:xfrm>
+            <a:off x="0" y="0"/>
+            <a:ext cx="12192000" cy="1579418"/>
+          </a:xfrm>
+          <a:prstGeom prst="rect">
+            <a:avLst/>
+          </a:prstGeom>
+          <a:solidFill>
+            <a:schemeClr val="bg1">
+              <a:lumMod val="95000"/>
+            </a:schemeClr>
+          </a:solidFill>
+        </p:spPr>
+        <p:txBody>
+          <a:bodyPr wrap="square" rtlCol="0">
+            <a:spAutoFit/>
+          </a:bodyPr>
+          <a:lstStyle/>
+          <a:p>
+            <a:endParaRPr lang="pt-PT" dirty="0"/>
+          </a:p>
+        </p:txBody>
+      </p:sp>
+      <p:sp>
+        <p:nvSpPr>
           <p:cNvPr id="3" name="CaixaDeTexto 2"/>
           <p:cNvSpPr txBox="1"/>
           <p:nvPr/>
         </p:nvSpPr>
         <p:spPr>
           <a:xfrm>
-            <a:off x="1099973" y="2434106"/>
-            <a:ext cx="1746258" cy="1446550"/>
+            <a:off x="623455" y="346365"/>
+            <a:ext cx="1668984" cy="923330"/>
           </a:xfrm>
           <a:prstGeom prst="rect">
             <a:avLst/>
@@ -8420,14 +9255,14 @@
           <a:lstStyle/>
           <a:p>
             <a:r>
-              <a:rPr lang="pt-PT" sz="8800" dirty="0" smtClean="0">
+              <a:rPr lang="pt-PT" sz="5400" dirty="0" smtClean="0">
                 <a:solidFill>
                   <a:srgbClr val="B9122B"/>
                 </a:solidFill>
               </a:rPr>
-              <a:t>#5</a:t>
-            </a:r>
-            <a:endParaRPr lang="pt-PT" sz="8800" dirty="0">
+              <a:t>#DM</a:t>
+            </a:r>
+            <a:endParaRPr lang="pt-PT" sz="5400" dirty="0">
               <a:solidFill>
                 <a:srgbClr val="B9122B"/>
               </a:solidFill>
@@ -8437,37 +9272,14 @@
       </p:sp>
       <p:sp>
         <p:nvSpPr>
-          <p:cNvPr id="4" name="Marcador de Posição do Número do Diapositivo 3"/>
-          <p:cNvSpPr>
-            <a:spLocks noGrp="1"/>
-          </p:cNvSpPr>
-          <p:nvPr>
-            <p:ph type="sldNum" sz="quarter" idx="12"/>
-          </p:nvPr>
-        </p:nvSpPr>
-        <p:spPr/>
-        <p:txBody>
-          <a:bodyPr/>
-          <a:lstStyle/>
-          <a:p>
-            <a:fld id="{5683189C-B5E2-F345-AC06-1CEB972D3557}" type="slidenum">
-              <a:rPr lang="pt-PT" smtClean="0"/>
-              <a:t>16</a:t>
-            </a:fld>
-            <a:endParaRPr lang="pt-PT"/>
-          </a:p>
-        </p:txBody>
-      </p:sp>
-      <p:sp>
-        <p:nvSpPr>
-          <p:cNvPr id="13" name="CaixaDeTexto 12"/>
+          <p:cNvPr id="5" name="CaixaDeTexto 4"/>
           <p:cNvSpPr txBox="1"/>
           <p:nvPr/>
         </p:nvSpPr>
         <p:spPr>
           <a:xfrm>
-            <a:off x="2846231" y="2649550"/>
-            <a:ext cx="7457554" cy="1015663"/>
+            <a:off x="2137893" y="423309"/>
+            <a:ext cx="7862793" cy="769441"/>
           </a:xfrm>
           <a:prstGeom prst="rect">
             <a:avLst/>
@@ -8481,30 +9293,54 @@
           <a:lstStyle/>
           <a:p>
             <a:r>
-              <a:rPr lang="pt-PT" sz="6000" dirty="0" err="1" smtClean="0">
+              <a:rPr lang="pt-PT" sz="4400" dirty="0" err="1" smtClean="0">
                 <a:solidFill>
                   <a:srgbClr val="00568A"/>
                 </a:solidFill>
               </a:rPr>
-              <a:t>Predictive</a:t>
-            </a:r>
-            <a:r>
-              <a:rPr lang="pt-PT" sz="6000" dirty="0" smtClean="0">
+              <a:t>Client</a:t>
+            </a:r>
+            <a:r>
+              <a:rPr lang="pt-PT" sz="4400" dirty="0" smtClean="0">
                 <a:solidFill>
                   <a:srgbClr val="00568A"/>
                 </a:solidFill>
               </a:rPr>
-              <a:t> data </a:t>
-            </a:r>
-            <a:r>
-              <a:rPr lang="pt-PT" sz="6000" dirty="0" err="1" smtClean="0">
+              <a:t> vs. </a:t>
+            </a:r>
+            <a:r>
+              <a:rPr lang="pt-PT" sz="4400" dirty="0" err="1" smtClean="0">
                 <a:solidFill>
                   <a:srgbClr val="00568A"/>
                 </a:solidFill>
               </a:rPr>
-              <a:t>analysis</a:t>
-            </a:r>
-            <a:endParaRPr lang="pt-PT" sz="6000" dirty="0">
+              <a:t>Card</a:t>
+            </a:r>
+            <a:r>
+              <a:rPr lang="pt-PT" sz="4400" dirty="0" smtClean="0">
+                <a:solidFill>
+                  <a:srgbClr val="00568A"/>
+                </a:solidFill>
+              </a:rPr>
+              <a:t> Clusters (K-</a:t>
+            </a:r>
+            <a:r>
+              <a:rPr lang="pt-PT" sz="4400" dirty="0" err="1" smtClean="0">
+                <a:solidFill>
+                  <a:srgbClr val="00568A"/>
+                </a:solidFill>
+              </a:rPr>
+              <a:t>Means</a:t>
+            </a:r>
+            <a:r>
+              <a:rPr lang="pt-PT" sz="4400" dirty="0" smtClean="0">
+                <a:solidFill>
+                  <a:srgbClr val="00568A"/>
+                </a:solidFill>
+              </a:rPr>
+              <a:t>)</a:t>
+            </a:r>
+            <a:endParaRPr lang="pt-PT" sz="4400" dirty="0">
               <a:solidFill>
                 <a:srgbClr val="00568A"/>
               </a:solidFill>
@@ -8512,10 +9348,389 @@
           </a:p>
         </p:txBody>
       </p:sp>
+      <p:sp>
+        <p:nvSpPr>
+          <p:cNvPr id="4" name="Marcador de Posição do Número do Diapositivo 3"/>
+          <p:cNvSpPr>
+            <a:spLocks noGrp="1"/>
+          </p:cNvSpPr>
+          <p:nvPr>
+            <p:ph type="sldNum" sz="quarter" idx="12"/>
+          </p:nvPr>
+        </p:nvSpPr>
+        <p:spPr/>
+        <p:txBody>
+          <a:bodyPr/>
+          <a:lstStyle/>
+          <a:p>
+            <a:fld id="{5683189C-B5E2-F345-AC06-1CEB972D3557}" type="slidenum">
+              <a:rPr lang="pt-PT" smtClean="0"/>
+              <a:t>16</a:t>
+            </a:fld>
+            <a:endParaRPr lang="pt-PT"/>
+          </a:p>
+        </p:txBody>
+      </p:sp>
+      <p:pic>
+        <p:nvPicPr>
+          <p:cNvPr id="7" name="Imagem 6"/>
+          <p:cNvPicPr>
+            <a:picLocks noChangeAspect="1"/>
+          </p:cNvPicPr>
+          <p:nvPr/>
+        </p:nvPicPr>
+        <p:blipFill rotWithShape="1">
+          <a:blip r:embed="rId3">
+            <a:extLst>
+              <a:ext uri="{28A0092B-C50C-407E-A947-70E740481C1C}">
+                <a14:useLocalDpi xmlns:a14="http://schemas.microsoft.com/office/drawing/2010/main" val="0"/>
+              </a:ext>
+            </a:extLst>
+          </a:blip>
+          <a:srcRect l="2602" t="6562" b="5014"/>
+          <a:stretch/>
+        </p:blipFill>
+        <p:spPr>
+          <a:xfrm>
+            <a:off x="623455" y="1579418"/>
+            <a:ext cx="7337478" cy="5147493"/>
+          </a:xfrm>
+          <a:prstGeom prst="rect">
+            <a:avLst/>
+          </a:prstGeom>
+        </p:spPr>
+      </p:pic>
+      <p:graphicFrame>
+        <p:nvGraphicFramePr>
+          <p:cNvPr id="8" name="Tabela 7"/>
+          <p:cNvGraphicFramePr>
+            <a:graphicFrameLocks noGrp="1"/>
+          </p:cNvGraphicFramePr>
+          <p:nvPr>
+            <p:extLst>
+              <p:ext uri="{D42A27DB-BD31-4B8C-83A1-F6EECF244321}">
+                <p14:modId xmlns:p14="http://schemas.microsoft.com/office/powerpoint/2010/main" val="723783303"/>
+              </p:ext>
+            </p:extLst>
+          </p:nvPr>
+        </p:nvGraphicFramePr>
+        <p:xfrm>
+          <a:off x="8312650" y="2855364"/>
+          <a:ext cx="2985452" cy="2225040"/>
+        </p:xfrm>
+        <a:graphic>
+          <a:graphicData uri="http://schemas.openxmlformats.org/drawingml/2006/table">
+            <a:tbl>
+              <a:tblPr firstRow="1" bandRow="1">
+                <a:tableStyleId>{5C22544A-7EE6-4342-B048-85BDC9FD1C3A}</a:tableStyleId>
+              </a:tblPr>
+              <a:tblGrid>
+                <a:gridCol w="1044892"/>
+                <a:gridCol w="859155"/>
+                <a:gridCol w="1081405"/>
+              </a:tblGrid>
+              <a:tr h="370840">
+                <a:tc>
+                  <a:txBody>
+                    <a:bodyPr/>
+                    <a:lstStyle/>
+                    <a:p>
+                      <a:pPr algn="ctr"/>
+                      <a:r>
+                        <a:rPr lang="pt-PT" sz="1400" dirty="0" smtClean="0"/>
+                        <a:t>age</a:t>
+                      </a:r>
+                      <a:endParaRPr lang="pt-PT" sz="1400" dirty="0"/>
+                    </a:p>
+                  </a:txBody>
+                  <a:tcPr>
+                    <a:solidFill>
+                      <a:srgbClr val="00568A"/>
+                    </a:solidFill>
+                  </a:tcPr>
+                </a:tc>
+                <a:tc>
+                  <a:txBody>
+                    <a:bodyPr/>
+                    <a:lstStyle/>
+                    <a:p>
+                      <a:pPr algn="ctr"/>
+                      <a:r>
+                        <a:rPr lang="pt-PT" sz="1400" dirty="0" err="1" smtClean="0"/>
+                        <a:t>gender</a:t>
+                      </a:r>
+                      <a:endParaRPr lang="pt-PT" sz="1400" dirty="0"/>
+                    </a:p>
+                  </a:txBody>
+                  <a:tcPr>
+                    <a:solidFill>
+                      <a:srgbClr val="00568A"/>
+                    </a:solidFill>
+                  </a:tcPr>
+                </a:tc>
+                <a:tc>
+                  <a:txBody>
+                    <a:bodyPr/>
+                    <a:lstStyle/>
+                    <a:p>
+                      <a:pPr algn="ctr"/>
+                      <a:r>
+                        <a:rPr lang="pt-PT" sz="1400" dirty="0" err="1" smtClean="0"/>
+                        <a:t>card_type</a:t>
+                      </a:r>
+                      <a:endParaRPr lang="pt-PT" sz="1400" dirty="0"/>
+                    </a:p>
+                  </a:txBody>
+                  <a:tcPr>
+                    <a:solidFill>
+                      <a:srgbClr val="00568A"/>
+                    </a:solidFill>
+                  </a:tcPr>
+                </a:tc>
+              </a:tr>
+              <a:tr h="370840">
+                <a:tc>
+                  <a:txBody>
+                    <a:bodyPr/>
+                    <a:lstStyle/>
+                    <a:p>
+                      <a:pPr algn="ctr"/>
+                      <a:r>
+                        <a:rPr lang="pt-PT" sz="1400" dirty="0" smtClean="0"/>
+                        <a:t>-1.2302465</a:t>
+                      </a:r>
+                      <a:endParaRPr lang="pt-PT" sz="1400" dirty="0"/>
+                    </a:p>
+                  </a:txBody>
+                  <a:tcPr/>
+                </a:tc>
+                <a:tc>
+                  <a:txBody>
+                    <a:bodyPr/>
+                    <a:lstStyle/>
+                    <a:p>
+                      <a:pPr algn="ctr"/>
+                      <a:r>
+                        <a:rPr lang="pt-PT" sz="1400" dirty="0" smtClean="0"/>
+                        <a:t>1</a:t>
+                      </a:r>
+                      <a:endParaRPr lang="pt-PT" sz="1400" dirty="0"/>
+                    </a:p>
+                  </a:txBody>
+                  <a:tcPr/>
+                </a:tc>
+                <a:tc>
+                  <a:txBody>
+                    <a:bodyPr/>
+                    <a:lstStyle/>
+                    <a:p>
+                      <a:pPr algn="ctr"/>
+                      <a:r>
+                        <a:rPr lang="pt-PT" sz="1400" dirty="0" smtClean="0"/>
+                        <a:t>2</a:t>
+                      </a:r>
+                      <a:endParaRPr lang="pt-PT" sz="1400" dirty="0"/>
+                    </a:p>
+                  </a:txBody>
+                  <a:tcPr/>
+                </a:tc>
+              </a:tr>
+              <a:tr h="370840">
+                <a:tc>
+                  <a:txBody>
+                    <a:bodyPr/>
+                    <a:lstStyle/>
+                    <a:p>
+                      <a:pPr algn="ctr"/>
+                      <a:r>
+                        <a:rPr lang="pt-PT" sz="1400" dirty="0" smtClean="0"/>
+                        <a:t>-0.3775839</a:t>
+                      </a:r>
+                      <a:endParaRPr lang="pt-PT" sz="1400" dirty="0"/>
+                    </a:p>
+                  </a:txBody>
+                  <a:tcPr/>
+                </a:tc>
+                <a:tc>
+                  <a:txBody>
+                    <a:bodyPr/>
+                    <a:lstStyle/>
+                    <a:p>
+                      <a:pPr algn="ctr"/>
+                      <a:r>
+                        <a:rPr lang="pt-PT" sz="1400" dirty="0" smtClean="0"/>
+                        <a:t>0.25</a:t>
+                      </a:r>
+                      <a:endParaRPr lang="pt-PT" sz="1400" dirty="0"/>
+                    </a:p>
+                  </a:txBody>
+                  <a:tcPr/>
+                </a:tc>
+                <a:tc>
+                  <a:txBody>
+                    <a:bodyPr/>
+                    <a:lstStyle/>
+                    <a:p>
+                      <a:pPr algn="ctr"/>
+                      <a:r>
+                        <a:rPr lang="pt-PT" sz="1400" dirty="0" smtClean="0"/>
+                        <a:t>0.1</a:t>
+                      </a:r>
+                      <a:endParaRPr lang="pt-PT" sz="1400" dirty="0"/>
+                    </a:p>
+                  </a:txBody>
+                  <a:tcPr/>
+                </a:tc>
+              </a:tr>
+              <a:tr h="370840">
+                <a:tc>
+                  <a:txBody>
+                    <a:bodyPr/>
+                    <a:lstStyle/>
+                    <a:p>
+                      <a:pPr algn="ctr"/>
+                      <a:r>
+                        <a:rPr lang="pt-PT" sz="1400" dirty="0" smtClean="0"/>
+                        <a:t>-1.2061650</a:t>
+                      </a:r>
+                      <a:endParaRPr lang="pt-PT" sz="1400" dirty="0"/>
+                    </a:p>
+                  </a:txBody>
+                  <a:tcPr/>
+                </a:tc>
+                <a:tc>
+                  <a:txBody>
+                    <a:bodyPr/>
+                    <a:lstStyle/>
+                    <a:p>
+                      <a:pPr algn="ctr"/>
+                      <a:r>
+                        <a:rPr lang="pt-PT" sz="1400" dirty="0" smtClean="0"/>
+                        <a:t>0</a:t>
+                      </a:r>
+                      <a:endParaRPr lang="pt-PT" sz="1400" dirty="0"/>
+                    </a:p>
+                  </a:txBody>
+                  <a:tcPr/>
+                </a:tc>
+                <a:tc>
+                  <a:txBody>
+                    <a:bodyPr/>
+                    <a:lstStyle/>
+                    <a:p>
+                      <a:pPr algn="ctr"/>
+                      <a:r>
+                        <a:rPr lang="pt-PT" sz="1400" dirty="0" smtClean="0"/>
+                        <a:t>2</a:t>
+                      </a:r>
+                      <a:endParaRPr lang="pt-PT" sz="1400" dirty="0"/>
+                    </a:p>
+                  </a:txBody>
+                  <a:tcPr/>
+                </a:tc>
+              </a:tr>
+              <a:tr h="370840">
+                <a:tc>
+                  <a:txBody>
+                    <a:bodyPr/>
+                    <a:lstStyle/>
+                    <a:p>
+                      <a:pPr algn="ctr"/>
+                      <a:r>
+                        <a:rPr lang="pt-PT" sz="1400" dirty="0" smtClean="0"/>
+                        <a:t>1.2849300</a:t>
+                      </a:r>
+                      <a:endParaRPr lang="pt-PT" sz="1400" dirty="0"/>
+                    </a:p>
+                  </a:txBody>
+                  <a:tcPr/>
+                </a:tc>
+                <a:tc>
+                  <a:txBody>
+                    <a:bodyPr/>
+                    <a:lstStyle/>
+                    <a:p>
+                      <a:pPr algn="ctr"/>
+                      <a:r>
+                        <a:rPr lang="pt-PT" sz="1400" dirty="0" smtClean="0"/>
+                        <a:t>0.05</a:t>
+                      </a:r>
+                      <a:endParaRPr lang="pt-PT" sz="1400" dirty="0"/>
+                    </a:p>
+                  </a:txBody>
+                  <a:tcPr/>
+                </a:tc>
+                <a:tc>
+                  <a:txBody>
+                    <a:bodyPr/>
+                    <a:lstStyle/>
+                    <a:p>
+                      <a:pPr algn="ctr"/>
+                      <a:r>
+                        <a:rPr lang="pt-PT" sz="1400" dirty="0" smtClean="0"/>
+                        <a:t>0.05</a:t>
+                      </a:r>
+                      <a:endParaRPr lang="pt-PT" sz="1400" dirty="0"/>
+                    </a:p>
+                  </a:txBody>
+                  <a:tcPr/>
+                </a:tc>
+              </a:tr>
+              <a:tr h="370840">
+                <a:tc>
+                  <a:txBody>
+                    <a:bodyPr/>
+                    <a:lstStyle/>
+                    <a:p>
+                      <a:pPr algn="ctr"/>
+                      <a:r>
+                        <a:rPr lang="pt-PT" sz="1400" dirty="0" smtClean="0"/>
+                        <a:t>0.5920177</a:t>
+                      </a:r>
+                      <a:endParaRPr lang="pt-PT" sz="1400" dirty="0"/>
+                    </a:p>
+                  </a:txBody>
+                  <a:tcPr/>
+                </a:tc>
+                <a:tc>
+                  <a:txBody>
+                    <a:bodyPr/>
+                    <a:lstStyle/>
+                    <a:p>
+                      <a:pPr algn="ctr"/>
+                      <a:r>
+                        <a:rPr lang="pt-PT" sz="1400" dirty="0" smtClean="0"/>
+                        <a:t>1</a:t>
+                      </a:r>
+                      <a:endParaRPr lang="pt-PT" sz="1400" dirty="0"/>
+                    </a:p>
+                  </a:txBody>
+                  <a:tcPr/>
+                </a:tc>
+                <a:tc>
+                  <a:txBody>
+                    <a:bodyPr/>
+                    <a:lstStyle/>
+                    <a:p>
+                      <a:pPr algn="ctr"/>
+                      <a:r>
+                        <a:rPr lang="pt-PT" sz="1400" dirty="0" smtClean="0"/>
+                        <a:t>0.02777778</a:t>
+                      </a:r>
+                      <a:endParaRPr lang="pt-PT" sz="1400" dirty="0"/>
+                    </a:p>
+                  </a:txBody>
+                  <a:tcPr/>
+                </a:tc>
+              </a:tr>
+            </a:tbl>
+          </a:graphicData>
+        </a:graphic>
+      </p:graphicFrame>
     </p:spTree>
     <p:extLst>
       <p:ext uri="{BB962C8B-B14F-4D97-AF65-F5344CB8AC3E}">
-        <p14:creationId xmlns:p14="http://schemas.microsoft.com/office/powerpoint/2010/main" val="375898863"/>
+        <p14:creationId xmlns:p14="http://schemas.microsoft.com/office/powerpoint/2010/main" val="1145822824"/>
       </p:ext>
     </p:extLst>
   </p:cSld>
@@ -8587,7 +9802,7 @@
                   <a:srgbClr val="B9122B"/>
                 </a:solidFill>
               </a:rPr>
-              <a:t>#6</a:t>
+              <a:t>#5</a:t>
             </a:r>
             <a:endParaRPr lang="pt-PT" sz="8800" dirty="0">
               <a:solidFill>
@@ -8629,7 +9844,7 @@
         <p:spPr>
           <a:xfrm>
             <a:off x="2846231" y="2649550"/>
-            <a:ext cx="9068508" cy="1015663"/>
+            <a:ext cx="7457554" cy="1015663"/>
           </a:xfrm>
           <a:prstGeom prst="rect">
             <a:avLst/>
@@ -8648,7 +9863,7 @@
                   <a:srgbClr val="00568A"/>
                 </a:solidFill>
               </a:rPr>
-              <a:t>Limitations</a:t>
+              <a:t>Predictive</a:t>
             </a:r>
             <a:r>
               <a:rPr lang="pt-PT" sz="6000" dirty="0" smtClean="0">
@@ -8656,7 +9871,7 @@
                   <a:srgbClr val="00568A"/>
                 </a:solidFill>
               </a:rPr>
-              <a:t> </a:t>
+              <a:t> data </a:t>
             </a:r>
             <a:r>
               <a:rPr lang="pt-PT" sz="6000" dirty="0" err="1" smtClean="0">
@@ -8664,23 +9879,7 @@
                   <a:srgbClr val="00568A"/>
                 </a:solidFill>
               </a:rPr>
-              <a:t>and</a:t>
-            </a:r>
-            <a:r>
-              <a:rPr lang="pt-PT" sz="6000" dirty="0" smtClean="0">
-                <a:solidFill>
-                  <a:srgbClr val="00568A"/>
-                </a:solidFill>
-              </a:rPr>
-              <a:t> Future </a:t>
-            </a:r>
-            <a:r>
-              <a:rPr lang="pt-PT" sz="6000" dirty="0" err="1" smtClean="0">
-                <a:solidFill>
-                  <a:srgbClr val="00568A"/>
-                </a:solidFill>
-              </a:rPr>
-              <a:t>Work</a:t>
+              <a:t>analysis</a:t>
             </a:r>
             <a:endParaRPr lang="pt-PT" sz="6000" dirty="0">
               <a:solidFill>
@@ -8693,7 +9892,7 @@
     </p:spTree>
     <p:extLst>
       <p:ext uri="{BB962C8B-B14F-4D97-AF65-F5344CB8AC3E}">
-        <p14:creationId xmlns:p14="http://schemas.microsoft.com/office/powerpoint/2010/main" val="1071797658"/>
+        <p14:creationId xmlns:p14="http://schemas.microsoft.com/office/powerpoint/2010/main" val="375898863"/>
       </p:ext>
     </p:extLst>
   </p:cSld>
@@ -8713,16 +9912,6 @@
 <file path=ppt/slides/slide18.xml><?xml version="1.0" encoding="utf-8"?>
 <p:sld xmlns:a="http://schemas.openxmlformats.org/drawingml/2006/main" xmlns:r="http://schemas.openxmlformats.org/officeDocument/2006/relationships" xmlns:p="http://schemas.openxmlformats.org/presentationml/2006/main">
   <p:cSld>
-    <p:bg>
-      <p:bgPr>
-        <a:solidFill>
-          <a:schemeClr val="bg1">
-            <a:lumMod val="95000"/>
-          </a:schemeClr>
-        </a:solidFill>
-        <a:effectLst/>
-      </p:bgPr>
-    </p:bg>
     <p:spTree>
       <p:nvGrpSpPr>
         <p:cNvPr id="1" name=""/>
@@ -8739,14 +9928,44 @@
       </p:grpSpPr>
       <p:sp>
         <p:nvSpPr>
+          <p:cNvPr id="2" name="CaixaDeTexto 1"/>
+          <p:cNvSpPr txBox="1"/>
+          <p:nvPr/>
+        </p:nvSpPr>
+        <p:spPr>
+          <a:xfrm>
+            <a:off x="0" y="0"/>
+            <a:ext cx="12192000" cy="1579418"/>
+          </a:xfrm>
+          <a:prstGeom prst="rect">
+            <a:avLst/>
+          </a:prstGeom>
+          <a:solidFill>
+            <a:schemeClr val="bg1">
+              <a:lumMod val="95000"/>
+            </a:schemeClr>
+          </a:solidFill>
+        </p:spPr>
+        <p:txBody>
+          <a:bodyPr wrap="square" rtlCol="0">
+            <a:spAutoFit/>
+          </a:bodyPr>
+          <a:lstStyle/>
+          <a:p>
+            <a:endParaRPr lang="pt-PT" dirty="0"/>
+          </a:p>
+        </p:txBody>
+      </p:sp>
+      <p:sp>
+        <p:nvSpPr>
           <p:cNvPr id="3" name="CaixaDeTexto 2"/>
           <p:cNvSpPr txBox="1"/>
           <p:nvPr/>
         </p:nvSpPr>
         <p:spPr>
           <a:xfrm>
-            <a:off x="1099973" y="2434106"/>
-            <a:ext cx="1746258" cy="1446550"/>
+            <a:off x="623455" y="346365"/>
+            <a:ext cx="1668984" cy="923330"/>
           </a:xfrm>
           <a:prstGeom prst="rect">
             <a:avLst/>
@@ -8760,14 +9979,14 @@
           <a:lstStyle/>
           <a:p>
             <a:r>
-              <a:rPr lang="pt-PT" sz="8800" dirty="0" smtClean="0">
+              <a:rPr lang="pt-PT" sz="5400" dirty="0" smtClean="0">
                 <a:solidFill>
                   <a:srgbClr val="B9122B"/>
                 </a:solidFill>
               </a:rPr>
-              <a:t>#7</a:t>
-            </a:r>
-            <a:endParaRPr lang="pt-PT" sz="8800" dirty="0">
+              <a:t>#PM</a:t>
+            </a:r>
+            <a:endParaRPr lang="pt-PT" sz="5400" dirty="0">
               <a:solidFill>
                 <a:srgbClr val="B9122B"/>
               </a:solidFill>
@@ -8777,37 +9996,14 @@
       </p:sp>
       <p:sp>
         <p:nvSpPr>
-          <p:cNvPr id="4" name="Marcador de Posição do Número do Diapositivo 3"/>
-          <p:cNvSpPr>
-            <a:spLocks noGrp="1"/>
-          </p:cNvSpPr>
-          <p:nvPr>
-            <p:ph type="sldNum" sz="quarter" idx="12"/>
-          </p:nvPr>
-        </p:nvSpPr>
-        <p:spPr/>
-        <p:txBody>
-          <a:bodyPr/>
-          <a:lstStyle/>
-          <a:p>
-            <a:fld id="{5683189C-B5E2-F345-AC06-1CEB972D3557}" type="slidenum">
-              <a:rPr lang="pt-PT" smtClean="0"/>
-              <a:t>18</a:t>
-            </a:fld>
-            <a:endParaRPr lang="pt-PT"/>
-          </a:p>
-        </p:txBody>
-      </p:sp>
-      <p:sp>
-        <p:nvSpPr>
-          <p:cNvPr id="13" name="CaixaDeTexto 12"/>
+          <p:cNvPr id="5" name="CaixaDeTexto 4"/>
           <p:cNvSpPr txBox="1"/>
           <p:nvPr/>
         </p:nvSpPr>
         <p:spPr>
           <a:xfrm>
-            <a:off x="2846231" y="2649550"/>
-            <a:ext cx="3898824" cy="1015663"/>
+            <a:off x="2137893" y="423309"/>
+            <a:ext cx="1189749" cy="769441"/>
           </a:xfrm>
           <a:prstGeom prst="rect">
             <a:avLst/>
@@ -8821,14 +10017,14 @@
           <a:lstStyle/>
           <a:p>
             <a:r>
-              <a:rPr lang="pt-PT" sz="6000" smtClean="0">
+              <a:rPr lang="pt-PT" sz="4400" dirty="0" err="1" smtClean="0">
                 <a:solidFill>
                   <a:srgbClr val="00568A"/>
                 </a:solidFill>
               </a:rPr>
-              <a:t>Conclusions</a:t>
-            </a:r>
-            <a:endParaRPr lang="pt-PT" sz="6000" dirty="0">
+              <a:t>Title</a:t>
+            </a:r>
+            <a:endParaRPr lang="pt-PT" sz="4400" dirty="0">
               <a:solidFill>
                 <a:srgbClr val="00568A"/>
               </a:solidFill>
@@ -8836,10 +10032,33 @@
           </a:p>
         </p:txBody>
       </p:sp>
+      <p:sp>
+        <p:nvSpPr>
+          <p:cNvPr id="4" name="Marcador de Posição do Número do Diapositivo 3"/>
+          <p:cNvSpPr>
+            <a:spLocks noGrp="1"/>
+          </p:cNvSpPr>
+          <p:nvPr>
+            <p:ph type="sldNum" sz="quarter" idx="12"/>
+          </p:nvPr>
+        </p:nvSpPr>
+        <p:spPr/>
+        <p:txBody>
+          <a:bodyPr/>
+          <a:lstStyle/>
+          <a:p>
+            <a:fld id="{5683189C-B5E2-F345-AC06-1CEB972D3557}" type="slidenum">
+              <a:rPr lang="pt-PT" smtClean="0"/>
+              <a:t>18</a:t>
+            </a:fld>
+            <a:endParaRPr lang="pt-PT"/>
+          </a:p>
+        </p:txBody>
+      </p:sp>
     </p:spTree>
     <p:extLst>
       <p:ext uri="{BB962C8B-B14F-4D97-AF65-F5344CB8AC3E}">
-        <p14:creationId xmlns:p14="http://schemas.microsoft.com/office/powerpoint/2010/main" val="1473790754"/>
+        <p14:creationId xmlns:p14="http://schemas.microsoft.com/office/powerpoint/2010/main" val="1255551745"/>
       </p:ext>
     </p:extLst>
   </p:cSld>
@@ -8911,7 +10130,7 @@
                   <a:srgbClr val="B9122B"/>
                 </a:solidFill>
               </a:rPr>
-              <a:t>#8</a:t>
+              <a:t>#6</a:t>
             </a:r>
             <a:endParaRPr lang="pt-PT" sz="8800" dirty="0">
               <a:solidFill>
@@ -8953,7 +10172,7 @@
         <p:spPr>
           <a:xfrm>
             <a:off x="2846231" y="2649550"/>
-            <a:ext cx="2807692" cy="1015663"/>
+            <a:ext cx="9068508" cy="1015663"/>
           </a:xfrm>
           <a:prstGeom prst="rect">
             <a:avLst/>
@@ -8972,7 +10191,39 @@
                   <a:srgbClr val="00568A"/>
                 </a:solidFill>
               </a:rPr>
-              <a:t>Annexes</a:t>
+              <a:t>Limitations</a:t>
+            </a:r>
+            <a:r>
+              <a:rPr lang="pt-PT" sz="6000" dirty="0" smtClean="0">
+                <a:solidFill>
+                  <a:srgbClr val="00568A"/>
+                </a:solidFill>
+              </a:rPr>
+              <a:t> </a:t>
+            </a:r>
+            <a:r>
+              <a:rPr lang="pt-PT" sz="6000" dirty="0" err="1" smtClean="0">
+                <a:solidFill>
+                  <a:srgbClr val="00568A"/>
+                </a:solidFill>
+              </a:rPr>
+              <a:t>and</a:t>
+            </a:r>
+            <a:r>
+              <a:rPr lang="pt-PT" sz="6000" dirty="0" smtClean="0">
+                <a:solidFill>
+                  <a:srgbClr val="00568A"/>
+                </a:solidFill>
+              </a:rPr>
+              <a:t> Future </a:t>
+            </a:r>
+            <a:r>
+              <a:rPr lang="pt-PT" sz="6000" dirty="0" err="1" smtClean="0">
+                <a:solidFill>
+                  <a:srgbClr val="00568A"/>
+                </a:solidFill>
+              </a:rPr>
+              <a:t>Work</a:t>
             </a:r>
             <a:endParaRPr lang="pt-PT" sz="6000" dirty="0">
               <a:solidFill>
@@ -8985,7 +10236,7 @@
     </p:spTree>
     <p:extLst>
       <p:ext uri="{BB962C8B-B14F-4D97-AF65-F5344CB8AC3E}">
-        <p14:creationId xmlns:p14="http://schemas.microsoft.com/office/powerpoint/2010/main" val="1353809460"/>
+        <p14:creationId xmlns:p14="http://schemas.microsoft.com/office/powerpoint/2010/main" val="1071797658"/>
       </p:ext>
     </p:extLst>
   </p:cSld>
@@ -9203,6 +10454,773 @@
         </p:nvSpPr>
         <p:spPr>
           <a:xfrm>
+            <a:off x="623454" y="346365"/>
+            <a:ext cx="1879113" cy="923330"/>
+          </a:xfrm>
+          <a:prstGeom prst="rect">
+            <a:avLst/>
+          </a:prstGeom>
+          <a:noFill/>
+        </p:spPr>
+        <p:txBody>
+          <a:bodyPr wrap="square" rtlCol="0">
+            <a:spAutoFit/>
+          </a:bodyPr>
+          <a:lstStyle/>
+          <a:p>
+            <a:r>
+              <a:rPr lang="pt-PT" sz="5400" smtClean="0">
+                <a:solidFill>
+                  <a:srgbClr val="B9122B"/>
+                </a:solidFill>
+              </a:rPr>
+              <a:t>#LFW</a:t>
+            </a:r>
+            <a:endParaRPr lang="pt-PT" sz="5400" dirty="0">
+              <a:solidFill>
+                <a:srgbClr val="B9122B"/>
+              </a:solidFill>
+            </a:endParaRPr>
+          </a:p>
+        </p:txBody>
+      </p:sp>
+      <p:sp>
+        <p:nvSpPr>
+          <p:cNvPr id="4" name="Marcador de Posição do Número do Diapositivo 3"/>
+          <p:cNvSpPr>
+            <a:spLocks noGrp="1"/>
+          </p:cNvSpPr>
+          <p:nvPr>
+            <p:ph type="sldNum" sz="quarter" idx="12"/>
+          </p:nvPr>
+        </p:nvSpPr>
+        <p:spPr/>
+        <p:txBody>
+          <a:bodyPr/>
+          <a:lstStyle/>
+          <a:p>
+            <a:fld id="{5683189C-B5E2-F345-AC06-1CEB972D3557}" type="slidenum">
+              <a:rPr lang="pt-PT" smtClean="0"/>
+              <a:t>20</a:t>
+            </a:fld>
+            <a:endParaRPr lang="pt-PT"/>
+          </a:p>
+        </p:txBody>
+      </p:sp>
+      <p:sp>
+        <p:nvSpPr>
+          <p:cNvPr id="7" name="CaixaDeTexto 6"/>
+          <p:cNvSpPr txBox="1"/>
+          <p:nvPr/>
+        </p:nvSpPr>
+        <p:spPr>
+          <a:xfrm>
+            <a:off x="2292439" y="423309"/>
+            <a:ext cx="6706644" cy="769441"/>
+          </a:xfrm>
+          <a:prstGeom prst="rect">
+            <a:avLst/>
+          </a:prstGeom>
+          <a:noFill/>
+        </p:spPr>
+        <p:txBody>
+          <a:bodyPr wrap="none" rtlCol="0">
+            <a:spAutoFit/>
+          </a:bodyPr>
+          <a:lstStyle/>
+          <a:p>
+            <a:r>
+              <a:rPr lang="pt-PT" sz="4400" dirty="0" err="1" smtClean="0">
+                <a:solidFill>
+                  <a:srgbClr val="00568A"/>
+                </a:solidFill>
+              </a:rPr>
+              <a:t>Limitations</a:t>
+            </a:r>
+            <a:r>
+              <a:rPr lang="pt-PT" sz="4400" dirty="0" smtClean="0">
+                <a:solidFill>
+                  <a:srgbClr val="00568A"/>
+                </a:solidFill>
+              </a:rPr>
+              <a:t> </a:t>
+            </a:r>
+            <a:r>
+              <a:rPr lang="pt-PT" sz="4400" dirty="0" err="1" smtClean="0">
+                <a:solidFill>
+                  <a:srgbClr val="00568A"/>
+                </a:solidFill>
+              </a:rPr>
+              <a:t>and</a:t>
+            </a:r>
+            <a:r>
+              <a:rPr lang="pt-PT" sz="4400" dirty="0" smtClean="0">
+                <a:solidFill>
+                  <a:srgbClr val="00568A"/>
+                </a:solidFill>
+              </a:rPr>
+              <a:t> Future </a:t>
+            </a:r>
+            <a:r>
+              <a:rPr lang="pt-PT" sz="4400" dirty="0" err="1" smtClean="0">
+                <a:solidFill>
+                  <a:srgbClr val="00568A"/>
+                </a:solidFill>
+              </a:rPr>
+              <a:t>Work</a:t>
+            </a:r>
+            <a:endParaRPr lang="pt-PT" sz="4400" dirty="0">
+              <a:solidFill>
+                <a:srgbClr val="00568A"/>
+              </a:solidFill>
+            </a:endParaRPr>
+          </a:p>
+        </p:txBody>
+      </p:sp>
+    </p:spTree>
+    <p:extLst>
+      <p:ext uri="{BB962C8B-B14F-4D97-AF65-F5344CB8AC3E}">
+        <p14:creationId xmlns:p14="http://schemas.microsoft.com/office/powerpoint/2010/main" val="423025989"/>
+      </p:ext>
+    </p:extLst>
+  </p:cSld>
+  <p:clrMapOvr>
+    <a:masterClrMapping/>
+  </p:clrMapOvr>
+  <p:timing>
+    <p:tnLst>
+      <p:par>
+        <p:cTn id="1" dur="indefinite" restart="never" nodeType="tmRoot"/>
+      </p:par>
+    </p:tnLst>
+  </p:timing>
+</p:sld>
+</file>
+
+<file path=ppt/slides/slide21.xml><?xml version="1.0" encoding="utf-8"?>
+<p:sld xmlns:a="http://schemas.openxmlformats.org/drawingml/2006/main" xmlns:r="http://schemas.openxmlformats.org/officeDocument/2006/relationships" xmlns:p="http://schemas.openxmlformats.org/presentationml/2006/main">
+  <p:cSld>
+    <p:bg>
+      <p:bgPr>
+        <a:solidFill>
+          <a:schemeClr val="bg1">
+            <a:lumMod val="95000"/>
+          </a:schemeClr>
+        </a:solidFill>
+        <a:effectLst/>
+      </p:bgPr>
+    </p:bg>
+    <p:spTree>
+      <p:nvGrpSpPr>
+        <p:cNvPr id="1" name=""/>
+        <p:cNvGrpSpPr/>
+        <p:nvPr/>
+      </p:nvGrpSpPr>
+      <p:grpSpPr>
+        <a:xfrm>
+          <a:off x="0" y="0"/>
+          <a:ext cx="0" cy="0"/>
+          <a:chOff x="0" y="0"/>
+          <a:chExt cx="0" cy="0"/>
+        </a:xfrm>
+      </p:grpSpPr>
+      <p:sp>
+        <p:nvSpPr>
+          <p:cNvPr id="3" name="CaixaDeTexto 2"/>
+          <p:cNvSpPr txBox="1"/>
+          <p:nvPr/>
+        </p:nvSpPr>
+        <p:spPr>
+          <a:xfrm>
+            <a:off x="1099973" y="2434106"/>
+            <a:ext cx="1746258" cy="1446550"/>
+          </a:xfrm>
+          <a:prstGeom prst="rect">
+            <a:avLst/>
+          </a:prstGeom>
+          <a:noFill/>
+        </p:spPr>
+        <p:txBody>
+          <a:bodyPr wrap="square" rtlCol="0">
+            <a:spAutoFit/>
+          </a:bodyPr>
+          <a:lstStyle/>
+          <a:p>
+            <a:r>
+              <a:rPr lang="pt-PT" sz="8800" dirty="0" smtClean="0">
+                <a:solidFill>
+                  <a:srgbClr val="B9122B"/>
+                </a:solidFill>
+              </a:rPr>
+              <a:t>#7</a:t>
+            </a:r>
+            <a:endParaRPr lang="pt-PT" sz="8800" dirty="0">
+              <a:solidFill>
+                <a:srgbClr val="B9122B"/>
+              </a:solidFill>
+            </a:endParaRPr>
+          </a:p>
+        </p:txBody>
+      </p:sp>
+      <p:sp>
+        <p:nvSpPr>
+          <p:cNvPr id="4" name="Marcador de Posição do Número do Diapositivo 3"/>
+          <p:cNvSpPr>
+            <a:spLocks noGrp="1"/>
+          </p:cNvSpPr>
+          <p:nvPr>
+            <p:ph type="sldNum" sz="quarter" idx="12"/>
+          </p:nvPr>
+        </p:nvSpPr>
+        <p:spPr/>
+        <p:txBody>
+          <a:bodyPr/>
+          <a:lstStyle/>
+          <a:p>
+            <a:fld id="{5683189C-B5E2-F345-AC06-1CEB972D3557}" type="slidenum">
+              <a:rPr lang="pt-PT" smtClean="0"/>
+              <a:t>21</a:t>
+            </a:fld>
+            <a:endParaRPr lang="pt-PT"/>
+          </a:p>
+        </p:txBody>
+      </p:sp>
+      <p:sp>
+        <p:nvSpPr>
+          <p:cNvPr id="13" name="CaixaDeTexto 12"/>
+          <p:cNvSpPr txBox="1"/>
+          <p:nvPr/>
+        </p:nvSpPr>
+        <p:spPr>
+          <a:xfrm>
+            <a:off x="2846231" y="2649550"/>
+            <a:ext cx="3898824" cy="1015663"/>
+          </a:xfrm>
+          <a:prstGeom prst="rect">
+            <a:avLst/>
+          </a:prstGeom>
+          <a:noFill/>
+        </p:spPr>
+        <p:txBody>
+          <a:bodyPr wrap="none" rtlCol="0">
+            <a:spAutoFit/>
+          </a:bodyPr>
+          <a:lstStyle/>
+          <a:p>
+            <a:r>
+              <a:rPr lang="pt-PT" sz="6000" smtClean="0">
+                <a:solidFill>
+                  <a:srgbClr val="00568A"/>
+                </a:solidFill>
+              </a:rPr>
+              <a:t>Conclusions</a:t>
+            </a:r>
+            <a:endParaRPr lang="pt-PT" sz="6000" dirty="0">
+              <a:solidFill>
+                <a:srgbClr val="00568A"/>
+              </a:solidFill>
+            </a:endParaRPr>
+          </a:p>
+        </p:txBody>
+      </p:sp>
+    </p:spTree>
+    <p:extLst>
+      <p:ext uri="{BB962C8B-B14F-4D97-AF65-F5344CB8AC3E}">
+        <p14:creationId xmlns:p14="http://schemas.microsoft.com/office/powerpoint/2010/main" val="1473790754"/>
+      </p:ext>
+    </p:extLst>
+  </p:cSld>
+  <p:clrMapOvr>
+    <a:masterClrMapping/>
+  </p:clrMapOvr>
+  <p:timing>
+    <p:tnLst>
+      <p:par>
+        <p:cTn id="1" dur="indefinite" restart="never" nodeType="tmRoot"/>
+      </p:par>
+    </p:tnLst>
+  </p:timing>
+</p:sld>
+</file>
+
+<file path=ppt/slides/slide22.xml><?xml version="1.0" encoding="utf-8"?>
+<p:sld xmlns:a="http://schemas.openxmlformats.org/drawingml/2006/main" xmlns:r="http://schemas.openxmlformats.org/officeDocument/2006/relationships" xmlns:p="http://schemas.openxmlformats.org/presentationml/2006/main">
+  <p:cSld>
+    <p:spTree>
+      <p:nvGrpSpPr>
+        <p:cNvPr id="1" name=""/>
+        <p:cNvGrpSpPr/>
+        <p:nvPr/>
+      </p:nvGrpSpPr>
+      <p:grpSpPr>
+        <a:xfrm>
+          <a:off x="0" y="0"/>
+          <a:ext cx="0" cy="0"/>
+          <a:chOff x="0" y="0"/>
+          <a:chExt cx="0" cy="0"/>
+        </a:xfrm>
+      </p:grpSpPr>
+      <p:sp>
+        <p:nvSpPr>
+          <p:cNvPr id="2" name="CaixaDeTexto 1"/>
+          <p:cNvSpPr txBox="1"/>
+          <p:nvPr/>
+        </p:nvSpPr>
+        <p:spPr>
+          <a:xfrm>
+            <a:off x="0" y="0"/>
+            <a:ext cx="12192000" cy="1579418"/>
+          </a:xfrm>
+          <a:prstGeom prst="rect">
+            <a:avLst/>
+          </a:prstGeom>
+          <a:solidFill>
+            <a:schemeClr val="bg1">
+              <a:lumMod val="95000"/>
+            </a:schemeClr>
+          </a:solidFill>
+        </p:spPr>
+        <p:txBody>
+          <a:bodyPr wrap="square" rtlCol="0">
+            <a:spAutoFit/>
+          </a:bodyPr>
+          <a:lstStyle/>
+          <a:p>
+            <a:endParaRPr lang="pt-PT" dirty="0"/>
+          </a:p>
+        </p:txBody>
+      </p:sp>
+      <p:sp>
+        <p:nvSpPr>
+          <p:cNvPr id="3" name="CaixaDeTexto 2"/>
+          <p:cNvSpPr txBox="1"/>
+          <p:nvPr/>
+        </p:nvSpPr>
+        <p:spPr>
+          <a:xfrm>
+            <a:off x="623454" y="346365"/>
+            <a:ext cx="1879113" cy="923330"/>
+          </a:xfrm>
+          <a:prstGeom prst="rect">
+            <a:avLst/>
+          </a:prstGeom>
+          <a:noFill/>
+        </p:spPr>
+        <p:txBody>
+          <a:bodyPr wrap="square" rtlCol="0">
+            <a:spAutoFit/>
+          </a:bodyPr>
+          <a:lstStyle/>
+          <a:p>
+            <a:r>
+              <a:rPr lang="pt-PT" sz="5400" dirty="0" smtClean="0">
+                <a:solidFill>
+                  <a:srgbClr val="B9122B"/>
+                </a:solidFill>
+              </a:rPr>
+              <a:t>#CC</a:t>
+            </a:r>
+            <a:endParaRPr lang="pt-PT" sz="5400" dirty="0">
+              <a:solidFill>
+                <a:srgbClr val="B9122B"/>
+              </a:solidFill>
+            </a:endParaRPr>
+          </a:p>
+        </p:txBody>
+      </p:sp>
+      <p:sp>
+        <p:nvSpPr>
+          <p:cNvPr id="4" name="Marcador de Posição do Número do Diapositivo 3"/>
+          <p:cNvSpPr>
+            <a:spLocks noGrp="1"/>
+          </p:cNvSpPr>
+          <p:nvPr>
+            <p:ph type="sldNum" sz="quarter" idx="12"/>
+          </p:nvPr>
+        </p:nvSpPr>
+        <p:spPr/>
+        <p:txBody>
+          <a:bodyPr/>
+          <a:lstStyle/>
+          <a:p>
+            <a:fld id="{5683189C-B5E2-F345-AC06-1CEB972D3557}" type="slidenum">
+              <a:rPr lang="pt-PT" smtClean="0"/>
+              <a:t>22</a:t>
+            </a:fld>
+            <a:endParaRPr lang="pt-PT"/>
+          </a:p>
+        </p:txBody>
+      </p:sp>
+      <p:sp>
+        <p:nvSpPr>
+          <p:cNvPr id="6" name="CaixaDeTexto 5"/>
+          <p:cNvSpPr txBox="1"/>
+          <p:nvPr/>
+        </p:nvSpPr>
+        <p:spPr>
+          <a:xfrm>
+            <a:off x="2137893" y="404988"/>
+            <a:ext cx="2912977" cy="769441"/>
+          </a:xfrm>
+          <a:prstGeom prst="rect">
+            <a:avLst/>
+          </a:prstGeom>
+          <a:noFill/>
+        </p:spPr>
+        <p:txBody>
+          <a:bodyPr wrap="none" rtlCol="0">
+            <a:spAutoFit/>
+          </a:bodyPr>
+          <a:lstStyle/>
+          <a:p>
+            <a:r>
+              <a:rPr lang="pt-PT" sz="4400" dirty="0" err="1" smtClean="0">
+                <a:solidFill>
+                  <a:srgbClr val="00568A"/>
+                </a:solidFill>
+              </a:rPr>
+              <a:t>Conclusions</a:t>
+            </a:r>
+            <a:endParaRPr lang="pt-PT" sz="4400" dirty="0">
+              <a:solidFill>
+                <a:srgbClr val="00568A"/>
+              </a:solidFill>
+            </a:endParaRPr>
+          </a:p>
+        </p:txBody>
+      </p:sp>
+    </p:spTree>
+    <p:extLst>
+      <p:ext uri="{BB962C8B-B14F-4D97-AF65-F5344CB8AC3E}">
+        <p14:creationId xmlns:p14="http://schemas.microsoft.com/office/powerpoint/2010/main" val="1185665182"/>
+      </p:ext>
+    </p:extLst>
+  </p:cSld>
+  <p:clrMapOvr>
+    <a:masterClrMapping/>
+  </p:clrMapOvr>
+  <p:timing>
+    <p:tnLst>
+      <p:par>
+        <p:cTn id="1" dur="indefinite" restart="never" nodeType="tmRoot"/>
+      </p:par>
+    </p:tnLst>
+  </p:timing>
+</p:sld>
+</file>
+
+<file path=ppt/slides/slide23.xml><?xml version="1.0" encoding="utf-8"?>
+<p:sld xmlns:a="http://schemas.openxmlformats.org/drawingml/2006/main" xmlns:r="http://schemas.openxmlformats.org/officeDocument/2006/relationships" xmlns:p="http://schemas.openxmlformats.org/presentationml/2006/main">
+  <p:cSld>
+    <p:bg>
+      <p:bgPr>
+        <a:solidFill>
+          <a:schemeClr val="bg1">
+            <a:lumMod val="95000"/>
+          </a:schemeClr>
+        </a:solidFill>
+        <a:effectLst/>
+      </p:bgPr>
+    </p:bg>
+    <p:spTree>
+      <p:nvGrpSpPr>
+        <p:cNvPr id="1" name=""/>
+        <p:cNvGrpSpPr/>
+        <p:nvPr/>
+      </p:nvGrpSpPr>
+      <p:grpSpPr>
+        <a:xfrm>
+          <a:off x="0" y="0"/>
+          <a:ext cx="0" cy="0"/>
+          <a:chOff x="0" y="0"/>
+          <a:chExt cx="0" cy="0"/>
+        </a:xfrm>
+      </p:grpSpPr>
+      <p:sp>
+        <p:nvSpPr>
+          <p:cNvPr id="4" name="Marcador de Posição do Número do Diapositivo 3"/>
+          <p:cNvSpPr>
+            <a:spLocks noGrp="1"/>
+          </p:cNvSpPr>
+          <p:nvPr>
+            <p:ph type="sldNum" sz="quarter" idx="12"/>
+          </p:nvPr>
+        </p:nvSpPr>
+        <p:spPr/>
+        <p:txBody>
+          <a:bodyPr/>
+          <a:lstStyle/>
+          <a:p>
+            <a:fld id="{5683189C-B5E2-F345-AC06-1CEB972D3557}" type="slidenum">
+              <a:rPr lang="pt-PT" smtClean="0"/>
+              <a:t>23</a:t>
+            </a:fld>
+            <a:endParaRPr lang="pt-PT"/>
+          </a:p>
+        </p:txBody>
+      </p:sp>
+      <p:pic>
+        <p:nvPicPr>
+          <p:cNvPr id="5" name="Picture 2" descr="eup.png"/>
+          <p:cNvPicPr>
+            <a:picLocks noChangeAspect="1" noChangeArrowheads="1"/>
+          </p:cNvPicPr>
+          <p:nvPr/>
+        </p:nvPicPr>
+        <p:blipFill>
+          <a:blip r:embed="rId3">
+            <a:extLst>
+              <a:ext uri="{28A0092B-C50C-407E-A947-70E740481C1C}">
+                <a14:useLocalDpi xmlns:a14="http://schemas.microsoft.com/office/drawing/2010/main" val="0"/>
+              </a:ext>
+            </a:extLst>
+          </a:blip>
+          <a:srcRect/>
+          <a:stretch>
+            <a:fillRect/>
+          </a:stretch>
+        </p:blipFill>
+        <p:spPr bwMode="auto">
+          <a:xfrm>
+            <a:off x="554789" y="1948505"/>
+            <a:ext cx="8055811" cy="2794360"/>
+          </a:xfrm>
+          <a:prstGeom prst="rect">
+            <a:avLst/>
+          </a:prstGeom>
+          <a:noFill/>
+          <a:extLst>
+            <a:ext uri="{909E8E84-426E-40DD-AFC4-6F175D3DCCD1}">
+              <a14:hiddenFill xmlns:a14="http://schemas.microsoft.com/office/drawing/2010/main">
+                <a:solidFill>
+                  <a:srgbClr val="FFFFFF"/>
+                </a:solidFill>
+              </a14:hiddenFill>
+            </a:ext>
+          </a:extLst>
+        </p:spPr>
+      </p:pic>
+    </p:spTree>
+    <p:extLst>
+      <p:ext uri="{BB962C8B-B14F-4D97-AF65-F5344CB8AC3E}">
+        <p14:creationId xmlns:p14="http://schemas.microsoft.com/office/powerpoint/2010/main" val="1353809460"/>
+      </p:ext>
+    </p:extLst>
+  </p:cSld>
+  <p:clrMapOvr>
+    <a:masterClrMapping/>
+  </p:clrMapOvr>
+  <p:timing>
+    <p:tnLst>
+      <p:par>
+        <p:cTn id="1" dur="indefinite" restart="never" nodeType="tmRoot"/>
+      </p:par>
+    </p:tnLst>
+  </p:timing>
+</p:sld>
+</file>
+
+<file path=ppt/slides/slide24.xml><?xml version="1.0" encoding="utf-8"?>
+<p:sld xmlns:a="http://schemas.openxmlformats.org/drawingml/2006/main" xmlns:r="http://schemas.openxmlformats.org/officeDocument/2006/relationships" xmlns:p="http://schemas.openxmlformats.org/presentationml/2006/main">
+  <p:cSld>
+    <p:bg>
+      <p:bgPr>
+        <a:solidFill>
+          <a:schemeClr val="bg1">
+            <a:lumMod val="95000"/>
+          </a:schemeClr>
+        </a:solidFill>
+        <a:effectLst/>
+      </p:bgPr>
+    </p:bg>
+    <p:spTree>
+      <p:nvGrpSpPr>
+        <p:cNvPr id="1" name=""/>
+        <p:cNvGrpSpPr/>
+        <p:nvPr/>
+      </p:nvGrpSpPr>
+      <p:grpSpPr>
+        <a:xfrm>
+          <a:off x="0" y="0"/>
+          <a:ext cx="0" cy="0"/>
+          <a:chOff x="0" y="0"/>
+          <a:chExt cx="0" cy="0"/>
+        </a:xfrm>
+      </p:grpSpPr>
+      <p:sp>
+        <p:nvSpPr>
+          <p:cNvPr id="3" name="CaixaDeTexto 2"/>
+          <p:cNvSpPr txBox="1"/>
+          <p:nvPr/>
+        </p:nvSpPr>
+        <p:spPr>
+          <a:xfrm>
+            <a:off x="1099973" y="2434106"/>
+            <a:ext cx="1746258" cy="1446550"/>
+          </a:xfrm>
+          <a:prstGeom prst="rect">
+            <a:avLst/>
+          </a:prstGeom>
+          <a:noFill/>
+        </p:spPr>
+        <p:txBody>
+          <a:bodyPr wrap="square" rtlCol="0">
+            <a:spAutoFit/>
+          </a:bodyPr>
+          <a:lstStyle/>
+          <a:p>
+            <a:r>
+              <a:rPr lang="pt-PT" sz="8800" dirty="0" smtClean="0">
+                <a:solidFill>
+                  <a:srgbClr val="B9122B"/>
+                </a:solidFill>
+              </a:rPr>
+              <a:t>#8</a:t>
+            </a:r>
+            <a:endParaRPr lang="pt-PT" sz="8800" dirty="0">
+              <a:solidFill>
+                <a:srgbClr val="B9122B"/>
+              </a:solidFill>
+            </a:endParaRPr>
+          </a:p>
+        </p:txBody>
+      </p:sp>
+      <p:sp>
+        <p:nvSpPr>
+          <p:cNvPr id="4" name="Marcador de Posição do Número do Diapositivo 3"/>
+          <p:cNvSpPr>
+            <a:spLocks noGrp="1"/>
+          </p:cNvSpPr>
+          <p:nvPr>
+            <p:ph type="sldNum" sz="quarter" idx="12"/>
+          </p:nvPr>
+        </p:nvSpPr>
+        <p:spPr/>
+        <p:txBody>
+          <a:bodyPr/>
+          <a:lstStyle/>
+          <a:p>
+            <a:fld id="{5683189C-B5E2-F345-AC06-1CEB972D3557}" type="slidenum">
+              <a:rPr lang="pt-PT" smtClean="0"/>
+              <a:t>24</a:t>
+            </a:fld>
+            <a:endParaRPr lang="pt-PT"/>
+          </a:p>
+        </p:txBody>
+      </p:sp>
+      <p:sp>
+        <p:nvSpPr>
+          <p:cNvPr id="13" name="CaixaDeTexto 12"/>
+          <p:cNvSpPr txBox="1"/>
+          <p:nvPr/>
+        </p:nvSpPr>
+        <p:spPr>
+          <a:xfrm>
+            <a:off x="2846231" y="2649550"/>
+            <a:ext cx="2807692" cy="1015663"/>
+          </a:xfrm>
+          <a:prstGeom prst="rect">
+            <a:avLst/>
+          </a:prstGeom>
+          <a:noFill/>
+        </p:spPr>
+        <p:txBody>
+          <a:bodyPr wrap="none" rtlCol="0">
+            <a:spAutoFit/>
+          </a:bodyPr>
+          <a:lstStyle/>
+          <a:p>
+            <a:r>
+              <a:rPr lang="pt-PT" sz="6000" dirty="0" err="1" smtClean="0">
+                <a:solidFill>
+                  <a:srgbClr val="00568A"/>
+                </a:solidFill>
+              </a:rPr>
+              <a:t>Annexes</a:t>
+            </a:r>
+            <a:endParaRPr lang="pt-PT" sz="6000" dirty="0">
+              <a:solidFill>
+                <a:srgbClr val="00568A"/>
+              </a:solidFill>
+            </a:endParaRPr>
+          </a:p>
+        </p:txBody>
+      </p:sp>
+    </p:spTree>
+    <p:extLst>
+      <p:ext uri="{BB962C8B-B14F-4D97-AF65-F5344CB8AC3E}">
+        <p14:creationId xmlns:p14="http://schemas.microsoft.com/office/powerpoint/2010/main" val="1404030753"/>
+      </p:ext>
+    </p:extLst>
+  </p:cSld>
+  <p:clrMapOvr>
+    <a:masterClrMapping/>
+  </p:clrMapOvr>
+  <p:timing>
+    <p:tnLst>
+      <p:par>
+        <p:cTn id="1" dur="indefinite" restart="never" nodeType="tmRoot"/>
+      </p:par>
+    </p:tnLst>
+  </p:timing>
+</p:sld>
+</file>
+
+<file path=ppt/slides/slide25.xml><?xml version="1.0" encoding="utf-8"?>
+<p:sld xmlns:a="http://schemas.openxmlformats.org/drawingml/2006/main" xmlns:r="http://schemas.openxmlformats.org/officeDocument/2006/relationships" xmlns:p="http://schemas.openxmlformats.org/presentationml/2006/main">
+  <p:cSld>
+    <p:spTree>
+      <p:nvGrpSpPr>
+        <p:cNvPr id="1" name=""/>
+        <p:cNvGrpSpPr/>
+        <p:nvPr/>
+      </p:nvGrpSpPr>
+      <p:grpSpPr>
+        <a:xfrm>
+          <a:off x="0" y="0"/>
+          <a:ext cx="0" cy="0"/>
+          <a:chOff x="0" y="0"/>
+          <a:chExt cx="0" cy="0"/>
+        </a:xfrm>
+      </p:grpSpPr>
+      <p:sp>
+        <p:nvSpPr>
+          <p:cNvPr id="2" name="CaixaDeTexto 1"/>
+          <p:cNvSpPr txBox="1"/>
+          <p:nvPr/>
+        </p:nvSpPr>
+        <p:spPr>
+          <a:xfrm>
+            <a:off x="0" y="0"/>
+            <a:ext cx="12192000" cy="1579418"/>
+          </a:xfrm>
+          <a:prstGeom prst="rect">
+            <a:avLst/>
+          </a:prstGeom>
+          <a:solidFill>
+            <a:schemeClr val="bg1">
+              <a:lumMod val="95000"/>
+            </a:schemeClr>
+          </a:solidFill>
+        </p:spPr>
+        <p:txBody>
+          <a:bodyPr wrap="square" rtlCol="0">
+            <a:spAutoFit/>
+          </a:bodyPr>
+          <a:lstStyle/>
+          <a:p>
+            <a:endParaRPr lang="pt-PT" dirty="0"/>
+          </a:p>
+        </p:txBody>
+      </p:sp>
+      <p:sp>
+        <p:nvSpPr>
+          <p:cNvPr id="3" name="CaixaDeTexto 2"/>
+          <p:cNvSpPr txBox="1"/>
+          <p:nvPr/>
+        </p:nvSpPr>
+        <p:spPr>
+          <a:xfrm>
             <a:off x="623455" y="346365"/>
             <a:ext cx="1668984" cy="923330"/>
           </a:xfrm>
@@ -9304,7 +11322,7 @@
           <a:p>
             <a:fld id="{5683189C-B5E2-F345-AC06-1CEB972D3557}" type="slidenum">
               <a:rPr lang="pt-PT" smtClean="0"/>
-              <a:t>20</a:t>
+              <a:t>25</a:t>
             </a:fld>
             <a:endParaRPr lang="pt-PT"/>
           </a:p>
@@ -11051,7 +13069,7 @@
 </p:sld>
 </file>
 
-<file path=ppt/slides/slide21.xml><?xml version="1.0" encoding="utf-8"?>
+<file path=ppt/slides/slide26.xml><?xml version="1.0" encoding="utf-8"?>
 <p:sld xmlns:a="http://schemas.openxmlformats.org/drawingml/2006/main" xmlns:r="http://schemas.openxmlformats.org/officeDocument/2006/relationships" xmlns:p="http://schemas.openxmlformats.org/presentationml/2006/main">
   <p:cSld>
     <p:spTree>
@@ -11207,7 +13225,7 @@
           <a:p>
             <a:fld id="{5683189C-B5E2-F345-AC06-1CEB972D3557}" type="slidenum">
               <a:rPr lang="pt-PT" smtClean="0"/>
-              <a:t>21</a:t>
+              <a:t>26</a:t>
             </a:fld>
             <a:endParaRPr lang="pt-PT"/>
           </a:p>
@@ -12348,7 +14366,7 @@
 </p:sld>
 </file>
 
-<file path=ppt/slides/slide22.xml><?xml version="1.0" encoding="utf-8"?>
+<file path=ppt/slides/slide27.xml><?xml version="1.0" encoding="utf-8"?>
 <p:sld xmlns:a="http://schemas.openxmlformats.org/drawingml/2006/main" xmlns:r="http://schemas.openxmlformats.org/officeDocument/2006/relationships" xmlns:p="http://schemas.openxmlformats.org/presentationml/2006/main">
   <p:cSld>
     <p:spTree>
@@ -12624,7 +14642,7 @@
           <a:p>
             <a:fld id="{5683189C-B5E2-F345-AC06-1CEB972D3557}" type="slidenum">
               <a:rPr lang="pt-PT" smtClean="0"/>
-              <a:t>22</a:t>
+              <a:t>27</a:t>
             </a:fld>
             <a:endParaRPr lang="pt-PT"/>
           </a:p>

</xml_diff>